<commit_message>
Updated the powerpoint for node adding
Updated the UserNexusDocumentation powerpoint to prepare for the meeting with the professor.
</commit_message>
<xml_diff>
--- a/Documentation/UserNexus/How to Create Edges/UserNexusDocumentation.pptx
+++ b/Documentation/UserNexus/How to Create Edges/UserNexusDocumentation.pptx
@@ -11,6 +11,8 @@
     <p:sldId id="259" r:id="rId5"/>
     <p:sldId id="260" r:id="rId6"/>
     <p:sldId id="261" r:id="rId7"/>
+    <p:sldId id="263" r:id="rId8"/>
+    <p:sldId id="264" r:id="rId9"/>
   </p:sldIdLst>
   <p:sldSz cx="12192000" cy="6858000"/>
   <p:notesSz cx="6858000" cy="9144000"/>
@@ -109,6 +111,11 @@
       </a:defRPr>
     </a:lvl9pPr>
   </p:defaultTextStyle>
+  <p:extLst>
+    <p:ext uri="{EFAFB233-063F-42B5-8137-9DF3F51BA10A}">
+      <p15:sldGuideLst xmlns:p15="http://schemas.microsoft.com/office/powerpoint/2012/main"/>
+    </p:ext>
+  </p:extLst>
 </p:presentation>
 </file>
 
@@ -259,7 +266,7 @@
           <a:p>
             <a:fld id="{3A73E8DE-7C9F-9342-B905-4957E1C6E5A2}" type="datetimeFigureOut">
               <a:rPr lang="en-US" smtClean="0"/>
-              <a:t>8/11/18</a:t>
+              <a:t>11/2/18</a:t>
             </a:fld>
             <a:endParaRPr lang="en-US"/>
           </a:p>
@@ -457,7 +464,7 @@
           <a:p>
             <a:fld id="{3A73E8DE-7C9F-9342-B905-4957E1C6E5A2}" type="datetimeFigureOut">
               <a:rPr lang="en-US" smtClean="0"/>
-              <a:t>8/11/18</a:t>
+              <a:t>11/2/18</a:t>
             </a:fld>
             <a:endParaRPr lang="en-US"/>
           </a:p>
@@ -665,7 +672,7 @@
           <a:p>
             <a:fld id="{3A73E8DE-7C9F-9342-B905-4957E1C6E5A2}" type="datetimeFigureOut">
               <a:rPr lang="en-US" smtClean="0"/>
-              <a:t>8/11/18</a:t>
+              <a:t>11/2/18</a:t>
             </a:fld>
             <a:endParaRPr lang="en-US"/>
           </a:p>
@@ -863,7 +870,7 @@
           <a:p>
             <a:fld id="{3A73E8DE-7C9F-9342-B905-4957E1C6E5A2}" type="datetimeFigureOut">
               <a:rPr lang="en-US" smtClean="0"/>
-              <a:t>8/11/18</a:t>
+              <a:t>11/2/18</a:t>
             </a:fld>
             <a:endParaRPr lang="en-US"/>
           </a:p>
@@ -1138,7 +1145,7 @@
           <a:p>
             <a:fld id="{3A73E8DE-7C9F-9342-B905-4957E1C6E5A2}" type="datetimeFigureOut">
               <a:rPr lang="en-US" smtClean="0"/>
-              <a:t>8/11/18</a:t>
+              <a:t>11/2/18</a:t>
             </a:fld>
             <a:endParaRPr lang="en-US"/>
           </a:p>
@@ -1403,7 +1410,7 @@
           <a:p>
             <a:fld id="{3A73E8DE-7C9F-9342-B905-4957E1C6E5A2}" type="datetimeFigureOut">
               <a:rPr lang="en-US" smtClean="0"/>
-              <a:t>8/11/18</a:t>
+              <a:t>11/2/18</a:t>
             </a:fld>
             <a:endParaRPr lang="en-US"/>
           </a:p>
@@ -1815,7 +1822,7 @@
           <a:p>
             <a:fld id="{3A73E8DE-7C9F-9342-B905-4957E1C6E5A2}" type="datetimeFigureOut">
               <a:rPr lang="en-US" smtClean="0"/>
-              <a:t>8/11/18</a:t>
+              <a:t>11/2/18</a:t>
             </a:fld>
             <a:endParaRPr lang="en-US"/>
           </a:p>
@@ -1956,7 +1963,7 @@
           <a:p>
             <a:fld id="{3A73E8DE-7C9F-9342-B905-4957E1C6E5A2}" type="datetimeFigureOut">
               <a:rPr lang="en-US" smtClean="0"/>
-              <a:t>8/11/18</a:t>
+              <a:t>11/2/18</a:t>
             </a:fld>
             <a:endParaRPr lang="en-US"/>
           </a:p>
@@ -2069,7 +2076,7 @@
           <a:p>
             <a:fld id="{3A73E8DE-7C9F-9342-B905-4957E1C6E5A2}" type="datetimeFigureOut">
               <a:rPr lang="en-US" smtClean="0"/>
-              <a:t>8/11/18</a:t>
+              <a:t>11/2/18</a:t>
             </a:fld>
             <a:endParaRPr lang="en-US"/>
           </a:p>
@@ -2380,7 +2387,7 @@
           <a:p>
             <a:fld id="{3A73E8DE-7C9F-9342-B905-4957E1C6E5A2}" type="datetimeFigureOut">
               <a:rPr lang="en-US" smtClean="0"/>
-              <a:t>8/11/18</a:t>
+              <a:t>11/2/18</a:t>
             </a:fld>
             <a:endParaRPr lang="en-US"/>
           </a:p>
@@ -2668,7 +2675,7 @@
           <a:p>
             <a:fld id="{3A73E8DE-7C9F-9342-B905-4957E1C6E5A2}" type="datetimeFigureOut">
               <a:rPr lang="en-US" smtClean="0"/>
-              <a:t>8/11/18</a:t>
+              <a:t>11/2/18</a:t>
             </a:fld>
             <a:endParaRPr lang="en-US"/>
           </a:p>
@@ -2909,7 +2916,7 @@
           <a:p>
             <a:fld id="{3A73E8DE-7C9F-9342-B905-4957E1C6E5A2}" type="datetimeFigureOut">
               <a:rPr lang="en-US" smtClean="0"/>
-              <a:t>8/11/18</a:t>
+              <a:t>11/2/18</a:t>
             </a:fld>
             <a:endParaRPr lang="en-US"/>
           </a:p>
@@ -3910,7 +3917,7 @@
             </a:r>
             <a:r>
               <a:rPr lang="en-US" sz="2400" dirty="0"/>
-              <a:t>, line 42]</a:t>
+              <a:t>, line 80]</a:t>
             </a:r>
             <a:endParaRPr lang="en-US" dirty="0"/>
           </a:p>
@@ -4069,7 +4076,7 @@
             </a:r>
             <a:r>
               <a:rPr lang="en-US" sz="2400" dirty="0"/>
-              <a:t>, line 99]</a:t>
+              <a:t>, line 153]</a:t>
             </a:r>
             <a:endParaRPr lang="en-US" dirty="0"/>
           </a:p>
@@ -4176,7 +4183,7 @@
             <a:pPr algn="ctr"/>
             <a:r>
               <a:rPr lang="en-US" sz="1000" dirty="0"/>
-              <a:t>Initialize and create lists of display artifact id’s that are currently in the network graph [line 121 – 124]</a:t>
+              <a:t>Initialize and create lists of display artifact id’s that are currently in the network graph [lines 297-299]</a:t>
             </a:r>
           </a:p>
         </p:txBody>
@@ -4236,7 +4243,7 @@
             </a:r>
             <a:r>
               <a:rPr lang="en-US" sz="1000" dirty="0"/>
-              <a:t>). If they are shared then will be used to create link/edge object later.</a:t>
+              <a:t>). If they are shared then will be used to create link/edge object later [lines 301-308]</a:t>
             </a:r>
           </a:p>
         </p:txBody>
@@ -4310,7 +4317,10 @@
               <a:rPr lang="en-US" sz="1000" dirty="0" err="1"/>
               <a:t>linkNode</a:t>
             </a:r>
-            <a:endParaRPr lang="en-US" sz="1000" dirty="0"/>
+            <a:r>
+              <a:rPr lang="en-US" sz="1000" dirty="0"/>
+              <a:t> [lines 315-356]</a:t>
+            </a:r>
           </a:p>
         </p:txBody>
       </p:sp>
@@ -4649,7 +4659,7 @@
             </a:r>
             <a:r>
               <a:rPr lang="en-US" sz="1000" dirty="0"/>
-              <a:t> (i.e. list of id’s from all associated people with new Node) [line 100 – 120)</a:t>
+              <a:t> (i.e. list of id’s from all associated people with new Node) [lines 166-295)</a:t>
             </a:r>
           </a:p>
         </p:txBody>
@@ -4954,7 +4964,7 @@
             </a:pPr>
             <a:r>
               <a:rPr lang="en-US" b="1" dirty="0"/>
-              <a:t>New story node knows directly the person and places associated with it</a:t>
+              <a:t>New story node knows directly the person and places associated with it.</a:t>
             </a:r>
           </a:p>
           <a:p>
@@ -4964,7 +4974,7 @@
             </a:pPr>
             <a:r>
               <a:rPr lang="en-US" dirty="0"/>
-              <a:t>New story node also knows “related stories” but these are deduced by some complex network formula so ignore these for now.</a:t>
+              <a:t>New story node also knows “related stories,” but these are deduced by some complex network formula so ignore these for now; they are not used for links.</a:t>
             </a:r>
           </a:p>
         </p:txBody>
@@ -5269,7 +5279,7 @@
             </a:pPr>
             <a:r>
               <a:rPr lang="en-US" dirty="0"/>
-              <a:t>New story node knows directly the person and places associated with it</a:t>
+              <a:t>New story node knows directly the person and places associated with it.</a:t>
             </a:r>
           </a:p>
           <a:p>
@@ -5279,7 +5289,7 @@
             </a:pPr>
             <a:r>
               <a:rPr lang="en-US" b="1" dirty="0"/>
-              <a:t>When one of the new story node’s associated person or places matches with an existing node from the network a primary edge can be created. </a:t>
+              <a:t>When one of the new story node’s associated person or places matches with an existing node from the network, a primary edge can be created. </a:t>
             </a:r>
           </a:p>
           <a:p>
@@ -5298,6 +5308,16 @@
             <a:r>
               <a:rPr lang="en-US" dirty="0"/>
               <a:t> person is “Joanne.” “Joanne” is currently a node on the user nexus graph. Create an edge between the two.</a:t>
+            </a:r>
+          </a:p>
+          <a:p>
+            <a:pPr marL="742950" lvl="1" indent="-285750">
+              <a:buFont typeface="Arial" panose="020B0604020202020204" pitchFamily="34" charset="0"/>
+              <a:buChar char="•"/>
+            </a:pPr>
+            <a:r>
+              <a:rPr lang="en-US" dirty="0"/>
+              <a:t>To link a person to Fieldtrip nodes, the process for creating Fieldtrip edges is called, as people currently do not have associated Fieldtrips in their data. Stories and places do, however.</a:t>
             </a:r>
           </a:p>
         </p:txBody>
@@ -5688,7 +5708,7 @@
             </a:pPr>
             <a:r>
               <a:rPr lang="en-US" dirty="0"/>
-              <a:t>New story node knows directly the person and places associated with it</a:t>
+              <a:t>New story node knows directly the person and places associated with it.</a:t>
             </a:r>
           </a:p>
           <a:p>
@@ -5698,7 +5718,7 @@
             </a:pPr>
             <a:r>
               <a:rPr lang="en-US" dirty="0"/>
-              <a:t>When one of the new story node’s associated person or places matches with an existing node from the network a primary edge can be created.</a:t>
+              <a:t>When one of the new story node’s associated person or places matches with an existing node from the network, a primary edge can be created.</a:t>
             </a:r>
           </a:p>
           <a:p>
@@ -6204,7 +6224,7 @@
         </p:spPr>
         <p:txBody>
           <a:bodyPr>
-            <a:normAutofit fontScale="92500" lnSpcReduction="20000"/>
+            <a:normAutofit fontScale="92500" lnSpcReduction="10000"/>
           </a:bodyPr>
           <a:lstStyle/>
           <a:p>
@@ -6214,7 +6234,7 @@
             </a:pPr>
             <a:r>
               <a:rPr lang="en-US" sz="1700" dirty="0"/>
-              <a:t>New story node knows directly the person and places associated with it</a:t>
+              <a:t>New story node knows directly the person and places associated with it.</a:t>
             </a:r>
           </a:p>
           <a:p>
@@ -6224,7 +6244,7 @@
             </a:pPr>
             <a:r>
               <a:rPr lang="en-US" sz="1700" dirty="0"/>
-              <a:t>When one of the new story node’s associated person or places matches with an existing node from the network a primary edge can be created.</a:t>
+              <a:t>When one of the new story node’s associated person or places matches with an existing node from the network, a primary edge can be created.</a:t>
             </a:r>
           </a:p>
           <a:p>
@@ -6253,12 +6273,16 @@
               <a:buChar char="•"/>
             </a:pPr>
             <a:r>
-              <a:rPr lang="en-US" sz="1500" dirty="0"/>
-              <a:t>If new node isn’t a story, then the rule of thumb for determine which nodes can have primary/secondary edges is: </a:t>
-            </a:r>
-            <a:r>
               <a:rPr lang="en-US" sz="1500" u="sng" dirty="0"/>
-              <a:t>if the type of node is the same as the new story node then that can only have a secondary edge, all other types of nodes can have both primary/secondary edges.</a:t>
+              <a:t>The </a:t>
+            </a:r>
+            <a:r>
+              <a:rPr lang="en-US" sz="1500" u="sng" dirty="0" err="1"/>
+              <a:t>newNode</a:t>
+            </a:r>
+            <a:r>
+              <a:rPr lang="en-US" sz="1500" u="sng" dirty="0"/>
+              <a:t> can be either a person, place, or story, and can link to other people, places, or stories, but secondary edges currently are only implemented for story to story connections.</a:t>
             </a:r>
           </a:p>
           <a:p>
@@ -6457,6 +6481,788 @@
     <p:extLst>
       <p:ext uri="{BB962C8B-B14F-4D97-AF65-F5344CB8AC3E}">
         <p14:creationId xmlns:p14="http://schemas.microsoft.com/office/powerpoint/2010/main" val="3073183680"/>
+      </p:ext>
+    </p:extLst>
+  </p:cSld>
+  <p:clrMapOvr>
+    <a:masterClrMapping/>
+  </p:clrMapOvr>
+</p:sld>
+</file>
+
+<file path=ppt/slides/slide7.xml><?xml version="1.0" encoding="utf-8"?>
+<p:sld xmlns:a="http://schemas.openxmlformats.org/drawingml/2006/main" xmlns:r="http://schemas.openxmlformats.org/officeDocument/2006/relationships" xmlns:p="http://schemas.openxmlformats.org/presentationml/2006/main">
+  <p:cSld>
+    <p:spTree>
+      <p:nvGrpSpPr>
+        <p:cNvPr id="1" name=""/>
+        <p:cNvGrpSpPr/>
+        <p:nvPr/>
+      </p:nvGrpSpPr>
+      <p:grpSpPr>
+        <a:xfrm>
+          <a:off x="0" y="0"/>
+          <a:ext cx="0" cy="0"/>
+          <a:chOff x="0" y="0"/>
+          <a:chExt cx="0" cy="0"/>
+        </a:xfrm>
+      </p:grpSpPr>
+      <p:sp>
+        <p:nvSpPr>
+          <p:cNvPr id="3" name="Oval 2">
+            <a:extLst>
+              <a:ext uri="{FF2B5EF4-FFF2-40B4-BE49-F238E27FC236}">
+                <a16:creationId xmlns:a16="http://schemas.microsoft.com/office/drawing/2014/main" id="{BB15AB6B-9DD5-FB40-AE38-8A08B9A3CCEF}"/>
+              </a:ext>
+            </a:extLst>
+          </p:cNvPr>
+          <p:cNvSpPr/>
+          <p:nvPr/>
+        </p:nvSpPr>
+        <p:spPr>
+          <a:xfrm>
+            <a:off x="6860920" y="3019354"/>
+            <a:ext cx="1114157" cy="1088545"/>
+          </a:xfrm>
+          <a:prstGeom prst="ellipse">
+            <a:avLst/>
+          </a:prstGeom>
+        </p:spPr>
+        <p:style>
+          <a:lnRef idx="2">
+            <a:schemeClr val="accent1">
+              <a:shade val="50000"/>
+            </a:schemeClr>
+          </a:lnRef>
+          <a:fillRef idx="1">
+            <a:schemeClr val="accent1"/>
+          </a:fillRef>
+          <a:effectRef idx="0">
+            <a:schemeClr val="accent1"/>
+          </a:effectRef>
+          <a:fontRef idx="minor">
+            <a:schemeClr val="lt1"/>
+          </a:fontRef>
+        </p:style>
+        <p:txBody>
+          <a:bodyPr rtlCol="0" anchor="ctr"/>
+          <a:lstStyle/>
+          <a:p>
+            <a:pPr algn="ctr"/>
+            <a:r>
+              <a:rPr lang="en-US" sz="1400" dirty="0"/>
+              <a:t>New Fieldtrip Node</a:t>
+            </a:r>
+          </a:p>
+        </p:txBody>
+      </p:sp>
+      <p:sp>
+        <p:nvSpPr>
+          <p:cNvPr id="4" name="Oval 3">
+            <a:extLst>
+              <a:ext uri="{FF2B5EF4-FFF2-40B4-BE49-F238E27FC236}">
+                <a16:creationId xmlns:a16="http://schemas.microsoft.com/office/drawing/2014/main" id="{D1D4AF6D-741A-A445-91EF-ACB3FF40CBEF}"/>
+              </a:ext>
+            </a:extLst>
+          </p:cNvPr>
+          <p:cNvSpPr/>
+          <p:nvPr/>
+        </p:nvSpPr>
+        <p:spPr>
+          <a:xfrm>
+            <a:off x="9010455" y="1722258"/>
+            <a:ext cx="820132" cy="801279"/>
+          </a:xfrm>
+          <a:prstGeom prst="ellipse">
+            <a:avLst/>
+          </a:prstGeom>
+          <a:solidFill>
+            <a:schemeClr val="tx2"/>
+          </a:solidFill>
+          <a:ln w="28575">
+            <a:solidFill>
+              <a:schemeClr val="accent2"/>
+            </a:solidFill>
+          </a:ln>
+        </p:spPr>
+        <p:style>
+          <a:lnRef idx="2">
+            <a:schemeClr val="accent1">
+              <a:shade val="50000"/>
+            </a:schemeClr>
+          </a:lnRef>
+          <a:fillRef idx="1">
+            <a:schemeClr val="accent1"/>
+          </a:fillRef>
+          <a:effectRef idx="0">
+            <a:schemeClr val="accent1"/>
+          </a:effectRef>
+          <a:fontRef idx="minor">
+            <a:schemeClr val="lt1"/>
+          </a:fontRef>
+        </p:style>
+        <p:txBody>
+          <a:bodyPr rtlCol="0" anchor="ctr"/>
+          <a:lstStyle/>
+          <a:p>
+            <a:pPr algn="ctr"/>
+            <a:r>
+              <a:rPr lang="en-US" sz="1000" dirty="0"/>
+              <a:t>Existing Place Node</a:t>
+            </a:r>
+          </a:p>
+        </p:txBody>
+      </p:sp>
+      <p:sp>
+        <p:nvSpPr>
+          <p:cNvPr id="6" name="Oval 5">
+            <a:extLst>
+              <a:ext uri="{FF2B5EF4-FFF2-40B4-BE49-F238E27FC236}">
+                <a16:creationId xmlns:a16="http://schemas.microsoft.com/office/drawing/2014/main" id="{1611AD07-93D2-D546-88A0-1A9F52FA5581}"/>
+              </a:ext>
+            </a:extLst>
+          </p:cNvPr>
+          <p:cNvSpPr/>
+          <p:nvPr/>
+        </p:nvSpPr>
+        <p:spPr>
+          <a:xfrm>
+            <a:off x="9010455" y="3162988"/>
+            <a:ext cx="820132" cy="801279"/>
+          </a:xfrm>
+          <a:prstGeom prst="ellipse">
+            <a:avLst/>
+          </a:prstGeom>
+          <a:solidFill>
+            <a:schemeClr val="tx2"/>
+          </a:solidFill>
+          <a:ln w="28575">
+            <a:solidFill>
+              <a:schemeClr val="accent2"/>
+            </a:solidFill>
+          </a:ln>
+        </p:spPr>
+        <p:style>
+          <a:lnRef idx="2">
+            <a:schemeClr val="accent1">
+              <a:shade val="50000"/>
+            </a:schemeClr>
+          </a:lnRef>
+          <a:fillRef idx="1">
+            <a:schemeClr val="accent1"/>
+          </a:fillRef>
+          <a:effectRef idx="0">
+            <a:schemeClr val="accent1"/>
+          </a:effectRef>
+          <a:fontRef idx="minor">
+            <a:schemeClr val="lt1"/>
+          </a:fontRef>
+        </p:style>
+        <p:txBody>
+          <a:bodyPr rtlCol="0" anchor="ctr"/>
+          <a:lstStyle/>
+          <a:p>
+            <a:pPr algn="ctr"/>
+            <a:r>
+              <a:rPr lang="en-US" sz="1000" dirty="0"/>
+              <a:t>Existing Person Node</a:t>
+            </a:r>
+          </a:p>
+        </p:txBody>
+      </p:sp>
+      <p:sp>
+        <p:nvSpPr>
+          <p:cNvPr id="8" name="Title 7">
+            <a:extLst>
+              <a:ext uri="{FF2B5EF4-FFF2-40B4-BE49-F238E27FC236}">
+                <a16:creationId xmlns:a16="http://schemas.microsoft.com/office/drawing/2014/main" id="{46A7470D-3D1D-634F-A847-4D33DA11A87B}"/>
+              </a:ext>
+            </a:extLst>
+          </p:cNvPr>
+          <p:cNvSpPr>
+            <a:spLocks noGrp="1"/>
+          </p:cNvSpPr>
+          <p:nvPr>
+            <p:ph type="title"/>
+          </p:nvPr>
+        </p:nvSpPr>
+        <p:spPr/>
+        <p:txBody>
+          <a:bodyPr/>
+          <a:lstStyle/>
+          <a:p>
+            <a:r>
+              <a:rPr lang="en-US" dirty="0"/>
+              <a:t>How to create Fieldtrip edges?</a:t>
+            </a:r>
+          </a:p>
+        </p:txBody>
+      </p:sp>
+      <p:sp>
+        <p:nvSpPr>
+          <p:cNvPr id="10" name="Text Placeholder 9">
+            <a:extLst>
+              <a:ext uri="{FF2B5EF4-FFF2-40B4-BE49-F238E27FC236}">
+                <a16:creationId xmlns:a16="http://schemas.microsoft.com/office/drawing/2014/main" id="{1048CD8B-F747-174C-9ADB-503808FC51B5}"/>
+              </a:ext>
+            </a:extLst>
+          </p:cNvPr>
+          <p:cNvSpPr>
+            <a:spLocks noGrp="1"/>
+          </p:cNvSpPr>
+          <p:nvPr>
+            <p:ph type="body" sz="half" idx="2"/>
+          </p:nvPr>
+        </p:nvSpPr>
+        <p:spPr/>
+        <p:txBody>
+          <a:bodyPr/>
+          <a:lstStyle/>
+          <a:p>
+            <a:pPr marL="285750" indent="-285750">
+              <a:buFont typeface="Arial" panose="020B0604020202020204" pitchFamily="34" charset="0"/>
+              <a:buChar char="•"/>
+            </a:pPr>
+            <a:r>
+              <a:rPr lang="en-US" b="1" dirty="0"/>
+              <a:t>New Fieldtrip node knows directly the person, places, and stories associated with it.</a:t>
+            </a:r>
+          </a:p>
+          <a:p>
+            <a:pPr marL="285750" indent="-285750">
+              <a:buFont typeface="Arial" panose="020B0604020202020204" pitchFamily="34" charset="0"/>
+              <a:buChar char="•"/>
+            </a:pPr>
+            <a:endParaRPr lang="en-US" dirty="0"/>
+          </a:p>
+        </p:txBody>
+      </p:sp>
+      <p:sp>
+        <p:nvSpPr>
+          <p:cNvPr id="11" name="Oval 10">
+            <a:extLst>
+              <a:ext uri="{FF2B5EF4-FFF2-40B4-BE49-F238E27FC236}">
+                <a16:creationId xmlns:a16="http://schemas.microsoft.com/office/drawing/2014/main" id="{63D53C4B-C5AA-634E-9B08-DF38DC0EA684}"/>
+              </a:ext>
+            </a:extLst>
+          </p:cNvPr>
+          <p:cNvSpPr/>
+          <p:nvPr/>
+        </p:nvSpPr>
+        <p:spPr>
+          <a:xfrm>
+            <a:off x="9010455" y="4603718"/>
+            <a:ext cx="820132" cy="801279"/>
+          </a:xfrm>
+          <a:prstGeom prst="ellipse">
+            <a:avLst/>
+          </a:prstGeom>
+          <a:solidFill>
+            <a:schemeClr val="tx2"/>
+          </a:solidFill>
+          <a:ln w="28575">
+            <a:solidFill>
+              <a:schemeClr val="accent2"/>
+            </a:solidFill>
+          </a:ln>
+        </p:spPr>
+        <p:style>
+          <a:lnRef idx="2">
+            <a:schemeClr val="accent1">
+              <a:shade val="50000"/>
+            </a:schemeClr>
+          </a:lnRef>
+          <a:fillRef idx="1">
+            <a:schemeClr val="accent1"/>
+          </a:fillRef>
+          <a:effectRef idx="0">
+            <a:schemeClr val="accent1"/>
+          </a:effectRef>
+          <a:fontRef idx="minor">
+            <a:schemeClr val="lt1"/>
+          </a:fontRef>
+        </p:style>
+        <p:txBody>
+          <a:bodyPr rtlCol="0" anchor="ctr"/>
+          <a:lstStyle/>
+          <a:p>
+            <a:pPr algn="ctr"/>
+            <a:r>
+              <a:rPr lang="en-US" sz="1000" dirty="0"/>
+              <a:t>Existing Story Node</a:t>
+            </a:r>
+          </a:p>
+        </p:txBody>
+      </p:sp>
+    </p:spTree>
+    <p:extLst>
+      <p:ext uri="{BB962C8B-B14F-4D97-AF65-F5344CB8AC3E}">
+        <p14:creationId xmlns:p14="http://schemas.microsoft.com/office/powerpoint/2010/main" val="143301228"/>
+      </p:ext>
+    </p:extLst>
+  </p:cSld>
+  <p:clrMapOvr>
+    <a:masterClrMapping/>
+  </p:clrMapOvr>
+</p:sld>
+</file>
+
+<file path=ppt/slides/slide8.xml><?xml version="1.0" encoding="utf-8"?>
+<p:sld xmlns:a="http://schemas.openxmlformats.org/drawingml/2006/main" xmlns:r="http://schemas.openxmlformats.org/officeDocument/2006/relationships" xmlns:p="http://schemas.openxmlformats.org/presentationml/2006/main">
+  <p:cSld>
+    <p:spTree>
+      <p:nvGrpSpPr>
+        <p:cNvPr id="1" name=""/>
+        <p:cNvGrpSpPr/>
+        <p:nvPr/>
+      </p:nvGrpSpPr>
+      <p:grpSpPr>
+        <a:xfrm>
+          <a:off x="0" y="0"/>
+          <a:ext cx="0" cy="0"/>
+          <a:chOff x="0" y="0"/>
+          <a:chExt cx="0" cy="0"/>
+        </a:xfrm>
+      </p:grpSpPr>
+      <p:sp>
+        <p:nvSpPr>
+          <p:cNvPr id="3" name="Oval 2">
+            <a:extLst>
+              <a:ext uri="{FF2B5EF4-FFF2-40B4-BE49-F238E27FC236}">
+                <a16:creationId xmlns:a16="http://schemas.microsoft.com/office/drawing/2014/main" id="{BB15AB6B-9DD5-FB40-AE38-8A08B9A3CCEF}"/>
+              </a:ext>
+            </a:extLst>
+          </p:cNvPr>
+          <p:cNvSpPr/>
+          <p:nvPr/>
+        </p:nvSpPr>
+        <p:spPr>
+          <a:xfrm>
+            <a:off x="7154945" y="3162988"/>
+            <a:ext cx="820132" cy="801279"/>
+          </a:xfrm>
+          <a:prstGeom prst="ellipse">
+            <a:avLst/>
+          </a:prstGeom>
+        </p:spPr>
+        <p:style>
+          <a:lnRef idx="2">
+            <a:schemeClr val="accent1">
+              <a:shade val="50000"/>
+            </a:schemeClr>
+          </a:lnRef>
+          <a:fillRef idx="1">
+            <a:schemeClr val="accent1"/>
+          </a:fillRef>
+          <a:effectRef idx="0">
+            <a:schemeClr val="accent1"/>
+          </a:effectRef>
+          <a:fontRef idx="minor">
+            <a:schemeClr val="lt1"/>
+          </a:fontRef>
+        </p:style>
+        <p:txBody>
+          <a:bodyPr rtlCol="0" anchor="ctr"/>
+          <a:lstStyle/>
+          <a:p>
+            <a:pPr algn="ctr"/>
+            <a:r>
+              <a:rPr lang="en-US" sz="1400" dirty="0"/>
+              <a:t>New Story Node</a:t>
+            </a:r>
+          </a:p>
+        </p:txBody>
+      </p:sp>
+      <p:sp>
+        <p:nvSpPr>
+          <p:cNvPr id="4" name="Oval 3">
+            <a:extLst>
+              <a:ext uri="{FF2B5EF4-FFF2-40B4-BE49-F238E27FC236}">
+                <a16:creationId xmlns:a16="http://schemas.microsoft.com/office/drawing/2014/main" id="{D1D4AF6D-741A-A445-91EF-ACB3FF40CBEF}"/>
+              </a:ext>
+            </a:extLst>
+          </p:cNvPr>
+          <p:cNvSpPr/>
+          <p:nvPr/>
+        </p:nvSpPr>
+        <p:spPr>
+          <a:xfrm>
+            <a:off x="9010455" y="1722258"/>
+            <a:ext cx="820132" cy="801279"/>
+          </a:xfrm>
+          <a:prstGeom prst="ellipse">
+            <a:avLst/>
+          </a:prstGeom>
+          <a:solidFill>
+            <a:schemeClr val="tx2"/>
+          </a:solidFill>
+          <a:ln w="28575">
+            <a:solidFill>
+              <a:schemeClr val="accent2"/>
+            </a:solidFill>
+          </a:ln>
+        </p:spPr>
+        <p:style>
+          <a:lnRef idx="2">
+            <a:schemeClr val="accent1">
+              <a:shade val="50000"/>
+            </a:schemeClr>
+          </a:lnRef>
+          <a:fillRef idx="1">
+            <a:schemeClr val="accent1"/>
+          </a:fillRef>
+          <a:effectRef idx="0">
+            <a:schemeClr val="accent1"/>
+          </a:effectRef>
+          <a:fontRef idx="minor">
+            <a:schemeClr val="lt1"/>
+          </a:fontRef>
+        </p:style>
+        <p:txBody>
+          <a:bodyPr rtlCol="0" anchor="ctr"/>
+          <a:lstStyle/>
+          <a:p>
+            <a:pPr algn="ctr"/>
+            <a:r>
+              <a:rPr lang="en-US" sz="1000" dirty="0"/>
+              <a:t>Existing Place Node</a:t>
+            </a:r>
+          </a:p>
+        </p:txBody>
+      </p:sp>
+      <p:sp>
+        <p:nvSpPr>
+          <p:cNvPr id="6" name="Oval 5">
+            <a:extLst>
+              <a:ext uri="{FF2B5EF4-FFF2-40B4-BE49-F238E27FC236}">
+                <a16:creationId xmlns:a16="http://schemas.microsoft.com/office/drawing/2014/main" id="{1611AD07-93D2-D546-88A0-1A9F52FA5581}"/>
+              </a:ext>
+            </a:extLst>
+          </p:cNvPr>
+          <p:cNvSpPr/>
+          <p:nvPr/>
+        </p:nvSpPr>
+        <p:spPr>
+          <a:xfrm>
+            <a:off x="9010455" y="3162988"/>
+            <a:ext cx="820132" cy="801279"/>
+          </a:xfrm>
+          <a:prstGeom prst="ellipse">
+            <a:avLst/>
+          </a:prstGeom>
+          <a:solidFill>
+            <a:schemeClr val="tx2"/>
+          </a:solidFill>
+          <a:ln w="28575">
+            <a:solidFill>
+              <a:schemeClr val="accent2"/>
+            </a:solidFill>
+          </a:ln>
+        </p:spPr>
+        <p:style>
+          <a:lnRef idx="2">
+            <a:schemeClr val="accent1">
+              <a:shade val="50000"/>
+            </a:schemeClr>
+          </a:lnRef>
+          <a:fillRef idx="1">
+            <a:schemeClr val="accent1"/>
+          </a:fillRef>
+          <a:effectRef idx="0">
+            <a:schemeClr val="accent1"/>
+          </a:effectRef>
+          <a:fontRef idx="minor">
+            <a:schemeClr val="lt1"/>
+          </a:fontRef>
+        </p:style>
+        <p:txBody>
+          <a:bodyPr rtlCol="0" anchor="ctr"/>
+          <a:lstStyle/>
+          <a:p>
+            <a:pPr algn="ctr"/>
+            <a:r>
+              <a:rPr lang="en-US" sz="1000" dirty="0"/>
+              <a:t>Existing Person Node</a:t>
+            </a:r>
+          </a:p>
+        </p:txBody>
+      </p:sp>
+      <p:sp>
+        <p:nvSpPr>
+          <p:cNvPr id="8" name="Title 7">
+            <a:extLst>
+              <a:ext uri="{FF2B5EF4-FFF2-40B4-BE49-F238E27FC236}">
+                <a16:creationId xmlns:a16="http://schemas.microsoft.com/office/drawing/2014/main" id="{46A7470D-3D1D-634F-A847-4D33DA11A87B}"/>
+              </a:ext>
+            </a:extLst>
+          </p:cNvPr>
+          <p:cNvSpPr>
+            <a:spLocks noGrp="1"/>
+          </p:cNvSpPr>
+          <p:nvPr>
+            <p:ph type="title"/>
+          </p:nvPr>
+        </p:nvSpPr>
+        <p:spPr/>
+        <p:txBody>
+          <a:bodyPr/>
+          <a:lstStyle/>
+          <a:p>
+            <a:r>
+              <a:rPr lang="en-US" dirty="0"/>
+              <a:t>How to create Fieldtrip edges?</a:t>
+            </a:r>
+          </a:p>
+        </p:txBody>
+      </p:sp>
+      <p:sp>
+        <p:nvSpPr>
+          <p:cNvPr id="10" name="Text Placeholder 9">
+            <a:extLst>
+              <a:ext uri="{FF2B5EF4-FFF2-40B4-BE49-F238E27FC236}">
+                <a16:creationId xmlns:a16="http://schemas.microsoft.com/office/drawing/2014/main" id="{1048CD8B-F747-174C-9ADB-503808FC51B5}"/>
+              </a:ext>
+            </a:extLst>
+          </p:cNvPr>
+          <p:cNvSpPr>
+            <a:spLocks noGrp="1"/>
+          </p:cNvSpPr>
+          <p:nvPr>
+            <p:ph type="body" sz="half" idx="2"/>
+          </p:nvPr>
+        </p:nvSpPr>
+        <p:spPr/>
+        <p:txBody>
+          <a:bodyPr/>
+          <a:lstStyle/>
+          <a:p>
+            <a:pPr marL="285750" indent="-285750">
+              <a:buFont typeface="Arial" panose="020B0604020202020204" pitchFamily="34" charset="0"/>
+              <a:buChar char="•"/>
+            </a:pPr>
+            <a:r>
+              <a:rPr lang="en-US" dirty="0"/>
+              <a:t>New Fieldtrip node knows directly the person, places, and stories associated with it.</a:t>
+            </a:r>
+          </a:p>
+          <a:p>
+            <a:pPr marL="285750" indent="-285750">
+              <a:buFont typeface="Arial" panose="020B0604020202020204" pitchFamily="34" charset="0"/>
+              <a:buChar char="•"/>
+            </a:pPr>
+            <a:r>
+              <a:rPr lang="en-US" b="1" dirty="0"/>
+              <a:t>When one of the new Fieldtrip node’s associated person, places, stories matches with an existing node from the network, a primary edge can be created. </a:t>
+            </a:r>
+          </a:p>
+          <a:p>
+            <a:pPr marL="742950" lvl="1" indent="-285750">
+              <a:buFont typeface="Arial" panose="020B0604020202020204" pitchFamily="34" charset="0"/>
+              <a:buChar char="•"/>
+            </a:pPr>
+            <a:r>
+              <a:rPr lang="en-US" dirty="0"/>
+              <a:t>Example: New Fieldtrip “Feb 1887”’s person is “Jens Kristensen.” “Jens Kristensen” is currently a node on the User Nexus graph. Create an edge between the two.</a:t>
+            </a:r>
+          </a:p>
+        </p:txBody>
+      </p:sp>
+      <p:cxnSp>
+        <p:nvCxnSpPr>
+          <p:cNvPr id="5" name="Straight Connector 4">
+            <a:extLst>
+              <a:ext uri="{FF2B5EF4-FFF2-40B4-BE49-F238E27FC236}">
+                <a16:creationId xmlns:a16="http://schemas.microsoft.com/office/drawing/2014/main" id="{34D2CF34-809A-7E47-A276-34BC4B62603F}"/>
+              </a:ext>
+            </a:extLst>
+          </p:cNvPr>
+          <p:cNvCxnSpPr>
+            <a:stCxn id="3" idx="6"/>
+            <a:endCxn id="4" idx="2"/>
+          </p:cNvCxnSpPr>
+          <p:nvPr/>
+        </p:nvCxnSpPr>
+        <p:spPr>
+          <a:xfrm flipV="1">
+            <a:off x="7975077" y="2122898"/>
+            <a:ext cx="1035378" cy="1440730"/>
+          </a:xfrm>
+          <a:prstGeom prst="line">
+            <a:avLst/>
+          </a:prstGeom>
+          <a:ln>
+            <a:headEnd type="none" w="med" len="med"/>
+            <a:tailEnd type="triangle" w="med" len="med"/>
+          </a:ln>
+        </p:spPr>
+        <p:style>
+          <a:lnRef idx="1">
+            <a:schemeClr val="accent1"/>
+          </a:lnRef>
+          <a:fillRef idx="0">
+            <a:schemeClr val="accent1"/>
+          </a:fillRef>
+          <a:effectRef idx="0">
+            <a:schemeClr val="accent1"/>
+          </a:effectRef>
+          <a:fontRef idx="minor">
+            <a:schemeClr val="tx1"/>
+          </a:fontRef>
+        </p:style>
+      </p:cxnSp>
+      <p:cxnSp>
+        <p:nvCxnSpPr>
+          <p:cNvPr id="11" name="Straight Connector 10">
+            <a:extLst>
+              <a:ext uri="{FF2B5EF4-FFF2-40B4-BE49-F238E27FC236}">
+                <a16:creationId xmlns:a16="http://schemas.microsoft.com/office/drawing/2014/main" id="{171294B5-8104-A448-A1CE-5E6742BA963A}"/>
+              </a:ext>
+            </a:extLst>
+          </p:cNvPr>
+          <p:cNvCxnSpPr>
+            <a:stCxn id="3" idx="6"/>
+            <a:endCxn id="6" idx="2"/>
+          </p:cNvCxnSpPr>
+          <p:nvPr/>
+        </p:nvCxnSpPr>
+        <p:spPr>
+          <a:xfrm>
+            <a:off x="7975077" y="3563628"/>
+            <a:ext cx="1035378" cy="0"/>
+          </a:xfrm>
+          <a:prstGeom prst="line">
+            <a:avLst/>
+          </a:prstGeom>
+          <a:ln>
+            <a:headEnd type="none" w="med" len="med"/>
+            <a:tailEnd type="triangle" w="med" len="med"/>
+          </a:ln>
+        </p:spPr>
+        <p:style>
+          <a:lnRef idx="1">
+            <a:schemeClr val="accent1"/>
+          </a:lnRef>
+          <a:fillRef idx="0">
+            <a:schemeClr val="accent1"/>
+          </a:fillRef>
+          <a:effectRef idx="0">
+            <a:schemeClr val="accent1"/>
+          </a:effectRef>
+          <a:fontRef idx="minor">
+            <a:schemeClr val="tx1"/>
+          </a:fontRef>
+        </p:style>
+      </p:cxnSp>
+      <p:sp>
+        <p:nvSpPr>
+          <p:cNvPr id="12" name="Oval 11">
+            <a:extLst>
+              <a:ext uri="{FF2B5EF4-FFF2-40B4-BE49-F238E27FC236}">
+                <a16:creationId xmlns:a16="http://schemas.microsoft.com/office/drawing/2014/main" id="{4B8C2C36-F592-5745-BB88-66D159BFA322}"/>
+              </a:ext>
+            </a:extLst>
+          </p:cNvPr>
+          <p:cNvSpPr/>
+          <p:nvPr/>
+        </p:nvSpPr>
+        <p:spPr>
+          <a:xfrm>
+            <a:off x="6860920" y="3019354"/>
+            <a:ext cx="1114157" cy="1088545"/>
+          </a:xfrm>
+          <a:prstGeom prst="ellipse">
+            <a:avLst/>
+          </a:prstGeom>
+        </p:spPr>
+        <p:style>
+          <a:lnRef idx="2">
+            <a:schemeClr val="accent1">
+              <a:shade val="50000"/>
+            </a:schemeClr>
+          </a:lnRef>
+          <a:fillRef idx="1">
+            <a:schemeClr val="accent1"/>
+          </a:fillRef>
+          <a:effectRef idx="0">
+            <a:schemeClr val="accent1"/>
+          </a:effectRef>
+          <a:fontRef idx="minor">
+            <a:schemeClr val="lt1"/>
+          </a:fontRef>
+        </p:style>
+        <p:txBody>
+          <a:bodyPr rtlCol="0" anchor="ctr"/>
+          <a:lstStyle/>
+          <a:p>
+            <a:pPr algn="ctr"/>
+            <a:r>
+              <a:rPr lang="en-US" sz="1400" dirty="0"/>
+              <a:t>New Fieldtrip Node</a:t>
+            </a:r>
+          </a:p>
+        </p:txBody>
+      </p:sp>
+      <p:sp>
+        <p:nvSpPr>
+          <p:cNvPr id="13" name="Oval 12">
+            <a:extLst>
+              <a:ext uri="{FF2B5EF4-FFF2-40B4-BE49-F238E27FC236}">
+                <a16:creationId xmlns:a16="http://schemas.microsoft.com/office/drawing/2014/main" id="{ABF584DD-5600-FF49-8D22-9C2CCDD68C9D}"/>
+              </a:ext>
+            </a:extLst>
+          </p:cNvPr>
+          <p:cNvSpPr/>
+          <p:nvPr/>
+        </p:nvSpPr>
+        <p:spPr>
+          <a:xfrm>
+            <a:off x="9010455" y="4603718"/>
+            <a:ext cx="820132" cy="801279"/>
+          </a:xfrm>
+          <a:prstGeom prst="ellipse">
+            <a:avLst/>
+          </a:prstGeom>
+          <a:solidFill>
+            <a:schemeClr val="tx2"/>
+          </a:solidFill>
+          <a:ln w="28575">
+            <a:solidFill>
+              <a:schemeClr val="accent2"/>
+            </a:solidFill>
+          </a:ln>
+        </p:spPr>
+        <p:style>
+          <a:lnRef idx="2">
+            <a:schemeClr val="accent1">
+              <a:shade val="50000"/>
+            </a:schemeClr>
+          </a:lnRef>
+          <a:fillRef idx="1">
+            <a:schemeClr val="accent1"/>
+          </a:fillRef>
+          <a:effectRef idx="0">
+            <a:schemeClr val="accent1"/>
+          </a:effectRef>
+          <a:fontRef idx="minor">
+            <a:schemeClr val="lt1"/>
+          </a:fontRef>
+        </p:style>
+        <p:txBody>
+          <a:bodyPr rtlCol="0" anchor="ctr"/>
+          <a:lstStyle/>
+          <a:p>
+            <a:pPr algn="ctr"/>
+            <a:r>
+              <a:rPr lang="en-US" sz="1000" dirty="0"/>
+              <a:t>Existing Story Node</a:t>
+            </a:r>
+          </a:p>
+        </p:txBody>
+      </p:sp>
+    </p:spTree>
+    <p:extLst>
+      <p:ext uri="{BB962C8B-B14F-4D97-AF65-F5344CB8AC3E}">
+        <p14:creationId xmlns:p14="http://schemas.microsoft.com/office/powerpoint/2010/main" val="1009670587"/>
       </p:ext>
     </p:extLst>
   </p:cSld>

</xml_diff>

<commit_message>
Update Documentation/UserNexus/How to Create Edges/UserNexusDocumentation.pptx
preparing for the meeting with the professor
</commit_message>
<xml_diff>
--- a/Documentation/UserNexus/How to Create Edges/UserNexusDocumentation.pptx
+++ b/Documentation/UserNexus/How to Create Edges/UserNexusDocumentation.pptx
@@ -5,14 +5,12 @@
     <p:sldMasterId id="2147483648" r:id="rId1"/>
   </p:sldMasterIdLst>
   <p:sldIdLst>
-    <p:sldId id="256" r:id="rId2"/>
+    <p:sldId id="262" r:id="rId2"/>
     <p:sldId id="257" r:id="rId3"/>
     <p:sldId id="258" r:id="rId4"/>
     <p:sldId id="259" r:id="rId5"/>
     <p:sldId id="260" r:id="rId6"/>
     <p:sldId id="261" r:id="rId7"/>
-    <p:sldId id="263" r:id="rId8"/>
-    <p:sldId id="264" r:id="rId9"/>
   </p:sldIdLst>
   <p:sldSz cx="12192000" cy="6858000"/>
   <p:notesSz cx="6858000" cy="9144000"/>
@@ -266,7 +264,7 @@
           <a:p>
             <a:fld id="{3A73E8DE-7C9F-9342-B905-4957E1C6E5A2}" type="datetimeFigureOut">
               <a:rPr lang="en-US" smtClean="0"/>
-              <a:t>11/2/18</a:t>
+              <a:t>11/3/18</a:t>
             </a:fld>
             <a:endParaRPr lang="en-US"/>
           </a:p>
@@ -464,7 +462,7 @@
           <a:p>
             <a:fld id="{3A73E8DE-7C9F-9342-B905-4957E1C6E5A2}" type="datetimeFigureOut">
               <a:rPr lang="en-US" smtClean="0"/>
-              <a:t>11/2/18</a:t>
+              <a:t>11/3/18</a:t>
             </a:fld>
             <a:endParaRPr lang="en-US"/>
           </a:p>
@@ -672,7 +670,7 @@
           <a:p>
             <a:fld id="{3A73E8DE-7C9F-9342-B905-4957E1C6E5A2}" type="datetimeFigureOut">
               <a:rPr lang="en-US" smtClean="0"/>
-              <a:t>11/2/18</a:t>
+              <a:t>11/3/18</a:t>
             </a:fld>
             <a:endParaRPr lang="en-US"/>
           </a:p>
@@ -870,7 +868,7 @@
           <a:p>
             <a:fld id="{3A73E8DE-7C9F-9342-B905-4957E1C6E5A2}" type="datetimeFigureOut">
               <a:rPr lang="en-US" smtClean="0"/>
-              <a:t>11/2/18</a:t>
+              <a:t>11/3/18</a:t>
             </a:fld>
             <a:endParaRPr lang="en-US"/>
           </a:p>
@@ -1145,7 +1143,7 @@
           <a:p>
             <a:fld id="{3A73E8DE-7C9F-9342-B905-4957E1C6E5A2}" type="datetimeFigureOut">
               <a:rPr lang="en-US" smtClean="0"/>
-              <a:t>11/2/18</a:t>
+              <a:t>11/3/18</a:t>
             </a:fld>
             <a:endParaRPr lang="en-US"/>
           </a:p>
@@ -1410,7 +1408,7 @@
           <a:p>
             <a:fld id="{3A73E8DE-7C9F-9342-B905-4957E1C6E5A2}" type="datetimeFigureOut">
               <a:rPr lang="en-US" smtClean="0"/>
-              <a:t>11/2/18</a:t>
+              <a:t>11/3/18</a:t>
             </a:fld>
             <a:endParaRPr lang="en-US"/>
           </a:p>
@@ -1822,7 +1820,7 @@
           <a:p>
             <a:fld id="{3A73E8DE-7C9F-9342-B905-4957E1C6E5A2}" type="datetimeFigureOut">
               <a:rPr lang="en-US" smtClean="0"/>
-              <a:t>11/2/18</a:t>
+              <a:t>11/3/18</a:t>
             </a:fld>
             <a:endParaRPr lang="en-US"/>
           </a:p>
@@ -1963,7 +1961,7 @@
           <a:p>
             <a:fld id="{3A73E8DE-7C9F-9342-B905-4957E1C6E5A2}" type="datetimeFigureOut">
               <a:rPr lang="en-US" smtClean="0"/>
-              <a:t>11/2/18</a:t>
+              <a:t>11/3/18</a:t>
             </a:fld>
             <a:endParaRPr lang="en-US"/>
           </a:p>
@@ -2076,7 +2074,7 @@
           <a:p>
             <a:fld id="{3A73E8DE-7C9F-9342-B905-4957E1C6E5A2}" type="datetimeFigureOut">
               <a:rPr lang="en-US" smtClean="0"/>
-              <a:t>11/2/18</a:t>
+              <a:t>11/3/18</a:t>
             </a:fld>
             <a:endParaRPr lang="en-US"/>
           </a:p>
@@ -2387,7 +2385,7 @@
           <a:p>
             <a:fld id="{3A73E8DE-7C9F-9342-B905-4957E1C6E5A2}" type="datetimeFigureOut">
               <a:rPr lang="en-US" smtClean="0"/>
-              <a:t>11/2/18</a:t>
+              <a:t>11/3/18</a:t>
             </a:fld>
             <a:endParaRPr lang="en-US"/>
           </a:p>
@@ -2675,7 +2673,7 @@
           <a:p>
             <a:fld id="{3A73E8DE-7C9F-9342-B905-4957E1C6E5A2}" type="datetimeFigureOut">
               <a:rPr lang="en-US" smtClean="0"/>
-              <a:t>11/2/18</a:t>
+              <a:t>11/3/18</a:t>
             </a:fld>
             <a:endParaRPr lang="en-US"/>
           </a:p>
@@ -2916,7 +2914,7 @@
           <a:p>
             <a:fld id="{3A73E8DE-7C9F-9342-B905-4957E1C6E5A2}" type="datetimeFigureOut">
               <a:rPr lang="en-US" smtClean="0"/>
-              <a:t>11/2/18</a:t>
+              <a:t>11/3/18</a:t>
             </a:fld>
             <a:endParaRPr lang="en-US"/>
           </a:p>
@@ -3347,8 +3345,8 @@
         </p:nvSpPr>
         <p:spPr>
           <a:xfrm>
-            <a:off x="4881203" y="216816"/>
-            <a:ext cx="1439196" cy="1358069"/>
+            <a:off x="5484753" y="272056"/>
+            <a:ext cx="1805316" cy="1703561"/>
           </a:xfrm>
           <a:prstGeom prst="ellipse">
             <a:avLst/>
@@ -3381,39 +3379,39 @@
           <a:p>
             <a:pPr algn="ctr"/>
             <a:r>
-              <a:rPr lang="en-US" sz="1000" dirty="0"/>
+              <a:rPr lang="en-US" sz="1200" dirty="0"/>
               <a:t>User selects  </a:t>
             </a:r>
             <a:r>
-              <a:rPr lang="en-US" sz="1000" b="1" dirty="0"/>
+              <a:rPr lang="en-US" sz="1200" b="1" dirty="0"/>
               <a:t>display artifact </a:t>
             </a:r>
             <a:r>
-              <a:rPr lang="en-US" sz="1000" dirty="0"/>
+              <a:rPr lang="en-US" sz="1200" dirty="0"/>
               <a:t>from </a:t>
             </a:r>
             <a:r>
-              <a:rPr lang="en-US" sz="1000" dirty="0" err="1"/>
+              <a:rPr lang="en-US" sz="1200" dirty="0" err="1"/>
               <a:t>Navigator.js</a:t>
             </a:r>
             <a:r>
-              <a:rPr lang="en-US" sz="1000" dirty="0"/>
+              <a:rPr lang="en-US" sz="1200" dirty="0"/>
               <a:t> / </a:t>
             </a:r>
             <a:r>
-              <a:rPr lang="en-US" sz="1000" dirty="0" err="1"/>
+              <a:rPr lang="en-US" sz="1200" dirty="0" err="1"/>
               <a:t>RightBar.js</a:t>
             </a:r>
             <a:r>
-              <a:rPr lang="en-US" sz="1000" dirty="0"/>
+              <a:rPr lang="en-US" sz="1200" dirty="0"/>
               <a:t> (</a:t>
             </a:r>
             <a:r>
-              <a:rPr lang="en-US" sz="1000" dirty="0" err="1"/>
+              <a:rPr lang="en-US" sz="1200" dirty="0" err="1"/>
               <a:t>clickHandler</a:t>
             </a:r>
             <a:r>
-              <a:rPr lang="en-US" sz="1000" dirty="0"/>
+              <a:rPr lang="en-US" sz="1200" dirty="0"/>
               <a:t>()) </a:t>
             </a:r>
           </a:p>
@@ -3421,10 +3419,10 @@
       </p:sp>
       <p:sp>
         <p:nvSpPr>
-          <p:cNvPr id="6" name="Rectangle 5">
-            <a:extLst>
-              <a:ext uri="{FF2B5EF4-FFF2-40B4-BE49-F238E27FC236}">
-                <a16:creationId xmlns:a16="http://schemas.microsoft.com/office/drawing/2014/main" id="{DA309BA8-7165-B14F-B7F4-3266500CEE08}"/>
+          <p:cNvPr id="7" name="Rectangle 6">
+            <a:extLst>
+              <a:ext uri="{FF2B5EF4-FFF2-40B4-BE49-F238E27FC236}">
+                <a16:creationId xmlns:a16="http://schemas.microsoft.com/office/drawing/2014/main" id="{0AD8DB73-19B7-1343-8AED-D15E87406307}"/>
               </a:ext>
             </a:extLst>
           </p:cNvPr>
@@ -3433,8 +3431,8 @@
         </p:nvSpPr>
         <p:spPr>
           <a:xfrm>
-            <a:off x="4881203" y="3569963"/>
-            <a:ext cx="1448657" cy="986319"/>
+            <a:off x="7945043" y="4694724"/>
+            <a:ext cx="1805316" cy="1863775"/>
           </a:xfrm>
           <a:prstGeom prst="rect">
             <a:avLst/>
@@ -3465,18 +3463,26 @@
           <a:p>
             <a:pPr algn="ctr"/>
             <a:r>
-              <a:rPr lang="en-US" sz="1000" dirty="0"/>
-              <a:t>Handler to delete initial blank node. </a:t>
-            </a:r>
-          </a:p>
-        </p:txBody>
-      </p:sp>
-      <p:sp>
-        <p:nvSpPr>
-          <p:cNvPr id="7" name="Rectangle 6">
-            <a:extLst>
-              <a:ext uri="{FF2B5EF4-FFF2-40B4-BE49-F238E27FC236}">
-                <a16:creationId xmlns:a16="http://schemas.microsoft.com/office/drawing/2014/main" id="{0AD8DB73-19B7-1343-8AED-D15E87406307}"/>
+              <a:rPr lang="en-US" sz="1200" dirty="0"/>
+              <a:t>Add new node to </a:t>
+            </a:r>
+            <a:r>
+              <a:rPr lang="en-US" sz="1200" dirty="0" err="1"/>
+              <a:t>graphData</a:t>
+            </a:r>
+            <a:r>
+              <a:rPr lang="en-US" sz="1200" dirty="0"/>
+              <a:t> </a:t>
+            </a:r>
+          </a:p>
+        </p:txBody>
+      </p:sp>
+      <p:sp>
+        <p:nvSpPr>
+          <p:cNvPr id="8" name="Rectangle 7">
+            <a:extLst>
+              <a:ext uri="{FF2B5EF4-FFF2-40B4-BE49-F238E27FC236}">
+                <a16:creationId xmlns:a16="http://schemas.microsoft.com/office/drawing/2014/main" id="{D40B4ECE-AA38-EC4A-ACE8-4CBDFFA72C7A}"/>
               </a:ext>
             </a:extLst>
           </p:cNvPr>
@@ -3485,8 +3491,8 @@
         </p:nvSpPr>
         <p:spPr>
           <a:xfrm>
-            <a:off x="4871742" y="5137269"/>
-            <a:ext cx="1448657" cy="986319"/>
+            <a:off x="7945043" y="2403280"/>
+            <a:ext cx="1805316" cy="1863775"/>
           </a:xfrm>
           <a:prstGeom prst="rect">
             <a:avLst/>
@@ -3517,26 +3523,34 @@
           <a:p>
             <a:pPr algn="ctr"/>
             <a:r>
-              <a:rPr lang="en-US" sz="1000" dirty="0"/>
-              <a:t>Add new node to </a:t>
-            </a:r>
-            <a:r>
-              <a:rPr lang="en-US" sz="1000" dirty="0" err="1"/>
-              <a:t>graphData</a:t>
-            </a:r>
-            <a:r>
-              <a:rPr lang="en-US" sz="1000" dirty="0"/>
-              <a:t> </a:t>
-            </a:r>
-          </a:p>
-        </p:txBody>
-      </p:sp>
-      <p:sp>
-        <p:nvSpPr>
-          <p:cNvPr id="8" name="Rectangle 7">
-            <a:extLst>
-              <a:ext uri="{FF2B5EF4-FFF2-40B4-BE49-F238E27FC236}">
-                <a16:creationId xmlns:a16="http://schemas.microsoft.com/office/drawing/2014/main" id="{D40B4ECE-AA38-EC4A-ACE8-4CBDFFA72C7A}"/>
+              <a:rPr lang="en-US" sz="1200" dirty="0"/>
+              <a:t>Create </a:t>
+            </a:r>
+            <a:r>
+              <a:rPr lang="en-US" sz="1200" b="1" dirty="0"/>
+              <a:t>edges</a:t>
+            </a:r>
+            <a:r>
+              <a:rPr lang="en-US" sz="1200" dirty="0"/>
+              <a:t> (</a:t>
+            </a:r>
+            <a:r>
+              <a:rPr lang="en-US" sz="1200" dirty="0" err="1"/>
+              <a:t>createLinkage</a:t>
+            </a:r>
+            <a:r>
+              <a:rPr lang="en-US" sz="1200" dirty="0"/>
+              <a:t>(), line 197)</a:t>
+            </a:r>
+          </a:p>
+        </p:txBody>
+      </p:sp>
+      <p:sp>
+        <p:nvSpPr>
+          <p:cNvPr id="10" name="Oval 9">
+            <a:extLst>
+              <a:ext uri="{FF2B5EF4-FFF2-40B4-BE49-F238E27FC236}">
+                <a16:creationId xmlns:a16="http://schemas.microsoft.com/office/drawing/2014/main" id="{42BE663B-D47D-B640-B68F-3A5F63D78A8F}"/>
               </a:ext>
             </a:extLst>
           </p:cNvPr>
@@ -3545,68 +3559,8 @@
         </p:nvSpPr>
         <p:spPr>
           <a:xfrm>
-            <a:off x="7628081" y="5137269"/>
-            <a:ext cx="1448657" cy="986319"/>
-          </a:xfrm>
-          <a:prstGeom prst="rect">
-            <a:avLst/>
-          </a:prstGeom>
-          <a:solidFill>
-            <a:schemeClr val="accent1"/>
-          </a:solidFill>
-        </p:spPr>
-        <p:style>
-          <a:lnRef idx="2">
-            <a:schemeClr val="accent1">
-              <a:shade val="50000"/>
-            </a:schemeClr>
-          </a:lnRef>
-          <a:fillRef idx="1">
-            <a:schemeClr val="accent1"/>
-          </a:fillRef>
-          <a:effectRef idx="0">
-            <a:schemeClr val="accent1"/>
-          </a:effectRef>
-          <a:fontRef idx="minor">
-            <a:schemeClr val="lt1"/>
-          </a:fontRef>
-        </p:style>
-        <p:txBody>
-          <a:bodyPr rtlCol="0" anchor="ctr"/>
-          <a:lstStyle/>
-          <a:p>
-            <a:pPr algn="ctr"/>
-            <a:r>
-              <a:rPr lang="en-US" sz="1000" dirty="0"/>
-              <a:t>Create edges (</a:t>
-            </a:r>
-            <a:r>
-              <a:rPr lang="en-US" sz="1000" dirty="0" err="1"/>
-              <a:t>createLinkage</a:t>
-            </a:r>
-            <a:r>
-              <a:rPr lang="en-US" sz="1000" dirty="0"/>
-              <a:t>(), line 99)</a:t>
-            </a:r>
-          </a:p>
-        </p:txBody>
-      </p:sp>
-      <p:sp>
-        <p:nvSpPr>
-          <p:cNvPr id="10" name="Oval 9">
-            <a:extLst>
-              <a:ext uri="{FF2B5EF4-FFF2-40B4-BE49-F238E27FC236}">
-                <a16:creationId xmlns:a16="http://schemas.microsoft.com/office/drawing/2014/main" id="{42BE663B-D47D-B640-B68F-3A5F63D78A8F}"/>
-              </a:ext>
-            </a:extLst>
-          </p:cNvPr>
-          <p:cNvSpPr/>
-          <p:nvPr/>
-        </p:nvSpPr>
-        <p:spPr>
-          <a:xfrm>
-            <a:off x="7674315" y="3348189"/>
-            <a:ext cx="1356188" cy="1243174"/>
+            <a:off x="7945043" y="320731"/>
+            <a:ext cx="1805316" cy="1654885"/>
           </a:xfrm>
           <a:prstGeom prst="ellipse">
             <a:avLst/>
@@ -3635,23 +3589,23 @@
           <a:p>
             <a:pPr algn="ctr"/>
             <a:r>
-              <a:rPr lang="en-US" sz="1000" dirty="0"/>
+              <a:rPr lang="en-US" sz="1200" dirty="0"/>
               <a:t>Save new node and edges (</a:t>
             </a:r>
             <a:r>
-              <a:rPr lang="en-US" sz="1000" dirty="0" err="1"/>
+              <a:rPr lang="en-US" sz="1200" dirty="0" err="1"/>
               <a:t>graphData</a:t>
             </a:r>
             <a:r>
-              <a:rPr lang="en-US" sz="1000" dirty="0"/>
+              <a:rPr lang="en-US" sz="1200" dirty="0"/>
               <a:t>) to </a:t>
             </a:r>
             <a:r>
-              <a:rPr lang="en-US" sz="1000" dirty="0" err="1"/>
+              <a:rPr lang="en-US" sz="1200" dirty="0" err="1"/>
               <a:t>sessionStorage</a:t>
             </a:r>
             <a:r>
-              <a:rPr lang="en-US" sz="1000" dirty="0"/>
+              <a:rPr lang="en-US" sz="1200" dirty="0"/>
               <a:t> </a:t>
             </a:r>
           </a:p>
@@ -3675,8 +3629,8 @@
         </p:nvCxnSpPr>
         <p:spPr>
           <a:xfrm>
-            <a:off x="5600801" y="1574885"/>
-            <a:ext cx="4696" cy="383413"/>
+            <a:off x="6387411" y="1975617"/>
+            <a:ext cx="0" cy="427663"/>
           </a:xfrm>
           <a:prstGeom prst="straightConnector1">
             <a:avLst/>
@@ -3712,14 +3666,13 @@
           <p:cNvCxnSpPr>
             <a:cxnSpLocks/>
             <a:stCxn id="28" idx="2"/>
-            <a:endCxn id="6" idx="0"/>
           </p:cNvCxnSpPr>
           <p:nvPr/>
         </p:nvCxnSpPr>
         <p:spPr>
-          <a:xfrm>
-            <a:off x="5605497" y="2944617"/>
-            <a:ext cx="35" cy="625346"/>
+          <a:xfrm flipV="1">
+            <a:off x="6387411" y="3893007"/>
+            <a:ext cx="0" cy="374048"/>
           </a:xfrm>
           <a:prstGeom prst="straightConnector1">
             <a:avLst/>
@@ -3754,14 +3707,15 @@
           </p:cNvPr>
           <p:cNvCxnSpPr>
             <a:cxnSpLocks/>
-            <a:endCxn id="7" idx="0"/>
+            <a:stCxn id="28" idx="2"/>
+            <a:endCxn id="16" idx="0"/>
           </p:cNvCxnSpPr>
           <p:nvPr/>
         </p:nvCxnSpPr>
         <p:spPr>
           <a:xfrm>
-            <a:off x="5596070" y="4591363"/>
-            <a:ext cx="1" cy="545906"/>
+            <a:off x="6387411" y="4267055"/>
+            <a:ext cx="1038" cy="427668"/>
           </a:xfrm>
           <a:prstGeom prst="straightConnector1">
             <a:avLst/>
@@ -3796,15 +3750,15 @@
           </p:cNvPr>
           <p:cNvCxnSpPr>
             <a:cxnSpLocks/>
-            <a:stCxn id="7" idx="3"/>
-            <a:endCxn id="8" idx="1"/>
+            <a:stCxn id="7" idx="0"/>
+            <a:endCxn id="8" idx="2"/>
           </p:cNvCxnSpPr>
           <p:nvPr/>
         </p:nvCxnSpPr>
         <p:spPr>
-          <a:xfrm>
-            <a:off x="6320399" y="5630429"/>
-            <a:ext cx="1307682" cy="0"/>
+          <a:xfrm flipV="1">
+            <a:off x="8847701" y="4267055"/>
+            <a:ext cx="0" cy="427669"/>
           </a:xfrm>
           <a:prstGeom prst="straightConnector1">
             <a:avLst/>
@@ -3840,13 +3794,14 @@
           <p:cNvCxnSpPr>
             <a:cxnSpLocks/>
             <a:stCxn id="8" idx="0"/>
+            <a:endCxn id="10" idx="4"/>
           </p:cNvCxnSpPr>
           <p:nvPr/>
         </p:nvCxnSpPr>
         <p:spPr>
           <a:xfrm flipV="1">
-            <a:off x="8352410" y="4556282"/>
-            <a:ext cx="0" cy="580987"/>
+            <a:off x="8847701" y="1975616"/>
+            <a:ext cx="0" cy="427664"/>
           </a:xfrm>
           <a:prstGeom prst="straightConnector1">
             <a:avLst/>
@@ -3889,7 +3844,7 @@
         <p:spPr>
           <a:xfrm>
             <a:off x="252919" y="1123837"/>
-            <a:ext cx="2947482" cy="4601183"/>
+            <a:ext cx="4576860" cy="4601183"/>
           </a:xfrm>
         </p:spPr>
         <p:txBody>
@@ -3908,18 +3863,46 @@
               <a:rPr lang="en-US" dirty="0"/>
             </a:br>
             <a:r>
-              <a:rPr lang="en-US" sz="2400" dirty="0"/>
+              <a:rPr lang="en-US" sz="2400" dirty="0">
+                <a:solidFill>
+                  <a:schemeClr val="tx1">
+                    <a:lumMod val="50000"/>
+                    <a:lumOff val="50000"/>
+                  </a:schemeClr>
+                </a:solidFill>
+              </a:rPr>
               <a:t>[</a:t>
             </a:r>
             <a:r>
-              <a:rPr lang="en-US" sz="2400" dirty="0" err="1"/>
+              <a:rPr lang="en-US" sz="2400" dirty="0" err="1">
+                <a:solidFill>
+                  <a:schemeClr val="tx1">
+                    <a:lumMod val="50000"/>
+                    <a:lumOff val="50000"/>
+                  </a:schemeClr>
+                </a:solidFill>
+              </a:rPr>
               <a:t>UserNexusModel.js</a:t>
             </a:r>
             <a:r>
-              <a:rPr lang="en-US" sz="2400" dirty="0"/>
-              <a:t>, line 80]</a:t>
-            </a:r>
-            <a:endParaRPr lang="en-US" dirty="0"/>
+              <a:rPr lang="en-US" sz="2400" dirty="0">
+                <a:solidFill>
+                  <a:schemeClr val="tx1">
+                    <a:lumMod val="50000"/>
+                    <a:lumOff val="50000"/>
+                  </a:schemeClr>
+                </a:solidFill>
+              </a:rPr>
+              <a:t>, lines 284-321]</a:t>
+            </a:r>
+            <a:endParaRPr lang="en-US" dirty="0">
+              <a:solidFill>
+                <a:schemeClr val="tx1">
+                  <a:lumMod val="50000"/>
+                  <a:lumOff val="50000"/>
+                </a:schemeClr>
+              </a:solidFill>
+            </a:endParaRPr>
           </a:p>
         </p:txBody>
       </p:sp>
@@ -3937,8 +3920,8 @@
         </p:nvSpPr>
         <p:spPr>
           <a:xfrm>
-            <a:off x="4732512" y="1958298"/>
-            <a:ext cx="1745970" cy="986319"/>
+            <a:off x="5484753" y="2403280"/>
+            <a:ext cx="1805316" cy="1863775"/>
           </a:xfrm>
           <a:prstGeom prst="rect">
             <a:avLst/>
@@ -3969,40 +3952,135 @@
           <a:p>
             <a:pPr algn="ctr"/>
             <a:r>
-              <a:rPr lang="en-US" sz="1000" dirty="0"/>
+              <a:rPr lang="en-US" sz="1200" dirty="0"/>
               <a:t>Create </a:t>
             </a:r>
             <a:r>
-              <a:rPr lang="en-US" sz="1000" b="1" dirty="0"/>
+              <a:rPr lang="en-US" sz="1200" b="1" dirty="0"/>
               <a:t>node object</a:t>
             </a:r>
             <a:r>
-              <a:rPr lang="en-US" sz="1000" dirty="0"/>
+              <a:rPr lang="en-US" sz="1200" dirty="0"/>
               <a:t>, </a:t>
             </a:r>
           </a:p>
           <a:p>
             <a:pPr algn="ctr"/>
             <a:r>
-              <a:rPr lang="en-US" sz="1000" b="1" dirty="0" err="1"/>
+              <a:rPr lang="en-US" sz="1200" b="1" dirty="0" err="1"/>
               <a:t>graphData</a:t>
             </a:r>
             <a:r>
-              <a:rPr lang="en-US" sz="1000" dirty="0"/>
+              <a:rPr lang="en-US" sz="1200" dirty="0"/>
               <a:t>, and </a:t>
             </a:r>
             <a:r>
-              <a:rPr lang="en-US" sz="1000" b="1" dirty="0" err="1"/>
+              <a:rPr lang="en-US" sz="1200" b="1" dirty="0" err="1"/>
               <a:t>nodeCategories</a:t>
             </a:r>
-            <a:endParaRPr lang="en-US" sz="1000" dirty="0"/>
-          </a:p>
-        </p:txBody>
-      </p:sp>
+            <a:endParaRPr lang="en-US" sz="1200" dirty="0"/>
+          </a:p>
+        </p:txBody>
+      </p:sp>
+      <p:sp>
+        <p:nvSpPr>
+          <p:cNvPr id="16" name="Rectangle 15">
+            <a:extLst>
+              <a:ext uri="{FF2B5EF4-FFF2-40B4-BE49-F238E27FC236}">
+                <a16:creationId xmlns:a16="http://schemas.microsoft.com/office/drawing/2014/main" id="{9E624CA3-BE85-9249-B4BA-A86A46FD4793}"/>
+              </a:ext>
+            </a:extLst>
+          </p:cNvPr>
+          <p:cNvSpPr/>
+          <p:nvPr/>
+        </p:nvSpPr>
+        <p:spPr>
+          <a:xfrm>
+            <a:off x="5485791" y="4694723"/>
+            <a:ext cx="1805316" cy="1863775"/>
+          </a:xfrm>
+          <a:prstGeom prst="rect">
+            <a:avLst/>
+          </a:prstGeom>
+          <a:solidFill>
+            <a:schemeClr val="accent1"/>
+          </a:solidFill>
+        </p:spPr>
+        <p:style>
+          <a:lnRef idx="2">
+            <a:schemeClr val="accent1">
+              <a:shade val="50000"/>
+            </a:schemeClr>
+          </a:lnRef>
+          <a:fillRef idx="1">
+            <a:schemeClr val="accent1"/>
+          </a:fillRef>
+          <a:effectRef idx="0">
+            <a:schemeClr val="accent1"/>
+          </a:effectRef>
+          <a:fontRef idx="minor">
+            <a:schemeClr val="lt1"/>
+          </a:fontRef>
+        </p:style>
+        <p:txBody>
+          <a:bodyPr rtlCol="0" anchor="ctr"/>
+          <a:lstStyle/>
+          <a:p>
+            <a:pPr algn="ctr"/>
+            <a:r>
+              <a:rPr lang="en-US" sz="1200" dirty="0"/>
+              <a:t>Delete the initial blank node, if it is still present</a:t>
+            </a:r>
+          </a:p>
+        </p:txBody>
+      </p:sp>
+      <p:cxnSp>
+        <p:nvCxnSpPr>
+          <p:cNvPr id="9" name="Straight Arrow Connector 8">
+            <a:extLst>
+              <a:ext uri="{FF2B5EF4-FFF2-40B4-BE49-F238E27FC236}">
+                <a16:creationId xmlns:a16="http://schemas.microsoft.com/office/drawing/2014/main" id="{1975C475-D480-5D40-9812-04312DEB111A}"/>
+              </a:ext>
+            </a:extLst>
+          </p:cNvPr>
+          <p:cNvCxnSpPr>
+            <a:cxnSpLocks/>
+            <a:stCxn id="16" idx="3"/>
+            <a:endCxn id="7" idx="1"/>
+          </p:cNvCxnSpPr>
+          <p:nvPr/>
+        </p:nvCxnSpPr>
+        <p:spPr>
+          <a:xfrm>
+            <a:off x="7291107" y="5626611"/>
+            <a:ext cx="653936" cy="1"/>
+          </a:xfrm>
+          <a:prstGeom prst="straightConnector1">
+            <a:avLst/>
+          </a:prstGeom>
+          <a:ln>
+            <a:tailEnd type="triangle"/>
+          </a:ln>
+        </p:spPr>
+        <p:style>
+          <a:lnRef idx="1">
+            <a:schemeClr val="accent1"/>
+          </a:lnRef>
+          <a:fillRef idx="0">
+            <a:schemeClr val="accent1"/>
+          </a:fillRef>
+          <a:effectRef idx="0">
+            <a:schemeClr val="accent1"/>
+          </a:effectRef>
+          <a:fontRef idx="minor">
+            <a:schemeClr val="tx1"/>
+          </a:fontRef>
+        </p:style>
+      </p:cxnSp>
     </p:spTree>
     <p:extLst>
       <p:ext uri="{BB962C8B-B14F-4D97-AF65-F5344CB8AC3E}">
-        <p14:creationId xmlns:p14="http://schemas.microsoft.com/office/powerpoint/2010/main" val="1229718845"/>
+        <p14:creationId xmlns:p14="http://schemas.microsoft.com/office/powerpoint/2010/main" val="2641382095"/>
       </p:ext>
     </p:extLst>
   </p:cSld>
@@ -4047,14 +4125,68 @@
         </p:nvSpPr>
         <p:spPr>
           <a:xfrm>
-            <a:off x="252919" y="1123837"/>
-            <a:ext cx="2947482" cy="4601183"/>
+            <a:off x="252918" y="1123837"/>
+            <a:ext cx="4585014" cy="4601183"/>
           </a:xfrm>
         </p:spPr>
         <p:txBody>
           <a:bodyPr/>
           <a:lstStyle/>
           <a:p>
+            <a:r>
+              <a:rPr lang="en-US" sz="3200" dirty="0" err="1"/>
+              <a:t>createPrimaryLinkages</a:t>
+            </a:r>
+            <a:r>
+              <a:rPr lang="en-US" sz="3200" dirty="0"/>
+              <a:t>()</a:t>
+            </a:r>
+            <a:br>
+              <a:rPr lang="en-US" sz="3200" dirty="0"/>
+            </a:br>
+            <a:r>
+              <a:rPr lang="en-US" sz="2400" dirty="0">
+                <a:solidFill>
+                  <a:schemeClr val="tx1">
+                    <a:lumMod val="50000"/>
+                    <a:lumOff val="50000"/>
+                  </a:schemeClr>
+                </a:solidFill>
+              </a:rPr>
+              <a:t>[</a:t>
+            </a:r>
+            <a:r>
+              <a:rPr lang="en-US" sz="2400" dirty="0" err="1">
+                <a:solidFill>
+                  <a:schemeClr val="tx1">
+                    <a:lumMod val="50000"/>
+                    <a:lumOff val="50000"/>
+                  </a:schemeClr>
+                </a:solidFill>
+              </a:rPr>
+              <a:t>UserNexusModel.js</a:t>
+            </a:r>
+            <a:r>
+              <a:rPr lang="en-US" sz="2400" dirty="0">
+                <a:solidFill>
+                  <a:schemeClr val="tx1">
+                    <a:lumMod val="50000"/>
+                    <a:lumOff val="50000"/>
+                  </a:schemeClr>
+                </a:solidFill>
+              </a:rPr>
+              <a:t>, lines 76-189]</a:t>
+            </a:r>
+            <a:br>
+              <a:rPr lang="en-US" sz="3200" dirty="0"/>
+            </a:br>
+            <a:r>
+              <a:rPr lang="en-US" sz="3200" dirty="0"/>
+              <a:t>and</a:t>
+            </a:r>
+            <a:br>
+              <a:rPr lang="en-US" sz="3200" dirty="0"/>
+            </a:br>
             <a:r>
               <a:rPr lang="en-US" sz="3200" dirty="0" err="1"/>
               <a:t>createLinkage</a:t>
@@ -4067,18 +4199,46 @@
               <a:rPr lang="en-US" dirty="0"/>
             </a:br>
             <a:r>
-              <a:rPr lang="en-US" sz="2400" dirty="0"/>
+              <a:rPr lang="en-US" sz="2400" dirty="0">
+                <a:solidFill>
+                  <a:schemeClr val="tx1">
+                    <a:lumMod val="50000"/>
+                    <a:lumOff val="50000"/>
+                  </a:schemeClr>
+                </a:solidFill>
+              </a:rPr>
               <a:t>[</a:t>
             </a:r>
             <a:r>
-              <a:rPr lang="en-US" sz="2400" dirty="0" err="1"/>
+              <a:rPr lang="en-US" sz="2400" dirty="0" err="1">
+                <a:solidFill>
+                  <a:schemeClr val="tx1">
+                    <a:lumMod val="50000"/>
+                    <a:lumOff val="50000"/>
+                  </a:schemeClr>
+                </a:solidFill>
+              </a:rPr>
               <a:t>UserNexusModel.js</a:t>
             </a:r>
             <a:r>
-              <a:rPr lang="en-US" sz="2400" dirty="0"/>
-              <a:t>, line 153]</a:t>
-            </a:r>
-            <a:endParaRPr lang="en-US" dirty="0"/>
+              <a:rPr lang="en-US" sz="2400" dirty="0">
+                <a:solidFill>
+                  <a:schemeClr val="tx1">
+                    <a:lumMod val="50000"/>
+                    <a:lumOff val="50000"/>
+                  </a:schemeClr>
+                </a:solidFill>
+              </a:rPr>
+              <a:t>, lines 197-239]</a:t>
+            </a:r>
+            <a:endParaRPr lang="en-US" dirty="0">
+              <a:solidFill>
+                <a:schemeClr val="tx1">
+                  <a:lumMod val="50000"/>
+                  <a:lumOff val="50000"/>
+                </a:schemeClr>
+              </a:solidFill>
+            </a:endParaRPr>
           </a:p>
         </p:txBody>
       </p:sp>
@@ -4096,8 +4256,8 @@
         </p:nvSpPr>
         <p:spPr>
           <a:xfrm>
-            <a:off x="4881203" y="216816"/>
-            <a:ext cx="1439196" cy="1358069"/>
+            <a:off x="5478150" y="293792"/>
+            <a:ext cx="1966997" cy="1856118"/>
           </a:xfrm>
           <a:prstGeom prst="ellipse">
             <a:avLst/>
@@ -4130,7 +4290,7 @@
           <a:p>
             <a:pPr algn="ctr"/>
             <a:r>
-              <a:rPr lang="en-US" sz="1000" dirty="0"/>
+              <a:rPr lang="en-US" sz="1200" dirty="0"/>
               <a:t>New node requires new linkages to be made</a:t>
             </a:r>
           </a:p>
@@ -4150,8 +4310,8 @@
         </p:nvSpPr>
         <p:spPr>
           <a:xfrm>
-            <a:off x="4871741" y="3569963"/>
-            <a:ext cx="1448657" cy="986319"/>
+            <a:off x="5558990" y="4597120"/>
+            <a:ext cx="1805316" cy="1863775"/>
           </a:xfrm>
           <a:prstGeom prst="rect">
             <a:avLst/>
@@ -4182,8 +4342,8 @@
           <a:p>
             <a:pPr algn="ctr"/>
             <a:r>
-              <a:rPr lang="en-US" sz="1000" dirty="0"/>
-              <a:t>Initialize and create lists of display artifact id’s that are currently in the network graph [lines 297-299]</a:t>
+              <a:rPr lang="en-US" sz="1200" dirty="0"/>
+              <a:t>2. Initialize and create lists of display artifact id’s that are currently in the network graph [lines 164-169]</a:t>
             </a:r>
           </a:p>
         </p:txBody>
@@ -4202,8 +4362,8 @@
         </p:nvSpPr>
         <p:spPr>
           <a:xfrm>
-            <a:off x="4732512" y="5137269"/>
-            <a:ext cx="1745970" cy="986319"/>
+            <a:off x="7776334" y="4597119"/>
+            <a:ext cx="1805316" cy="1863776"/>
           </a:xfrm>
           <a:prstGeom prst="rect">
             <a:avLst/>
@@ -4234,16 +4394,23 @@
           <a:p>
             <a:pPr algn="ctr"/>
             <a:r>
-              <a:rPr lang="en-US" sz="1000" dirty="0"/>
-              <a:t>Create lists of shared display artifact id’s as matching nodes (</a:t>
-            </a:r>
-            <a:r>
-              <a:rPr lang="en-US" sz="1000" dirty="0" err="1"/>
-              <a:t>matchNode</a:t>
-            </a:r>
-            <a:r>
-              <a:rPr lang="en-US" sz="1000" dirty="0"/>
-              <a:t>). If they are shared then will be used to create link/edge object later [lines 301-308]</a:t>
+              <a:rPr lang="en-US" sz="1200" dirty="0"/>
+              <a:t>3. Create a list of matching nodes as the id’s associated with </a:t>
+            </a:r>
+            <a:r>
+              <a:rPr lang="en-US" sz="1200" dirty="0" err="1"/>
+              <a:t>newNode</a:t>
+            </a:r>
+            <a:r>
+              <a:rPr lang="en-US" sz="1200" dirty="0"/>
+              <a:t> that are already on the network graph.</a:t>
+            </a:r>
+          </a:p>
+          <a:p>
+            <a:pPr algn="ctr"/>
+            <a:r>
+              <a:rPr lang="en-US" sz="1200" dirty="0"/>
+              <a:t>[lines 172-182]</a:t>
             </a:r>
           </a:p>
         </p:txBody>
@@ -4262,8 +4429,8 @@
         </p:nvSpPr>
         <p:spPr>
           <a:xfrm>
-            <a:off x="7396486" y="5137269"/>
-            <a:ext cx="1911845" cy="986319"/>
+            <a:off x="7776334" y="2429213"/>
+            <a:ext cx="1805316" cy="1863775"/>
           </a:xfrm>
           <a:prstGeom prst="rect">
             <a:avLst/>
@@ -4294,32 +4461,16 @@
           <a:p>
             <a:pPr algn="ctr"/>
             <a:r>
-              <a:rPr lang="en-US" sz="1000" dirty="0"/>
-              <a:t>Create link/edge object with id of </a:t>
-            </a:r>
-            <a:r>
-              <a:rPr lang="en-US" sz="1000" dirty="0" err="1"/>
+              <a:rPr lang="en-US" sz="1200" dirty="0"/>
+              <a:t>4. Create link/edge objects with id of </a:t>
+            </a:r>
+            <a:r>
+              <a:rPr lang="en-US" sz="1200" dirty="0" err="1"/>
               <a:t>newNode</a:t>
             </a:r>
             <a:r>
-              <a:rPr lang="en-US" sz="1000" dirty="0"/>
-              <a:t> (source), id of </a:t>
-            </a:r>
-            <a:r>
-              <a:rPr lang="en-US" sz="1000" dirty="0" err="1"/>
-              <a:t>matchNode</a:t>
-            </a:r>
-            <a:r>
-              <a:rPr lang="en-US" sz="1000" dirty="0"/>
-              <a:t> (target), and if both source and target nodes are the same type, what is the intermediary </a:t>
-            </a:r>
-            <a:r>
-              <a:rPr lang="en-US" sz="1000" dirty="0" err="1"/>
-              <a:t>linkNode</a:t>
-            </a:r>
-            <a:r>
-              <a:rPr lang="en-US" sz="1000" dirty="0"/>
-              <a:t> [lines 315-356]</a:t>
+              <a:rPr lang="en-US" sz="1200" dirty="0"/>
+              <a:t> (source) and id of the matching node (target) [lines 199-208]</a:t>
             </a:r>
           </a:p>
         </p:txBody>
@@ -4338,8 +4489,8 @@
         </p:nvSpPr>
         <p:spPr>
           <a:xfrm>
-            <a:off x="7674315" y="3348189"/>
-            <a:ext cx="1356188" cy="1243174"/>
+            <a:off x="9803692" y="2509621"/>
+            <a:ext cx="2024854" cy="1856118"/>
           </a:xfrm>
           <a:prstGeom prst="ellipse">
             <a:avLst/>
@@ -4368,23 +4519,23 @@
           <a:p>
             <a:pPr algn="ctr"/>
             <a:r>
-              <a:rPr lang="en-US" sz="1000" dirty="0"/>
+              <a:rPr lang="en-US" sz="1200" dirty="0"/>
               <a:t>Save new node and edges (</a:t>
             </a:r>
             <a:r>
-              <a:rPr lang="en-US" sz="1000" dirty="0" err="1"/>
+              <a:rPr lang="en-US" sz="1200" dirty="0" err="1"/>
               <a:t>graphData</a:t>
             </a:r>
             <a:r>
-              <a:rPr lang="en-US" sz="1000" dirty="0"/>
+              <a:rPr lang="en-US" sz="1200" dirty="0"/>
               <a:t>) to </a:t>
             </a:r>
             <a:r>
-              <a:rPr lang="en-US" sz="1000" dirty="0" err="1"/>
+              <a:rPr lang="en-US" sz="1200" dirty="0" err="1"/>
               <a:t>sessionStorage</a:t>
             </a:r>
             <a:r>
-              <a:rPr lang="en-US" sz="1000" dirty="0"/>
+              <a:rPr lang="en-US" sz="1200" dirty="0"/>
               <a:t> </a:t>
             </a:r>
           </a:p>
@@ -4408,8 +4559,8 @@
         </p:nvCxnSpPr>
         <p:spPr>
           <a:xfrm>
-            <a:off x="5600801" y="1574885"/>
-            <a:ext cx="4696" cy="383413"/>
+            <a:off x="6461649" y="2149910"/>
+            <a:ext cx="0" cy="279303"/>
           </a:xfrm>
           <a:prstGeom prst="straightConnector1">
             <a:avLst/>
@@ -4451,8 +4602,8 @@
         </p:nvCxnSpPr>
         <p:spPr>
           <a:xfrm flipH="1">
-            <a:off x="5596070" y="2944617"/>
-            <a:ext cx="9427" cy="625346"/>
+            <a:off x="6461648" y="4292988"/>
+            <a:ext cx="1" cy="304132"/>
           </a:xfrm>
           <a:prstGeom prst="straightConnector1">
             <a:avLst/>
@@ -4487,14 +4638,15 @@
           </p:cNvPr>
           <p:cNvCxnSpPr>
             <a:cxnSpLocks/>
-            <a:endCxn id="6" idx="0"/>
+            <a:stCxn id="5" idx="3"/>
+            <a:endCxn id="6" idx="1"/>
           </p:cNvCxnSpPr>
           <p:nvPr/>
         </p:nvCxnSpPr>
         <p:spPr>
-          <a:xfrm>
-            <a:off x="5596070" y="4591363"/>
-            <a:ext cx="9427" cy="545906"/>
+          <a:xfrm flipV="1">
+            <a:off x="7364306" y="5529007"/>
+            <a:ext cx="412028" cy="1"/>
           </a:xfrm>
           <a:prstGeom prst="straightConnector1">
             <a:avLst/>
@@ -4529,15 +4681,15 @@
           </p:cNvPr>
           <p:cNvCxnSpPr>
             <a:cxnSpLocks/>
-            <a:stCxn id="6" idx="3"/>
-            <a:endCxn id="7" idx="1"/>
+            <a:stCxn id="6" idx="0"/>
+            <a:endCxn id="7" idx="2"/>
           </p:cNvCxnSpPr>
           <p:nvPr/>
         </p:nvCxnSpPr>
         <p:spPr>
-          <a:xfrm>
-            <a:off x="6478482" y="5630429"/>
-            <a:ext cx="918004" cy="0"/>
+          <a:xfrm flipV="1">
+            <a:off x="8678992" y="4292988"/>
+            <a:ext cx="0" cy="304131"/>
           </a:xfrm>
           <a:prstGeom prst="straightConnector1">
             <a:avLst/>
@@ -4573,14 +4725,14 @@
           <p:cNvCxnSpPr>
             <a:cxnSpLocks/>
             <a:stCxn id="7" idx="0"/>
-            <a:endCxn id="8" idx="4"/>
+            <a:endCxn id="121" idx="2"/>
           </p:cNvCxnSpPr>
           <p:nvPr/>
         </p:nvCxnSpPr>
         <p:spPr>
           <a:xfrm flipV="1">
-            <a:off x="8352409" y="4591363"/>
-            <a:ext cx="0" cy="545906"/>
+            <a:off x="8678992" y="2132738"/>
+            <a:ext cx="0" cy="296475"/>
           </a:xfrm>
           <a:prstGeom prst="straightConnector1">
             <a:avLst/>
@@ -4618,8 +4770,8 @@
         </p:nvSpPr>
         <p:spPr>
           <a:xfrm>
-            <a:off x="4732512" y="1958298"/>
-            <a:ext cx="1745970" cy="986319"/>
+            <a:off x="5558991" y="2429213"/>
+            <a:ext cx="1805316" cy="1863775"/>
           </a:xfrm>
           <a:prstGeom prst="rect">
             <a:avLst/>
@@ -4650,20 +4802,248 @@
           <a:p>
             <a:pPr algn="ctr"/>
             <a:r>
-              <a:rPr lang="en-US" sz="1000" dirty="0"/>
-              <a:t>Initialize and create lists of display artifact id’s associated with </a:t>
-            </a:r>
-            <a:r>
-              <a:rPr lang="en-US" sz="1000" dirty="0" err="1"/>
+              <a:rPr lang="en-US" sz="1200" dirty="0"/>
+              <a:t>1. Initialize and create lists of display artifact id’s associated with </a:t>
+            </a:r>
+            <a:r>
+              <a:rPr lang="en-US" sz="1200" dirty="0" err="1"/>
               <a:t>newNode</a:t>
             </a:r>
             <a:r>
-              <a:rPr lang="en-US" sz="1000" dirty="0"/>
-              <a:t> (i.e. list of id’s from all associated people with new Node) [lines 166-295)</a:t>
-            </a:r>
-          </a:p>
-        </p:txBody>
-      </p:sp>
+              <a:rPr lang="en-US" sz="1200" dirty="0"/>
+              <a:t> (i.e. list of id’s from all associated people with new Node) [lines 88-161]</a:t>
+            </a:r>
+          </a:p>
+        </p:txBody>
+      </p:sp>
+      <p:sp>
+        <p:nvSpPr>
+          <p:cNvPr id="121" name="Rectangle 120">
+            <a:extLst>
+              <a:ext uri="{FF2B5EF4-FFF2-40B4-BE49-F238E27FC236}">
+                <a16:creationId xmlns:a16="http://schemas.microsoft.com/office/drawing/2014/main" id="{50A9D975-62CC-314A-85DB-540AD769BF72}"/>
+              </a:ext>
+            </a:extLst>
+          </p:cNvPr>
+          <p:cNvSpPr/>
+          <p:nvPr/>
+        </p:nvSpPr>
+        <p:spPr>
+          <a:xfrm>
+            <a:off x="7776334" y="268963"/>
+            <a:ext cx="1805316" cy="1863775"/>
+          </a:xfrm>
+          <a:prstGeom prst="rect">
+            <a:avLst/>
+          </a:prstGeom>
+          <a:solidFill>
+            <a:schemeClr val="accent1"/>
+          </a:solidFill>
+        </p:spPr>
+        <p:style>
+          <a:lnRef idx="2">
+            <a:schemeClr val="accent1">
+              <a:shade val="50000"/>
+            </a:schemeClr>
+          </a:lnRef>
+          <a:fillRef idx="1">
+            <a:schemeClr val="accent1"/>
+          </a:fillRef>
+          <a:effectRef idx="0">
+            <a:schemeClr val="accent1"/>
+          </a:effectRef>
+          <a:fontRef idx="minor">
+            <a:schemeClr val="lt1"/>
+          </a:fontRef>
+        </p:style>
+        <p:txBody>
+          <a:bodyPr rtlCol="0" anchor="ctr"/>
+          <a:lstStyle/>
+          <a:p>
+            <a:pPr algn="ctr"/>
+            <a:r>
+              <a:rPr lang="en-US" sz="1200" dirty="0"/>
+              <a:t>5. Repeat steps 1-3 for each of the display artifact id’s associated directly with </a:t>
+            </a:r>
+            <a:r>
+              <a:rPr lang="en-US" sz="1200" dirty="0" err="1"/>
+              <a:t>newNode</a:t>
+            </a:r>
+            <a:r>
+              <a:rPr lang="en-US" sz="1200" dirty="0"/>
+              <a:t> to find the matching nodes that are secondary links with </a:t>
+            </a:r>
+            <a:r>
+              <a:rPr lang="en-US" sz="1200" dirty="0" err="1"/>
+              <a:t>newNode</a:t>
+            </a:r>
+            <a:r>
+              <a:rPr lang="en-US" sz="1200" dirty="0"/>
+              <a:t>. [lines 211-219]</a:t>
+            </a:r>
+          </a:p>
+        </p:txBody>
+      </p:sp>
+      <p:cxnSp>
+        <p:nvCxnSpPr>
+          <p:cNvPr id="128" name="Straight Arrow Connector 127">
+            <a:extLst>
+              <a:ext uri="{FF2B5EF4-FFF2-40B4-BE49-F238E27FC236}">
+                <a16:creationId xmlns:a16="http://schemas.microsoft.com/office/drawing/2014/main" id="{C2D56EFC-8A9F-0D4B-A189-E3BB661A8D72}"/>
+              </a:ext>
+            </a:extLst>
+          </p:cNvPr>
+          <p:cNvCxnSpPr>
+            <a:cxnSpLocks/>
+            <a:stCxn id="121" idx="3"/>
+          </p:cNvCxnSpPr>
+          <p:nvPr/>
+        </p:nvCxnSpPr>
+        <p:spPr>
+          <a:xfrm>
+            <a:off x="9581650" y="1200851"/>
+            <a:ext cx="512788" cy="3828"/>
+          </a:xfrm>
+          <a:prstGeom prst="straightConnector1">
+            <a:avLst/>
+          </a:prstGeom>
+          <a:ln>
+            <a:tailEnd type="triangle"/>
+          </a:ln>
+        </p:spPr>
+        <p:style>
+          <a:lnRef idx="1">
+            <a:schemeClr val="accent1"/>
+          </a:lnRef>
+          <a:fillRef idx="0">
+            <a:schemeClr val="accent1"/>
+          </a:fillRef>
+          <a:effectRef idx="0">
+            <a:schemeClr val="accent1"/>
+          </a:effectRef>
+          <a:fontRef idx="minor">
+            <a:schemeClr val="tx1"/>
+          </a:fontRef>
+        </p:style>
+      </p:cxnSp>
+      <p:sp>
+        <p:nvSpPr>
+          <p:cNvPr id="177" name="Rectangle 176">
+            <a:extLst>
+              <a:ext uri="{FF2B5EF4-FFF2-40B4-BE49-F238E27FC236}">
+                <a16:creationId xmlns:a16="http://schemas.microsoft.com/office/drawing/2014/main" id="{EF6CE2A0-216F-6241-A701-FE141A422F97}"/>
+              </a:ext>
+            </a:extLst>
+          </p:cNvPr>
+          <p:cNvSpPr/>
+          <p:nvPr/>
+        </p:nvSpPr>
+        <p:spPr>
+          <a:xfrm>
+            <a:off x="9912838" y="272791"/>
+            <a:ext cx="1805316" cy="1863775"/>
+          </a:xfrm>
+          <a:prstGeom prst="rect">
+            <a:avLst/>
+          </a:prstGeom>
+          <a:solidFill>
+            <a:schemeClr val="accent1"/>
+          </a:solidFill>
+        </p:spPr>
+        <p:style>
+          <a:lnRef idx="2">
+            <a:schemeClr val="accent1">
+              <a:shade val="50000"/>
+            </a:schemeClr>
+          </a:lnRef>
+          <a:fillRef idx="1">
+            <a:schemeClr val="accent1"/>
+          </a:fillRef>
+          <a:effectRef idx="0">
+            <a:schemeClr val="accent1"/>
+          </a:effectRef>
+          <a:fontRef idx="minor">
+            <a:schemeClr val="lt1"/>
+          </a:fontRef>
+        </p:style>
+        <p:txBody>
+          <a:bodyPr rtlCol="0" anchor="ctr"/>
+          <a:lstStyle/>
+          <a:p>
+            <a:pPr algn="ctr"/>
+            <a:r>
+              <a:rPr lang="en-US" sz="1200" dirty="0"/>
+              <a:t>6. Create link/edge objects with id of </a:t>
+            </a:r>
+            <a:r>
+              <a:rPr lang="en-US" sz="1200" dirty="0" err="1"/>
+              <a:t>newNode</a:t>
+            </a:r>
+            <a:r>
+              <a:rPr lang="en-US" sz="1200" dirty="0"/>
+              <a:t> (source), id of the matching secondary node (target), and id of the primary link to </a:t>
+            </a:r>
+            <a:r>
+              <a:rPr lang="en-US" sz="1200" dirty="0" err="1"/>
+              <a:t>newNode</a:t>
+            </a:r>
+            <a:r>
+              <a:rPr lang="en-US" sz="1200" dirty="0"/>
+              <a:t> that connects the two (</a:t>
+            </a:r>
+            <a:r>
+              <a:rPr lang="en-US" sz="1200" dirty="0" err="1"/>
+              <a:t>linkNode</a:t>
+            </a:r>
+            <a:r>
+              <a:rPr lang="en-US" sz="1200" dirty="0"/>
+              <a:t>) [lines 221-231]</a:t>
+            </a:r>
+          </a:p>
+        </p:txBody>
+      </p:sp>
+      <p:cxnSp>
+        <p:nvCxnSpPr>
+          <p:cNvPr id="181" name="Straight Arrow Connector 180">
+            <a:extLst>
+              <a:ext uri="{FF2B5EF4-FFF2-40B4-BE49-F238E27FC236}">
+                <a16:creationId xmlns:a16="http://schemas.microsoft.com/office/drawing/2014/main" id="{9FFDD4EB-94BD-EE46-83CD-FB4A02E30DA6}"/>
+              </a:ext>
+            </a:extLst>
+          </p:cNvPr>
+          <p:cNvCxnSpPr>
+            <a:stCxn id="177" idx="2"/>
+            <a:endCxn id="8" idx="0"/>
+          </p:cNvCxnSpPr>
+          <p:nvPr/>
+        </p:nvCxnSpPr>
+        <p:spPr>
+          <a:xfrm>
+            <a:off x="10815496" y="2136566"/>
+            <a:ext cx="623" cy="373055"/>
+          </a:xfrm>
+          <a:prstGeom prst="straightConnector1">
+            <a:avLst/>
+          </a:prstGeom>
+          <a:ln>
+            <a:tailEnd type="triangle"/>
+          </a:ln>
+        </p:spPr>
+        <p:style>
+          <a:lnRef idx="1">
+            <a:schemeClr val="accent1"/>
+          </a:lnRef>
+          <a:fillRef idx="0">
+            <a:schemeClr val="accent1"/>
+          </a:fillRef>
+          <a:effectRef idx="0">
+            <a:schemeClr val="accent1"/>
+          </a:effectRef>
+          <a:fontRef idx="minor">
+            <a:schemeClr val="tx1"/>
+          </a:fontRef>
+        </p:style>
+      </p:cxnSp>
     </p:spTree>
     <p:extLst>
       <p:ext uri="{BB962C8B-B14F-4D97-AF65-F5344CB8AC3E}">
@@ -4696,10 +5076,90 @@
       </p:grpSpPr>
       <p:sp>
         <p:nvSpPr>
-          <p:cNvPr id="3" name="Oval 2">
-            <a:extLst>
-              <a:ext uri="{FF2B5EF4-FFF2-40B4-BE49-F238E27FC236}">
-                <a16:creationId xmlns:a16="http://schemas.microsoft.com/office/drawing/2014/main" id="{BB15AB6B-9DD5-FB40-AE38-8A08B9A3CCEF}"/>
+          <p:cNvPr id="8" name="Title 7">
+            <a:extLst>
+              <a:ext uri="{FF2B5EF4-FFF2-40B4-BE49-F238E27FC236}">
+                <a16:creationId xmlns:a16="http://schemas.microsoft.com/office/drawing/2014/main" id="{46A7470D-3D1D-634F-A847-4D33DA11A87B}"/>
+              </a:ext>
+            </a:extLst>
+          </p:cNvPr>
+          <p:cNvSpPr>
+            <a:spLocks noGrp="1"/>
+          </p:cNvSpPr>
+          <p:nvPr>
+            <p:ph type="title"/>
+          </p:nvPr>
+        </p:nvSpPr>
+        <p:spPr>
+          <a:xfrm>
+            <a:off x="839788" y="457200"/>
+            <a:ext cx="3932237" cy="1265058"/>
+          </a:xfrm>
+        </p:spPr>
+        <p:txBody>
+          <a:bodyPr/>
+          <a:lstStyle/>
+          <a:p>
+            <a:r>
+              <a:rPr lang="en-US" dirty="0"/>
+              <a:t>How to create edges?</a:t>
+            </a:r>
+          </a:p>
+        </p:txBody>
+      </p:sp>
+      <p:sp>
+        <p:nvSpPr>
+          <p:cNvPr id="10" name="Text Placeholder 9">
+            <a:extLst>
+              <a:ext uri="{FF2B5EF4-FFF2-40B4-BE49-F238E27FC236}">
+                <a16:creationId xmlns:a16="http://schemas.microsoft.com/office/drawing/2014/main" id="{1048CD8B-F747-174C-9ADB-503808FC51B5}"/>
+              </a:ext>
+            </a:extLst>
+          </p:cNvPr>
+          <p:cNvSpPr>
+            <a:spLocks noGrp="1"/>
+          </p:cNvSpPr>
+          <p:nvPr>
+            <p:ph type="body" sz="half" idx="2"/>
+          </p:nvPr>
+        </p:nvSpPr>
+        <p:spPr>
+          <a:xfrm>
+            <a:off x="839787" y="1722258"/>
+            <a:ext cx="3932237" cy="3811588"/>
+          </a:xfrm>
+        </p:spPr>
+        <p:txBody>
+          <a:bodyPr/>
+          <a:lstStyle/>
+          <a:p>
+            <a:pPr marL="285750" indent="-285750">
+              <a:buFont typeface="Arial" panose="020B0604020202020204" pitchFamily="34" charset="0"/>
+              <a:buChar char="•"/>
+            </a:pPr>
+            <a:r>
+              <a:rPr lang="en-US" b="1" dirty="0"/>
+              <a:t>New story node knows directly the person, places, and fieldtrips associated with it.</a:t>
+            </a:r>
+          </a:p>
+          <a:p>
+            <a:pPr marL="742950" lvl="1" indent="-285750">
+              <a:buFont typeface="Arial" panose="020B0604020202020204" pitchFamily="34" charset="0"/>
+              <a:buChar char="•"/>
+            </a:pPr>
+            <a:r>
+              <a:rPr lang="en-US" dirty="0"/>
+              <a:t>People nodes do not know directly the fieldtrips associated with them, so that is handled separately. Once all non-fieldtrip links have been created, all fieldtrip nodes go through the edge creation process again to match up to the newly added person node.</a:t>
+            </a:r>
+          </a:p>
+        </p:txBody>
+      </p:sp>
+      <p:sp>
+        <p:nvSpPr>
+          <p:cNvPr id="27" name="Oval 26">
+            <a:extLst>
+              <a:ext uri="{FF2B5EF4-FFF2-40B4-BE49-F238E27FC236}">
+                <a16:creationId xmlns:a16="http://schemas.microsoft.com/office/drawing/2014/main" id="{775D40E7-A395-644D-B31A-849939594970}"/>
               </a:ext>
             </a:extLst>
           </p:cNvPr>
@@ -4708,12 +5168,23 @@
         </p:nvSpPr>
         <p:spPr>
           <a:xfrm>
-            <a:off x="7154945" y="3162988"/>
-            <a:ext cx="820132" cy="801279"/>
+            <a:off x="8975965" y="755375"/>
+            <a:ext cx="989633" cy="966884"/>
           </a:xfrm>
           <a:prstGeom prst="ellipse">
             <a:avLst/>
           </a:prstGeom>
+          <a:solidFill>
+            <a:schemeClr val="tx1">
+              <a:lumMod val="50000"/>
+              <a:lumOff val="50000"/>
+            </a:schemeClr>
+          </a:solidFill>
+          <a:ln w="28575">
+            <a:solidFill>
+              <a:schemeClr val="accent2"/>
+            </a:solidFill>
+          </a:ln>
         </p:spPr>
         <p:style>
           <a:lnRef idx="2">
@@ -4737,18 +5208,18 @@
           <a:p>
             <a:pPr algn="ctr"/>
             <a:r>
-              <a:rPr lang="en-US" sz="1400" dirty="0"/>
-              <a:t>New Story Node</a:t>
-            </a:r>
-          </a:p>
-        </p:txBody>
-      </p:sp>
-      <p:sp>
-        <p:nvSpPr>
-          <p:cNvPr id="4" name="Oval 3">
-            <a:extLst>
-              <a:ext uri="{FF2B5EF4-FFF2-40B4-BE49-F238E27FC236}">
-                <a16:creationId xmlns:a16="http://schemas.microsoft.com/office/drawing/2014/main" id="{D1D4AF6D-741A-A445-91EF-ACB3FF40CBEF}"/>
+              <a:rPr lang="en-US" sz="1200" dirty="0"/>
+              <a:t>Existing Fieldtrip Node</a:t>
+            </a:r>
+          </a:p>
+        </p:txBody>
+      </p:sp>
+      <p:sp>
+        <p:nvSpPr>
+          <p:cNvPr id="28" name="Oval 27">
+            <a:extLst>
+              <a:ext uri="{FF2B5EF4-FFF2-40B4-BE49-F238E27FC236}">
+                <a16:creationId xmlns:a16="http://schemas.microsoft.com/office/drawing/2014/main" id="{DC6ED59E-8000-6842-866B-5E773B9F4C51}"/>
               </a:ext>
             </a:extLst>
           </p:cNvPr>
@@ -4757,14 +5228,17 @@
         </p:nvSpPr>
         <p:spPr>
           <a:xfrm>
-            <a:off x="9010455" y="1722258"/>
-            <a:ext cx="820132" cy="801279"/>
+            <a:off x="8971294" y="2067650"/>
+            <a:ext cx="994304" cy="971448"/>
           </a:xfrm>
           <a:prstGeom prst="ellipse">
             <a:avLst/>
           </a:prstGeom>
           <a:solidFill>
-            <a:schemeClr val="tx2"/>
+            <a:schemeClr val="tx1">
+              <a:lumMod val="50000"/>
+              <a:lumOff val="50000"/>
+            </a:schemeClr>
           </a:solidFill>
           <a:ln w="28575">
             <a:solidFill>
@@ -4794,7 +5268,7 @@
           <a:p>
             <a:pPr algn="ctr"/>
             <a:r>
-              <a:rPr lang="en-US" sz="1000" dirty="0"/>
+              <a:rPr lang="en-US" sz="1200" dirty="0"/>
               <a:t>Existing Place Node</a:t>
             </a:r>
           </a:p>
@@ -4802,10 +5276,10 @@
       </p:sp>
       <p:sp>
         <p:nvSpPr>
-          <p:cNvPr id="6" name="Oval 5">
-            <a:extLst>
-              <a:ext uri="{FF2B5EF4-FFF2-40B4-BE49-F238E27FC236}">
-                <a16:creationId xmlns:a16="http://schemas.microsoft.com/office/drawing/2014/main" id="{1611AD07-93D2-D546-88A0-1A9F52FA5581}"/>
+          <p:cNvPr id="29" name="Oval 28">
+            <a:extLst>
+              <a:ext uri="{FF2B5EF4-FFF2-40B4-BE49-F238E27FC236}">
+                <a16:creationId xmlns:a16="http://schemas.microsoft.com/office/drawing/2014/main" id="{2297C883-A65C-C64A-94B0-096E0660C16F}"/>
               </a:ext>
             </a:extLst>
           </p:cNvPr>
@@ -4814,20 +5288,15 @@
         </p:nvSpPr>
         <p:spPr>
           <a:xfrm>
-            <a:off x="9010455" y="3162988"/>
-            <a:ext cx="820132" cy="801279"/>
+            <a:off x="8971294" y="4696764"/>
+            <a:ext cx="994304" cy="971448"/>
           </a:xfrm>
           <a:prstGeom prst="ellipse">
             <a:avLst/>
           </a:prstGeom>
           <a:solidFill>
-            <a:schemeClr val="tx2"/>
+            <a:schemeClr val="accent2"/>
           </a:solidFill>
-          <a:ln w="28575">
-            <a:solidFill>
-              <a:schemeClr val="accent2"/>
-            </a:solidFill>
-          </a:ln>
         </p:spPr>
         <p:style>
           <a:lnRef idx="2">
@@ -4851,18 +5320,18 @@
           <a:p>
             <a:pPr algn="ctr"/>
             <a:r>
-              <a:rPr lang="en-US" sz="1000" dirty="0"/>
-              <a:t>Existing Person Node</a:t>
-            </a:r>
-          </a:p>
-        </p:txBody>
-      </p:sp>
-      <p:sp>
-        <p:nvSpPr>
-          <p:cNvPr id="7" name="Oval 6">
-            <a:extLst>
-              <a:ext uri="{FF2B5EF4-FFF2-40B4-BE49-F238E27FC236}">
-                <a16:creationId xmlns:a16="http://schemas.microsoft.com/office/drawing/2014/main" id="{3AFC829C-24C0-3444-97A7-851101FEAC23}"/>
+              <a:rPr lang="en-US" sz="1200" dirty="0"/>
+              <a:t>Existing Story Node</a:t>
+            </a:r>
+          </a:p>
+        </p:txBody>
+      </p:sp>
+      <p:sp>
+        <p:nvSpPr>
+          <p:cNvPr id="30" name="Oval 29">
+            <a:extLst>
+              <a:ext uri="{FF2B5EF4-FFF2-40B4-BE49-F238E27FC236}">
+                <a16:creationId xmlns:a16="http://schemas.microsoft.com/office/drawing/2014/main" id="{15AA9A67-D3B3-C145-8CE2-D967990AA738}"/>
               </a:ext>
             </a:extLst>
           </p:cNvPr>
@@ -4871,15 +5340,23 @@
         </p:nvSpPr>
         <p:spPr>
           <a:xfrm>
-            <a:off x="9010455" y="4603718"/>
-            <a:ext cx="820132" cy="801279"/>
+            <a:off x="8975965" y="3384489"/>
+            <a:ext cx="989633" cy="966884"/>
           </a:xfrm>
           <a:prstGeom prst="ellipse">
             <a:avLst/>
           </a:prstGeom>
           <a:solidFill>
-            <a:schemeClr val="accent2"/>
+            <a:schemeClr val="tx1">
+              <a:lumMod val="50000"/>
+              <a:lumOff val="50000"/>
+            </a:schemeClr>
           </a:solidFill>
+          <a:ln w="28575">
+            <a:solidFill>
+              <a:schemeClr val="accent2"/>
+            </a:solidFill>
+          </a:ln>
         </p:spPr>
         <p:style>
           <a:lnRef idx="2">
@@ -4903,78 +5380,57 @@
           <a:p>
             <a:pPr algn="ctr"/>
             <a:r>
-              <a:rPr lang="en-US" sz="1000" dirty="0"/>
-              <a:t>Existing Story Node</a:t>
-            </a:r>
-          </a:p>
-        </p:txBody>
-      </p:sp>
-      <p:sp>
-        <p:nvSpPr>
-          <p:cNvPr id="8" name="Title 7">
-            <a:extLst>
-              <a:ext uri="{FF2B5EF4-FFF2-40B4-BE49-F238E27FC236}">
-                <a16:creationId xmlns:a16="http://schemas.microsoft.com/office/drawing/2014/main" id="{46A7470D-3D1D-634F-A847-4D33DA11A87B}"/>
-              </a:ext>
-            </a:extLst>
-          </p:cNvPr>
-          <p:cNvSpPr>
-            <a:spLocks noGrp="1"/>
-          </p:cNvSpPr>
-          <p:nvPr>
-            <p:ph type="title"/>
-          </p:nvPr>
-        </p:nvSpPr>
-        <p:spPr/>
-        <p:txBody>
-          <a:bodyPr/>
-          <a:lstStyle/>
-          <a:p>
-            <a:r>
-              <a:rPr lang="en-US" dirty="0"/>
-              <a:t>How to create edges?</a:t>
-            </a:r>
-          </a:p>
-        </p:txBody>
-      </p:sp>
-      <p:sp>
-        <p:nvSpPr>
-          <p:cNvPr id="10" name="Text Placeholder 9">
-            <a:extLst>
-              <a:ext uri="{FF2B5EF4-FFF2-40B4-BE49-F238E27FC236}">
-                <a16:creationId xmlns:a16="http://schemas.microsoft.com/office/drawing/2014/main" id="{1048CD8B-F747-174C-9ADB-503808FC51B5}"/>
-              </a:ext>
-            </a:extLst>
-          </p:cNvPr>
-          <p:cNvSpPr>
-            <a:spLocks noGrp="1"/>
-          </p:cNvSpPr>
-          <p:nvPr>
-            <p:ph type="body" sz="half" idx="2"/>
-          </p:nvPr>
-        </p:nvSpPr>
-        <p:spPr/>
-        <p:txBody>
-          <a:bodyPr/>
-          <a:lstStyle/>
-          <a:p>
-            <a:pPr marL="285750" indent="-285750">
-              <a:buFont typeface="Arial" panose="020B0604020202020204" pitchFamily="34" charset="0"/>
-              <a:buChar char="•"/>
-            </a:pPr>
-            <a:r>
-              <a:rPr lang="en-US" b="1" dirty="0"/>
-              <a:t>New story node knows directly the person and places associated with it.</a:t>
-            </a:r>
-          </a:p>
-          <a:p>
-            <a:pPr marL="742950" lvl="1" indent="-285750">
-              <a:buFont typeface="Arial" panose="020B0604020202020204" pitchFamily="34" charset="0"/>
-              <a:buChar char="•"/>
-            </a:pPr>
-            <a:r>
-              <a:rPr lang="en-US" dirty="0"/>
-              <a:t>New story node also knows “related stories,” but these are deduced by some complex network formula so ignore these for now; they are not used for links.</a:t>
+              <a:rPr lang="en-US" sz="1200" dirty="0"/>
+              <a:t>Existing Person Node</a:t>
+            </a:r>
+          </a:p>
+        </p:txBody>
+      </p:sp>
+      <p:sp>
+        <p:nvSpPr>
+          <p:cNvPr id="32" name="Oval 31">
+            <a:extLst>
+              <a:ext uri="{FF2B5EF4-FFF2-40B4-BE49-F238E27FC236}">
+                <a16:creationId xmlns:a16="http://schemas.microsoft.com/office/drawing/2014/main" id="{26D3CAF8-10C7-1741-B4E6-1641D35F9015}"/>
+              </a:ext>
+            </a:extLst>
+          </p:cNvPr>
+          <p:cNvSpPr/>
+          <p:nvPr/>
+        </p:nvSpPr>
+        <p:spPr>
+          <a:xfrm>
+            <a:off x="6631546" y="2741689"/>
+            <a:ext cx="994304" cy="971447"/>
+          </a:xfrm>
+          <a:prstGeom prst="ellipse">
+            <a:avLst/>
+          </a:prstGeom>
+        </p:spPr>
+        <p:style>
+          <a:lnRef idx="2">
+            <a:schemeClr val="accent1">
+              <a:shade val="50000"/>
+            </a:schemeClr>
+          </a:lnRef>
+          <a:fillRef idx="1">
+            <a:schemeClr val="accent1"/>
+          </a:fillRef>
+          <a:effectRef idx="0">
+            <a:schemeClr val="accent1"/>
+          </a:effectRef>
+          <a:fontRef idx="minor">
+            <a:schemeClr val="lt1"/>
+          </a:fontRef>
+        </p:style>
+        <p:txBody>
+          <a:bodyPr rtlCol="0" anchor="ctr"/>
+          <a:lstStyle/>
+          <a:p>
+            <a:pPr algn="ctr"/>
+            <a:r>
+              <a:rPr lang="en-US" sz="1200" dirty="0"/>
+              <a:t>New Story Node</a:t>
             </a:r>
           </a:p>
         </p:txBody>
@@ -5011,221 +5467,6 @@
       </p:grpSpPr>
       <p:sp>
         <p:nvSpPr>
-          <p:cNvPr id="3" name="Oval 2">
-            <a:extLst>
-              <a:ext uri="{FF2B5EF4-FFF2-40B4-BE49-F238E27FC236}">
-                <a16:creationId xmlns:a16="http://schemas.microsoft.com/office/drawing/2014/main" id="{BB15AB6B-9DD5-FB40-AE38-8A08B9A3CCEF}"/>
-              </a:ext>
-            </a:extLst>
-          </p:cNvPr>
-          <p:cNvSpPr/>
-          <p:nvPr/>
-        </p:nvSpPr>
-        <p:spPr>
-          <a:xfrm>
-            <a:off x="7154945" y="3162988"/>
-            <a:ext cx="820132" cy="801279"/>
-          </a:xfrm>
-          <a:prstGeom prst="ellipse">
-            <a:avLst/>
-          </a:prstGeom>
-        </p:spPr>
-        <p:style>
-          <a:lnRef idx="2">
-            <a:schemeClr val="accent1">
-              <a:shade val="50000"/>
-            </a:schemeClr>
-          </a:lnRef>
-          <a:fillRef idx="1">
-            <a:schemeClr val="accent1"/>
-          </a:fillRef>
-          <a:effectRef idx="0">
-            <a:schemeClr val="accent1"/>
-          </a:effectRef>
-          <a:fontRef idx="minor">
-            <a:schemeClr val="lt1"/>
-          </a:fontRef>
-        </p:style>
-        <p:txBody>
-          <a:bodyPr rtlCol="0" anchor="ctr"/>
-          <a:lstStyle/>
-          <a:p>
-            <a:pPr algn="ctr"/>
-            <a:r>
-              <a:rPr lang="en-US" sz="1400" dirty="0"/>
-              <a:t>New Story Node</a:t>
-            </a:r>
-          </a:p>
-        </p:txBody>
-      </p:sp>
-      <p:sp>
-        <p:nvSpPr>
-          <p:cNvPr id="4" name="Oval 3">
-            <a:extLst>
-              <a:ext uri="{FF2B5EF4-FFF2-40B4-BE49-F238E27FC236}">
-                <a16:creationId xmlns:a16="http://schemas.microsoft.com/office/drawing/2014/main" id="{D1D4AF6D-741A-A445-91EF-ACB3FF40CBEF}"/>
-              </a:ext>
-            </a:extLst>
-          </p:cNvPr>
-          <p:cNvSpPr/>
-          <p:nvPr/>
-        </p:nvSpPr>
-        <p:spPr>
-          <a:xfrm>
-            <a:off x="9010455" y="1722258"/>
-            <a:ext cx="820132" cy="801279"/>
-          </a:xfrm>
-          <a:prstGeom prst="ellipse">
-            <a:avLst/>
-          </a:prstGeom>
-          <a:solidFill>
-            <a:schemeClr val="tx2"/>
-          </a:solidFill>
-          <a:ln w="28575">
-            <a:solidFill>
-              <a:schemeClr val="accent2"/>
-            </a:solidFill>
-          </a:ln>
-        </p:spPr>
-        <p:style>
-          <a:lnRef idx="2">
-            <a:schemeClr val="accent1">
-              <a:shade val="50000"/>
-            </a:schemeClr>
-          </a:lnRef>
-          <a:fillRef idx="1">
-            <a:schemeClr val="accent1"/>
-          </a:fillRef>
-          <a:effectRef idx="0">
-            <a:schemeClr val="accent1"/>
-          </a:effectRef>
-          <a:fontRef idx="minor">
-            <a:schemeClr val="lt1"/>
-          </a:fontRef>
-        </p:style>
-        <p:txBody>
-          <a:bodyPr rtlCol="0" anchor="ctr"/>
-          <a:lstStyle/>
-          <a:p>
-            <a:pPr algn="ctr"/>
-            <a:r>
-              <a:rPr lang="en-US" sz="1000" dirty="0"/>
-              <a:t>Existing Place Node</a:t>
-            </a:r>
-          </a:p>
-        </p:txBody>
-      </p:sp>
-      <p:sp>
-        <p:nvSpPr>
-          <p:cNvPr id="6" name="Oval 5">
-            <a:extLst>
-              <a:ext uri="{FF2B5EF4-FFF2-40B4-BE49-F238E27FC236}">
-                <a16:creationId xmlns:a16="http://schemas.microsoft.com/office/drawing/2014/main" id="{1611AD07-93D2-D546-88A0-1A9F52FA5581}"/>
-              </a:ext>
-            </a:extLst>
-          </p:cNvPr>
-          <p:cNvSpPr/>
-          <p:nvPr/>
-        </p:nvSpPr>
-        <p:spPr>
-          <a:xfrm>
-            <a:off x="9010455" y="3162988"/>
-            <a:ext cx="820132" cy="801279"/>
-          </a:xfrm>
-          <a:prstGeom prst="ellipse">
-            <a:avLst/>
-          </a:prstGeom>
-          <a:solidFill>
-            <a:schemeClr val="tx2"/>
-          </a:solidFill>
-          <a:ln w="28575">
-            <a:solidFill>
-              <a:schemeClr val="accent2"/>
-            </a:solidFill>
-          </a:ln>
-        </p:spPr>
-        <p:style>
-          <a:lnRef idx="2">
-            <a:schemeClr val="accent1">
-              <a:shade val="50000"/>
-            </a:schemeClr>
-          </a:lnRef>
-          <a:fillRef idx="1">
-            <a:schemeClr val="accent1"/>
-          </a:fillRef>
-          <a:effectRef idx="0">
-            <a:schemeClr val="accent1"/>
-          </a:effectRef>
-          <a:fontRef idx="minor">
-            <a:schemeClr val="lt1"/>
-          </a:fontRef>
-        </p:style>
-        <p:txBody>
-          <a:bodyPr rtlCol="0" anchor="ctr"/>
-          <a:lstStyle/>
-          <a:p>
-            <a:pPr algn="ctr"/>
-            <a:r>
-              <a:rPr lang="en-US" sz="1000" dirty="0"/>
-              <a:t>Existing Person Node</a:t>
-            </a:r>
-          </a:p>
-        </p:txBody>
-      </p:sp>
-      <p:sp>
-        <p:nvSpPr>
-          <p:cNvPr id="7" name="Oval 6">
-            <a:extLst>
-              <a:ext uri="{FF2B5EF4-FFF2-40B4-BE49-F238E27FC236}">
-                <a16:creationId xmlns:a16="http://schemas.microsoft.com/office/drawing/2014/main" id="{3AFC829C-24C0-3444-97A7-851101FEAC23}"/>
-              </a:ext>
-            </a:extLst>
-          </p:cNvPr>
-          <p:cNvSpPr/>
-          <p:nvPr/>
-        </p:nvSpPr>
-        <p:spPr>
-          <a:xfrm>
-            <a:off x="9010455" y="4603718"/>
-            <a:ext cx="820132" cy="801279"/>
-          </a:xfrm>
-          <a:prstGeom prst="ellipse">
-            <a:avLst/>
-          </a:prstGeom>
-          <a:solidFill>
-            <a:schemeClr val="accent2"/>
-          </a:solidFill>
-        </p:spPr>
-        <p:style>
-          <a:lnRef idx="2">
-            <a:schemeClr val="accent1">
-              <a:shade val="50000"/>
-            </a:schemeClr>
-          </a:lnRef>
-          <a:fillRef idx="1">
-            <a:schemeClr val="accent1"/>
-          </a:fillRef>
-          <a:effectRef idx="0">
-            <a:schemeClr val="accent1"/>
-          </a:effectRef>
-          <a:fontRef idx="minor">
-            <a:schemeClr val="lt1"/>
-          </a:fontRef>
-        </p:style>
-        <p:txBody>
-          <a:bodyPr rtlCol="0" anchor="ctr"/>
-          <a:lstStyle/>
-          <a:p>
-            <a:pPr algn="ctr"/>
-            <a:r>
-              <a:rPr lang="en-US" sz="1000" dirty="0"/>
-              <a:t>Existing Story Node</a:t>
-            </a:r>
-          </a:p>
-        </p:txBody>
-      </p:sp>
-      <p:sp>
-        <p:nvSpPr>
           <p:cNvPr id="8" name="Title 7">
             <a:extLst>
               <a:ext uri="{FF2B5EF4-FFF2-40B4-BE49-F238E27FC236}">
@@ -5240,7 +5481,12 @@
             <p:ph type="title"/>
           </p:nvPr>
         </p:nvSpPr>
-        <p:spPr/>
+        <p:spPr>
+          <a:xfrm>
+            <a:off x="839788" y="457200"/>
+            <a:ext cx="3932237" cy="1265058"/>
+          </a:xfrm>
+        </p:spPr>
         <p:txBody>
           <a:bodyPr/>
           <a:lstStyle/>
@@ -5268,7 +5514,12 @@
             <p:ph type="body" sz="half" idx="2"/>
           </p:nvPr>
         </p:nvSpPr>
-        <p:spPr/>
+        <p:spPr>
+          <a:xfrm>
+            <a:off x="839788" y="1722258"/>
+            <a:ext cx="3932237" cy="3811588"/>
+          </a:xfrm>
+        </p:spPr>
         <p:txBody>
           <a:bodyPr/>
           <a:lstStyle/>
@@ -5279,7 +5530,7 @@
             </a:pPr>
             <a:r>
               <a:rPr lang="en-US" dirty="0"/>
-              <a:t>New story node knows directly the person and places associated with it.</a:t>
+              <a:t>New story node knows directly the person, places, and fieldtrips associated with it.</a:t>
             </a:r>
           </a:p>
           <a:p>
@@ -5289,7 +5540,7 @@
             </a:pPr>
             <a:r>
               <a:rPr lang="en-US" b="1" dirty="0"/>
-              <a:t>When one of the new story node’s associated person or places matches with an existing node from the network, a primary edge can be created. </a:t>
+              <a:t>When one of the new story node’s associated person, places, or fieldtrips matches with an existing node from the network, a primary edge can be created. </a:t>
             </a:r>
           </a:p>
           <a:p>
@@ -5310,44 +5561,33 @@
               <a:t> person is “Joanne.” “Joanne” is currently a node on the user nexus graph. Create an edge between the two.</a:t>
             </a:r>
           </a:p>
-          <a:p>
-            <a:pPr marL="742950" lvl="1" indent="-285750">
-              <a:buFont typeface="Arial" panose="020B0604020202020204" pitchFamily="34" charset="0"/>
-              <a:buChar char="•"/>
-            </a:pPr>
-            <a:r>
-              <a:rPr lang="en-US" dirty="0"/>
-              <a:t>To link a person to Fieldtrip nodes, the process for creating Fieldtrip edges is called, as people currently do not have associated Fieldtrips in their data. Stories and places do, however.</a:t>
-            </a:r>
-          </a:p>
         </p:txBody>
       </p:sp>
       <p:cxnSp>
         <p:nvCxnSpPr>
-          <p:cNvPr id="5" name="Straight Connector 4">
-            <a:extLst>
-              <a:ext uri="{FF2B5EF4-FFF2-40B4-BE49-F238E27FC236}">
-                <a16:creationId xmlns:a16="http://schemas.microsoft.com/office/drawing/2014/main" id="{34D2CF34-809A-7E47-A276-34BC4B62603F}"/>
+          <p:cNvPr id="33" name="Straight Arrow Connector 32">
+            <a:extLst>
+              <a:ext uri="{FF2B5EF4-FFF2-40B4-BE49-F238E27FC236}">
+                <a16:creationId xmlns:a16="http://schemas.microsoft.com/office/drawing/2014/main" id="{9BA25206-EEEC-2648-94BD-E7B2769F8622}"/>
               </a:ext>
             </a:extLst>
           </p:cNvPr>
           <p:cNvCxnSpPr>
-            <a:stCxn id="3" idx="6"/>
-            <a:endCxn id="4" idx="2"/>
+            <a:cxnSpLocks/>
+            <a:endCxn id="39" idx="2"/>
           </p:cNvCxnSpPr>
           <p:nvPr/>
         </p:nvCxnSpPr>
         <p:spPr>
           <a:xfrm flipV="1">
-            <a:off x="7975077" y="2122898"/>
-            <a:ext cx="1035378" cy="1440730"/>
-          </a:xfrm>
-          <a:prstGeom prst="line">
+            <a:off x="7630521" y="1238817"/>
+            <a:ext cx="1345444" cy="1988596"/>
+          </a:xfrm>
+          <a:prstGeom prst="straightConnector1">
             <a:avLst/>
           </a:prstGeom>
           <a:ln>
-            <a:headEnd type="none" w="med" len="med"/>
-            <a:tailEnd type="triangle" w="med" len="med"/>
+            <a:tailEnd type="triangle"/>
           </a:ln>
         </p:spPr>
         <p:style>
@@ -5367,30 +5607,29 @@
       </p:cxnSp>
       <p:cxnSp>
         <p:nvCxnSpPr>
-          <p:cNvPr id="11" name="Straight Connector 10">
-            <a:extLst>
-              <a:ext uri="{FF2B5EF4-FFF2-40B4-BE49-F238E27FC236}">
-                <a16:creationId xmlns:a16="http://schemas.microsoft.com/office/drawing/2014/main" id="{171294B5-8104-A448-A1CE-5E6742BA963A}"/>
+          <p:cNvPr id="36" name="Straight Arrow Connector 35">
+            <a:extLst>
+              <a:ext uri="{FF2B5EF4-FFF2-40B4-BE49-F238E27FC236}">
+                <a16:creationId xmlns:a16="http://schemas.microsoft.com/office/drawing/2014/main" id="{28BFF38B-1324-E947-9D38-40BB5F85DBAF}"/>
               </a:ext>
             </a:extLst>
           </p:cNvPr>
           <p:cNvCxnSpPr>
-            <a:stCxn id="3" idx="6"/>
-            <a:endCxn id="6" idx="2"/>
+            <a:cxnSpLocks/>
+            <a:endCxn id="40" idx="2"/>
           </p:cNvCxnSpPr>
           <p:nvPr/>
         </p:nvCxnSpPr>
         <p:spPr>
-          <a:xfrm>
-            <a:off x="7975077" y="3563628"/>
-            <a:ext cx="1035378" cy="0"/>
-          </a:xfrm>
-          <a:prstGeom prst="line">
+          <a:xfrm flipV="1">
+            <a:off x="7630521" y="2553374"/>
+            <a:ext cx="1340773" cy="674039"/>
+          </a:xfrm>
+          <a:prstGeom prst="straightConnector1">
             <a:avLst/>
           </a:prstGeom>
           <a:ln>
-            <a:headEnd type="none" w="med" len="med"/>
-            <a:tailEnd type="triangle" w="med" len="med"/>
+            <a:tailEnd type="triangle"/>
           </a:ln>
         </p:spPr>
         <p:style>
@@ -5408,6 +5647,329 @@
           </a:fontRef>
         </p:style>
       </p:cxnSp>
+      <p:cxnSp>
+        <p:nvCxnSpPr>
+          <p:cNvPr id="38" name="Straight Arrow Connector 37">
+            <a:extLst>
+              <a:ext uri="{FF2B5EF4-FFF2-40B4-BE49-F238E27FC236}">
+                <a16:creationId xmlns:a16="http://schemas.microsoft.com/office/drawing/2014/main" id="{6B8670DC-0A96-D747-B0C8-C12E782ACFB9}"/>
+              </a:ext>
+            </a:extLst>
+          </p:cNvPr>
+          <p:cNvCxnSpPr>
+            <a:cxnSpLocks/>
+            <a:endCxn id="42" idx="2"/>
+          </p:cNvCxnSpPr>
+          <p:nvPr/>
+        </p:nvCxnSpPr>
+        <p:spPr>
+          <a:xfrm>
+            <a:off x="7630521" y="3227413"/>
+            <a:ext cx="1345444" cy="640518"/>
+          </a:xfrm>
+          <a:prstGeom prst="straightConnector1">
+            <a:avLst/>
+          </a:prstGeom>
+          <a:ln>
+            <a:tailEnd type="triangle"/>
+          </a:ln>
+        </p:spPr>
+        <p:style>
+          <a:lnRef idx="1">
+            <a:schemeClr val="accent1"/>
+          </a:lnRef>
+          <a:fillRef idx="0">
+            <a:schemeClr val="accent1"/>
+          </a:fillRef>
+          <a:effectRef idx="0">
+            <a:schemeClr val="accent1"/>
+          </a:effectRef>
+          <a:fontRef idx="minor">
+            <a:schemeClr val="tx1"/>
+          </a:fontRef>
+        </p:style>
+      </p:cxnSp>
+      <p:sp>
+        <p:nvSpPr>
+          <p:cNvPr id="39" name="Oval 38">
+            <a:extLst>
+              <a:ext uri="{FF2B5EF4-FFF2-40B4-BE49-F238E27FC236}">
+                <a16:creationId xmlns:a16="http://schemas.microsoft.com/office/drawing/2014/main" id="{28ABA363-C5E2-914C-96CB-72AD11A6B241}"/>
+              </a:ext>
+            </a:extLst>
+          </p:cNvPr>
+          <p:cNvSpPr/>
+          <p:nvPr/>
+        </p:nvSpPr>
+        <p:spPr>
+          <a:xfrm>
+            <a:off x="8975965" y="755375"/>
+            <a:ext cx="989633" cy="966884"/>
+          </a:xfrm>
+          <a:prstGeom prst="ellipse">
+            <a:avLst/>
+          </a:prstGeom>
+          <a:solidFill>
+            <a:schemeClr val="tx1">
+              <a:lumMod val="50000"/>
+              <a:lumOff val="50000"/>
+            </a:schemeClr>
+          </a:solidFill>
+          <a:ln w="28575">
+            <a:solidFill>
+              <a:schemeClr val="accent2"/>
+            </a:solidFill>
+          </a:ln>
+        </p:spPr>
+        <p:style>
+          <a:lnRef idx="2">
+            <a:schemeClr val="accent1">
+              <a:shade val="50000"/>
+            </a:schemeClr>
+          </a:lnRef>
+          <a:fillRef idx="1">
+            <a:schemeClr val="accent1"/>
+          </a:fillRef>
+          <a:effectRef idx="0">
+            <a:schemeClr val="accent1"/>
+          </a:effectRef>
+          <a:fontRef idx="minor">
+            <a:schemeClr val="lt1"/>
+          </a:fontRef>
+        </p:style>
+        <p:txBody>
+          <a:bodyPr rtlCol="0" anchor="ctr"/>
+          <a:lstStyle/>
+          <a:p>
+            <a:pPr algn="ctr"/>
+            <a:r>
+              <a:rPr lang="en-US" sz="1200" dirty="0"/>
+              <a:t>Existing Fieldtrip Node</a:t>
+            </a:r>
+          </a:p>
+        </p:txBody>
+      </p:sp>
+      <p:sp>
+        <p:nvSpPr>
+          <p:cNvPr id="40" name="Oval 39">
+            <a:extLst>
+              <a:ext uri="{FF2B5EF4-FFF2-40B4-BE49-F238E27FC236}">
+                <a16:creationId xmlns:a16="http://schemas.microsoft.com/office/drawing/2014/main" id="{6E705641-E140-6148-91A8-FEB5614F78C9}"/>
+              </a:ext>
+            </a:extLst>
+          </p:cNvPr>
+          <p:cNvSpPr/>
+          <p:nvPr/>
+        </p:nvSpPr>
+        <p:spPr>
+          <a:xfrm>
+            <a:off x="8971294" y="2067650"/>
+            <a:ext cx="994304" cy="971448"/>
+          </a:xfrm>
+          <a:prstGeom prst="ellipse">
+            <a:avLst/>
+          </a:prstGeom>
+          <a:solidFill>
+            <a:schemeClr val="tx1">
+              <a:lumMod val="50000"/>
+              <a:lumOff val="50000"/>
+            </a:schemeClr>
+          </a:solidFill>
+          <a:ln w="28575">
+            <a:solidFill>
+              <a:schemeClr val="accent2"/>
+            </a:solidFill>
+          </a:ln>
+        </p:spPr>
+        <p:style>
+          <a:lnRef idx="2">
+            <a:schemeClr val="accent1">
+              <a:shade val="50000"/>
+            </a:schemeClr>
+          </a:lnRef>
+          <a:fillRef idx="1">
+            <a:schemeClr val="accent1"/>
+          </a:fillRef>
+          <a:effectRef idx="0">
+            <a:schemeClr val="accent1"/>
+          </a:effectRef>
+          <a:fontRef idx="minor">
+            <a:schemeClr val="lt1"/>
+          </a:fontRef>
+        </p:style>
+        <p:txBody>
+          <a:bodyPr rtlCol="0" anchor="ctr"/>
+          <a:lstStyle/>
+          <a:p>
+            <a:pPr algn="ctr"/>
+            <a:r>
+              <a:rPr lang="en-US" sz="1200" dirty="0"/>
+              <a:t>Existing Place Node</a:t>
+            </a:r>
+          </a:p>
+        </p:txBody>
+      </p:sp>
+      <p:sp>
+        <p:nvSpPr>
+          <p:cNvPr id="41" name="Oval 40">
+            <a:extLst>
+              <a:ext uri="{FF2B5EF4-FFF2-40B4-BE49-F238E27FC236}">
+                <a16:creationId xmlns:a16="http://schemas.microsoft.com/office/drawing/2014/main" id="{9FE69C09-73EC-D947-9F4A-CA4F0FF5ED76}"/>
+              </a:ext>
+            </a:extLst>
+          </p:cNvPr>
+          <p:cNvSpPr/>
+          <p:nvPr/>
+        </p:nvSpPr>
+        <p:spPr>
+          <a:xfrm>
+            <a:off x="8971294" y="4696764"/>
+            <a:ext cx="994304" cy="971448"/>
+          </a:xfrm>
+          <a:prstGeom prst="ellipse">
+            <a:avLst/>
+          </a:prstGeom>
+          <a:solidFill>
+            <a:schemeClr val="accent2"/>
+          </a:solidFill>
+        </p:spPr>
+        <p:style>
+          <a:lnRef idx="2">
+            <a:schemeClr val="accent1">
+              <a:shade val="50000"/>
+            </a:schemeClr>
+          </a:lnRef>
+          <a:fillRef idx="1">
+            <a:schemeClr val="accent1"/>
+          </a:fillRef>
+          <a:effectRef idx="0">
+            <a:schemeClr val="accent1"/>
+          </a:effectRef>
+          <a:fontRef idx="minor">
+            <a:schemeClr val="lt1"/>
+          </a:fontRef>
+        </p:style>
+        <p:txBody>
+          <a:bodyPr rtlCol="0" anchor="ctr"/>
+          <a:lstStyle/>
+          <a:p>
+            <a:pPr algn="ctr"/>
+            <a:r>
+              <a:rPr lang="en-US" sz="1200" dirty="0"/>
+              <a:t>Existing Story Node</a:t>
+            </a:r>
+          </a:p>
+        </p:txBody>
+      </p:sp>
+      <p:sp>
+        <p:nvSpPr>
+          <p:cNvPr id="42" name="Oval 41">
+            <a:extLst>
+              <a:ext uri="{FF2B5EF4-FFF2-40B4-BE49-F238E27FC236}">
+                <a16:creationId xmlns:a16="http://schemas.microsoft.com/office/drawing/2014/main" id="{2234E1AE-03FA-424F-8FDF-F8EA95801808}"/>
+              </a:ext>
+            </a:extLst>
+          </p:cNvPr>
+          <p:cNvSpPr/>
+          <p:nvPr/>
+        </p:nvSpPr>
+        <p:spPr>
+          <a:xfrm>
+            <a:off x="8975965" y="3384489"/>
+            <a:ext cx="989633" cy="966884"/>
+          </a:xfrm>
+          <a:prstGeom prst="ellipse">
+            <a:avLst/>
+          </a:prstGeom>
+          <a:solidFill>
+            <a:schemeClr val="tx1">
+              <a:lumMod val="50000"/>
+              <a:lumOff val="50000"/>
+            </a:schemeClr>
+          </a:solidFill>
+          <a:ln w="28575">
+            <a:solidFill>
+              <a:schemeClr val="accent2"/>
+            </a:solidFill>
+          </a:ln>
+        </p:spPr>
+        <p:style>
+          <a:lnRef idx="2">
+            <a:schemeClr val="accent1">
+              <a:shade val="50000"/>
+            </a:schemeClr>
+          </a:lnRef>
+          <a:fillRef idx="1">
+            <a:schemeClr val="accent1"/>
+          </a:fillRef>
+          <a:effectRef idx="0">
+            <a:schemeClr val="accent1"/>
+          </a:effectRef>
+          <a:fontRef idx="minor">
+            <a:schemeClr val="lt1"/>
+          </a:fontRef>
+        </p:style>
+        <p:txBody>
+          <a:bodyPr rtlCol="0" anchor="ctr"/>
+          <a:lstStyle/>
+          <a:p>
+            <a:pPr algn="ctr"/>
+            <a:r>
+              <a:rPr lang="en-US" sz="1200" dirty="0"/>
+              <a:t>Existing Person Node</a:t>
+            </a:r>
+          </a:p>
+        </p:txBody>
+      </p:sp>
+      <p:sp>
+        <p:nvSpPr>
+          <p:cNvPr id="48" name="Oval 47">
+            <a:extLst>
+              <a:ext uri="{FF2B5EF4-FFF2-40B4-BE49-F238E27FC236}">
+                <a16:creationId xmlns:a16="http://schemas.microsoft.com/office/drawing/2014/main" id="{4C896C4F-B8B8-B74A-B08E-390E042EA90E}"/>
+              </a:ext>
+            </a:extLst>
+          </p:cNvPr>
+          <p:cNvSpPr/>
+          <p:nvPr/>
+        </p:nvSpPr>
+        <p:spPr>
+          <a:xfrm>
+            <a:off x="6631546" y="2741689"/>
+            <a:ext cx="994304" cy="971447"/>
+          </a:xfrm>
+          <a:prstGeom prst="ellipse">
+            <a:avLst/>
+          </a:prstGeom>
+        </p:spPr>
+        <p:style>
+          <a:lnRef idx="2">
+            <a:schemeClr val="accent1">
+              <a:shade val="50000"/>
+            </a:schemeClr>
+          </a:lnRef>
+          <a:fillRef idx="1">
+            <a:schemeClr val="accent1"/>
+          </a:fillRef>
+          <a:effectRef idx="0">
+            <a:schemeClr val="accent1"/>
+          </a:effectRef>
+          <a:fontRef idx="minor">
+            <a:schemeClr val="lt1"/>
+          </a:fontRef>
+        </p:style>
+        <p:txBody>
+          <a:bodyPr rtlCol="0" anchor="ctr"/>
+          <a:lstStyle/>
+          <a:p>
+            <a:pPr algn="ctr"/>
+            <a:r>
+              <a:rPr lang="en-US" sz="1200" dirty="0"/>
+              <a:t>New Story Node</a:t>
+            </a:r>
+          </a:p>
+        </p:txBody>
+      </p:sp>
     </p:spTree>
     <p:extLst>
       <p:ext uri="{BB962C8B-B14F-4D97-AF65-F5344CB8AC3E}">
@@ -5440,221 +6002,6 @@
       </p:grpSpPr>
       <p:sp>
         <p:nvSpPr>
-          <p:cNvPr id="3" name="Oval 2">
-            <a:extLst>
-              <a:ext uri="{FF2B5EF4-FFF2-40B4-BE49-F238E27FC236}">
-                <a16:creationId xmlns:a16="http://schemas.microsoft.com/office/drawing/2014/main" id="{BB15AB6B-9DD5-FB40-AE38-8A08B9A3CCEF}"/>
-              </a:ext>
-            </a:extLst>
-          </p:cNvPr>
-          <p:cNvSpPr/>
-          <p:nvPr/>
-        </p:nvSpPr>
-        <p:spPr>
-          <a:xfrm>
-            <a:off x="7154945" y="3162988"/>
-            <a:ext cx="820132" cy="801279"/>
-          </a:xfrm>
-          <a:prstGeom prst="ellipse">
-            <a:avLst/>
-          </a:prstGeom>
-        </p:spPr>
-        <p:style>
-          <a:lnRef idx="2">
-            <a:schemeClr val="accent1">
-              <a:shade val="50000"/>
-            </a:schemeClr>
-          </a:lnRef>
-          <a:fillRef idx="1">
-            <a:schemeClr val="accent1"/>
-          </a:fillRef>
-          <a:effectRef idx="0">
-            <a:schemeClr val="accent1"/>
-          </a:effectRef>
-          <a:fontRef idx="minor">
-            <a:schemeClr val="lt1"/>
-          </a:fontRef>
-        </p:style>
-        <p:txBody>
-          <a:bodyPr rtlCol="0" anchor="ctr"/>
-          <a:lstStyle/>
-          <a:p>
-            <a:pPr algn="ctr"/>
-            <a:r>
-              <a:rPr lang="en-US" sz="1400" dirty="0"/>
-              <a:t>New Story Node</a:t>
-            </a:r>
-          </a:p>
-        </p:txBody>
-      </p:sp>
-      <p:sp>
-        <p:nvSpPr>
-          <p:cNvPr id="4" name="Oval 3">
-            <a:extLst>
-              <a:ext uri="{FF2B5EF4-FFF2-40B4-BE49-F238E27FC236}">
-                <a16:creationId xmlns:a16="http://schemas.microsoft.com/office/drawing/2014/main" id="{D1D4AF6D-741A-A445-91EF-ACB3FF40CBEF}"/>
-              </a:ext>
-            </a:extLst>
-          </p:cNvPr>
-          <p:cNvSpPr/>
-          <p:nvPr/>
-        </p:nvSpPr>
-        <p:spPr>
-          <a:xfrm>
-            <a:off x="9010455" y="1722258"/>
-            <a:ext cx="820132" cy="801279"/>
-          </a:xfrm>
-          <a:prstGeom prst="ellipse">
-            <a:avLst/>
-          </a:prstGeom>
-          <a:solidFill>
-            <a:schemeClr val="tx2"/>
-          </a:solidFill>
-          <a:ln w="28575">
-            <a:solidFill>
-              <a:schemeClr val="accent2"/>
-            </a:solidFill>
-          </a:ln>
-        </p:spPr>
-        <p:style>
-          <a:lnRef idx="2">
-            <a:schemeClr val="accent1">
-              <a:shade val="50000"/>
-            </a:schemeClr>
-          </a:lnRef>
-          <a:fillRef idx="1">
-            <a:schemeClr val="accent1"/>
-          </a:fillRef>
-          <a:effectRef idx="0">
-            <a:schemeClr val="accent1"/>
-          </a:effectRef>
-          <a:fontRef idx="minor">
-            <a:schemeClr val="lt1"/>
-          </a:fontRef>
-        </p:style>
-        <p:txBody>
-          <a:bodyPr rtlCol="0" anchor="ctr"/>
-          <a:lstStyle/>
-          <a:p>
-            <a:pPr algn="ctr"/>
-            <a:r>
-              <a:rPr lang="en-US" sz="1000" dirty="0"/>
-              <a:t>Existing Place Node</a:t>
-            </a:r>
-          </a:p>
-        </p:txBody>
-      </p:sp>
-      <p:sp>
-        <p:nvSpPr>
-          <p:cNvPr id="6" name="Oval 5">
-            <a:extLst>
-              <a:ext uri="{FF2B5EF4-FFF2-40B4-BE49-F238E27FC236}">
-                <a16:creationId xmlns:a16="http://schemas.microsoft.com/office/drawing/2014/main" id="{1611AD07-93D2-D546-88A0-1A9F52FA5581}"/>
-              </a:ext>
-            </a:extLst>
-          </p:cNvPr>
-          <p:cNvSpPr/>
-          <p:nvPr/>
-        </p:nvSpPr>
-        <p:spPr>
-          <a:xfrm>
-            <a:off x="9010455" y="3162988"/>
-            <a:ext cx="820132" cy="801279"/>
-          </a:xfrm>
-          <a:prstGeom prst="ellipse">
-            <a:avLst/>
-          </a:prstGeom>
-          <a:solidFill>
-            <a:schemeClr val="tx2"/>
-          </a:solidFill>
-          <a:ln w="28575">
-            <a:solidFill>
-              <a:schemeClr val="accent2"/>
-            </a:solidFill>
-          </a:ln>
-        </p:spPr>
-        <p:style>
-          <a:lnRef idx="2">
-            <a:schemeClr val="accent1">
-              <a:shade val="50000"/>
-            </a:schemeClr>
-          </a:lnRef>
-          <a:fillRef idx="1">
-            <a:schemeClr val="accent1"/>
-          </a:fillRef>
-          <a:effectRef idx="0">
-            <a:schemeClr val="accent1"/>
-          </a:effectRef>
-          <a:fontRef idx="minor">
-            <a:schemeClr val="lt1"/>
-          </a:fontRef>
-        </p:style>
-        <p:txBody>
-          <a:bodyPr rtlCol="0" anchor="ctr"/>
-          <a:lstStyle/>
-          <a:p>
-            <a:pPr algn="ctr"/>
-            <a:r>
-              <a:rPr lang="en-US" sz="1000" dirty="0"/>
-              <a:t>Existing Person Node</a:t>
-            </a:r>
-          </a:p>
-        </p:txBody>
-      </p:sp>
-      <p:sp>
-        <p:nvSpPr>
-          <p:cNvPr id="7" name="Oval 6">
-            <a:extLst>
-              <a:ext uri="{FF2B5EF4-FFF2-40B4-BE49-F238E27FC236}">
-                <a16:creationId xmlns:a16="http://schemas.microsoft.com/office/drawing/2014/main" id="{3AFC829C-24C0-3444-97A7-851101FEAC23}"/>
-              </a:ext>
-            </a:extLst>
-          </p:cNvPr>
-          <p:cNvSpPr/>
-          <p:nvPr/>
-        </p:nvSpPr>
-        <p:spPr>
-          <a:xfrm>
-            <a:off x="9010455" y="4603718"/>
-            <a:ext cx="820132" cy="801279"/>
-          </a:xfrm>
-          <a:prstGeom prst="ellipse">
-            <a:avLst/>
-          </a:prstGeom>
-          <a:solidFill>
-            <a:schemeClr val="accent2"/>
-          </a:solidFill>
-        </p:spPr>
-        <p:style>
-          <a:lnRef idx="2">
-            <a:schemeClr val="accent1">
-              <a:shade val="50000"/>
-            </a:schemeClr>
-          </a:lnRef>
-          <a:fillRef idx="1">
-            <a:schemeClr val="accent1"/>
-          </a:fillRef>
-          <a:effectRef idx="0">
-            <a:schemeClr val="accent1"/>
-          </a:effectRef>
-          <a:fontRef idx="minor">
-            <a:schemeClr val="lt1"/>
-          </a:fontRef>
-        </p:style>
-        <p:txBody>
-          <a:bodyPr rtlCol="0" anchor="ctr"/>
-          <a:lstStyle/>
-          <a:p>
-            <a:pPr algn="ctr"/>
-            <a:r>
-              <a:rPr lang="en-US" sz="1000" dirty="0"/>
-              <a:t>Existing Story Node</a:t>
-            </a:r>
-          </a:p>
-        </p:txBody>
-      </p:sp>
-      <p:sp>
-        <p:nvSpPr>
           <p:cNvPr id="8" name="Title 7">
             <a:extLst>
               <a:ext uri="{FF2B5EF4-FFF2-40B4-BE49-F238E27FC236}">
@@ -5669,7 +6016,12 @@
             <p:ph type="title"/>
           </p:nvPr>
         </p:nvSpPr>
-        <p:spPr/>
+        <p:spPr>
+          <a:xfrm>
+            <a:off x="839788" y="457200"/>
+            <a:ext cx="3932237" cy="1265058"/>
+          </a:xfrm>
+        </p:spPr>
         <p:txBody>
           <a:bodyPr/>
           <a:lstStyle/>
@@ -5697,9 +6049,16 @@
             <p:ph type="body" sz="half" idx="2"/>
           </p:nvPr>
         </p:nvSpPr>
-        <p:spPr/>
-        <p:txBody>
-          <a:bodyPr/>
+        <p:spPr>
+          <a:xfrm>
+            <a:off x="839787" y="1722258"/>
+            <a:ext cx="3932237" cy="3811588"/>
+          </a:xfrm>
+        </p:spPr>
+        <p:txBody>
+          <a:bodyPr>
+            <a:normAutofit/>
+          </a:bodyPr>
           <a:lstStyle/>
           <a:p>
             <a:pPr marL="285750" indent="-285750">
@@ -5708,7 +6067,7 @@
             </a:pPr>
             <a:r>
               <a:rPr lang="en-US" dirty="0"/>
-              <a:t>New story node knows directly the person and places associated with it.</a:t>
+              <a:t>New story node knows directly the person, places, and fieldtrips associated with it.</a:t>
             </a:r>
           </a:p>
           <a:p>
@@ -5718,7 +6077,7 @@
             </a:pPr>
             <a:r>
               <a:rPr lang="en-US" dirty="0"/>
-              <a:t>When one of the new story node’s associated person or places matches with an existing node from the network, a primary edge can be created.</a:t>
+              <a:t>When one of the new story node’s associated person, places, or fieldtrips matches with an existing node from the network, a primary edge can be created.</a:t>
             </a:r>
           </a:p>
           <a:p>
@@ -5728,7 +6087,7 @@
             </a:pPr>
             <a:r>
               <a:rPr lang="en-US" b="1" dirty="0"/>
-              <a:t>An edge between a story and story can only be created when the stories share a common person or place. This is called a secondary edge</a:t>
+              <a:t>Any two nodes that both share a common, third node can be linked together. This is called a secondary edge.</a:t>
             </a:r>
           </a:p>
           <a:p>
@@ -5753,30 +6112,29 @@
       </p:sp>
       <p:cxnSp>
         <p:nvCxnSpPr>
-          <p:cNvPr id="5" name="Straight Connector 4">
-            <a:extLst>
-              <a:ext uri="{FF2B5EF4-FFF2-40B4-BE49-F238E27FC236}">
-                <a16:creationId xmlns:a16="http://schemas.microsoft.com/office/drawing/2014/main" id="{34D2CF34-809A-7E47-A276-34BC4B62603F}"/>
+          <p:cNvPr id="54" name="Straight Arrow Connector 53">
+            <a:extLst>
+              <a:ext uri="{FF2B5EF4-FFF2-40B4-BE49-F238E27FC236}">
+                <a16:creationId xmlns:a16="http://schemas.microsoft.com/office/drawing/2014/main" id="{6DED1C22-A31E-374B-A767-F42BA7BFA0A0}"/>
               </a:ext>
             </a:extLst>
           </p:cNvPr>
           <p:cNvCxnSpPr>
-            <a:stCxn id="3" idx="6"/>
-            <a:endCxn id="4" idx="2"/>
+            <a:cxnSpLocks/>
+            <a:endCxn id="57" idx="2"/>
           </p:cNvCxnSpPr>
           <p:nvPr/>
         </p:nvCxnSpPr>
         <p:spPr>
           <a:xfrm flipV="1">
-            <a:off x="7975077" y="2122898"/>
-            <a:ext cx="1035378" cy="1440730"/>
-          </a:xfrm>
-          <a:prstGeom prst="line">
+            <a:off x="7630521" y="1238817"/>
+            <a:ext cx="1345444" cy="1988596"/>
+          </a:xfrm>
+          <a:prstGeom prst="straightConnector1">
             <a:avLst/>
           </a:prstGeom>
           <a:ln>
-            <a:headEnd type="none" w="med" len="med"/>
-            <a:tailEnd type="triangle" w="med" len="med"/>
+            <a:tailEnd type="triangle"/>
           </a:ln>
         </p:spPr>
         <p:style>
@@ -5796,30 +6154,29 @@
       </p:cxnSp>
       <p:cxnSp>
         <p:nvCxnSpPr>
-          <p:cNvPr id="11" name="Straight Connector 10">
-            <a:extLst>
-              <a:ext uri="{FF2B5EF4-FFF2-40B4-BE49-F238E27FC236}">
-                <a16:creationId xmlns:a16="http://schemas.microsoft.com/office/drawing/2014/main" id="{171294B5-8104-A448-A1CE-5E6742BA963A}"/>
+          <p:cNvPr id="55" name="Straight Arrow Connector 54">
+            <a:extLst>
+              <a:ext uri="{FF2B5EF4-FFF2-40B4-BE49-F238E27FC236}">
+                <a16:creationId xmlns:a16="http://schemas.microsoft.com/office/drawing/2014/main" id="{896AD34D-4569-C741-A4F4-F8B421C9BFDC}"/>
               </a:ext>
             </a:extLst>
           </p:cNvPr>
           <p:cNvCxnSpPr>
-            <a:stCxn id="3" idx="6"/>
-            <a:endCxn id="6" idx="2"/>
+            <a:cxnSpLocks/>
+            <a:endCxn id="58" idx="2"/>
           </p:cNvCxnSpPr>
           <p:nvPr/>
         </p:nvCxnSpPr>
         <p:spPr>
-          <a:xfrm>
-            <a:off x="7975077" y="3563628"/>
-            <a:ext cx="1035378" cy="0"/>
-          </a:xfrm>
-          <a:prstGeom prst="line">
+          <a:xfrm flipV="1">
+            <a:off x="7630521" y="2553374"/>
+            <a:ext cx="1340773" cy="674039"/>
+          </a:xfrm>
+          <a:prstGeom prst="straightConnector1">
             <a:avLst/>
           </a:prstGeom>
           <a:ln>
-            <a:headEnd type="none" w="med" len="med"/>
-            <a:tailEnd type="triangle" w="med" len="med"/>
+            <a:tailEnd type="triangle"/>
           </a:ln>
         </p:spPr>
         <p:style>
@@ -5839,31 +6196,301 @@
       </p:cxnSp>
       <p:cxnSp>
         <p:nvCxnSpPr>
-          <p:cNvPr id="9" name="Straight Arrow Connector 8">
-            <a:extLst>
-              <a:ext uri="{FF2B5EF4-FFF2-40B4-BE49-F238E27FC236}">
-                <a16:creationId xmlns:a16="http://schemas.microsoft.com/office/drawing/2014/main" id="{E1D4EC07-7666-C646-B9C0-8B992C662E47}"/>
+          <p:cNvPr id="56" name="Straight Arrow Connector 55">
+            <a:extLst>
+              <a:ext uri="{FF2B5EF4-FFF2-40B4-BE49-F238E27FC236}">
+                <a16:creationId xmlns:a16="http://schemas.microsoft.com/office/drawing/2014/main" id="{EB8AEC01-20E4-4342-91F3-1551A2FD6665}"/>
               </a:ext>
             </a:extLst>
           </p:cNvPr>
           <p:cNvCxnSpPr>
-            <a:stCxn id="3" idx="6"/>
-            <a:endCxn id="7" idx="2"/>
+            <a:cxnSpLocks/>
+            <a:endCxn id="60" idx="2"/>
           </p:cNvCxnSpPr>
           <p:nvPr/>
         </p:nvCxnSpPr>
         <p:spPr>
           <a:xfrm>
-            <a:off x="7975077" y="3563628"/>
-            <a:ext cx="1035378" cy="1440730"/>
+            <a:off x="7630521" y="3227413"/>
+            <a:ext cx="1345444" cy="640518"/>
           </a:xfrm>
           <a:prstGeom prst="straightConnector1">
             <a:avLst/>
           </a:prstGeom>
           <a:ln>
+            <a:tailEnd type="triangle"/>
+          </a:ln>
+        </p:spPr>
+        <p:style>
+          <a:lnRef idx="1">
+            <a:schemeClr val="accent1"/>
+          </a:lnRef>
+          <a:fillRef idx="0">
+            <a:schemeClr val="accent1"/>
+          </a:fillRef>
+          <a:effectRef idx="0">
+            <a:schemeClr val="accent1"/>
+          </a:effectRef>
+          <a:fontRef idx="minor">
+            <a:schemeClr val="tx1"/>
+          </a:fontRef>
+        </p:style>
+      </p:cxnSp>
+      <p:sp>
+        <p:nvSpPr>
+          <p:cNvPr id="57" name="Oval 56">
+            <a:extLst>
+              <a:ext uri="{FF2B5EF4-FFF2-40B4-BE49-F238E27FC236}">
+                <a16:creationId xmlns:a16="http://schemas.microsoft.com/office/drawing/2014/main" id="{5973EB6B-292D-A94C-BFAD-F73B3D2553AB}"/>
+              </a:ext>
+            </a:extLst>
+          </p:cNvPr>
+          <p:cNvSpPr/>
+          <p:nvPr/>
+        </p:nvSpPr>
+        <p:spPr>
+          <a:xfrm>
+            <a:off x="8975965" y="755375"/>
+            <a:ext cx="989633" cy="966884"/>
+          </a:xfrm>
+          <a:prstGeom prst="ellipse">
+            <a:avLst/>
+          </a:prstGeom>
+          <a:solidFill>
+            <a:schemeClr val="tx1">
+              <a:lumMod val="50000"/>
+              <a:lumOff val="50000"/>
+            </a:schemeClr>
+          </a:solidFill>
+          <a:ln w="28575">
             <a:solidFill>
               <a:schemeClr val="accent2"/>
             </a:solidFill>
+          </a:ln>
+        </p:spPr>
+        <p:style>
+          <a:lnRef idx="2">
+            <a:schemeClr val="accent1">
+              <a:shade val="50000"/>
+            </a:schemeClr>
+          </a:lnRef>
+          <a:fillRef idx="1">
+            <a:schemeClr val="accent1"/>
+          </a:fillRef>
+          <a:effectRef idx="0">
+            <a:schemeClr val="accent1"/>
+          </a:effectRef>
+          <a:fontRef idx="minor">
+            <a:schemeClr val="lt1"/>
+          </a:fontRef>
+        </p:style>
+        <p:txBody>
+          <a:bodyPr rtlCol="0" anchor="ctr"/>
+          <a:lstStyle/>
+          <a:p>
+            <a:pPr algn="ctr"/>
+            <a:r>
+              <a:rPr lang="en-US" sz="1200" dirty="0"/>
+              <a:t>Existing Fieldtrip Node</a:t>
+            </a:r>
+          </a:p>
+        </p:txBody>
+      </p:sp>
+      <p:sp>
+        <p:nvSpPr>
+          <p:cNvPr id="58" name="Oval 57">
+            <a:extLst>
+              <a:ext uri="{FF2B5EF4-FFF2-40B4-BE49-F238E27FC236}">
+                <a16:creationId xmlns:a16="http://schemas.microsoft.com/office/drawing/2014/main" id="{06B9CAF9-61A8-AB4C-88B9-F56E84815730}"/>
+              </a:ext>
+            </a:extLst>
+          </p:cNvPr>
+          <p:cNvSpPr/>
+          <p:nvPr/>
+        </p:nvSpPr>
+        <p:spPr>
+          <a:xfrm>
+            <a:off x="8971294" y="2067650"/>
+            <a:ext cx="994304" cy="971448"/>
+          </a:xfrm>
+          <a:prstGeom prst="ellipse">
+            <a:avLst/>
+          </a:prstGeom>
+          <a:solidFill>
+            <a:schemeClr val="tx1">
+              <a:lumMod val="50000"/>
+              <a:lumOff val="50000"/>
+            </a:schemeClr>
+          </a:solidFill>
+          <a:ln w="28575">
+            <a:solidFill>
+              <a:schemeClr val="accent2"/>
+            </a:solidFill>
+          </a:ln>
+        </p:spPr>
+        <p:style>
+          <a:lnRef idx="2">
+            <a:schemeClr val="accent1">
+              <a:shade val="50000"/>
+            </a:schemeClr>
+          </a:lnRef>
+          <a:fillRef idx="1">
+            <a:schemeClr val="accent1"/>
+          </a:fillRef>
+          <a:effectRef idx="0">
+            <a:schemeClr val="accent1"/>
+          </a:effectRef>
+          <a:fontRef idx="minor">
+            <a:schemeClr val="lt1"/>
+          </a:fontRef>
+        </p:style>
+        <p:txBody>
+          <a:bodyPr rtlCol="0" anchor="ctr"/>
+          <a:lstStyle/>
+          <a:p>
+            <a:pPr algn="ctr"/>
+            <a:r>
+              <a:rPr lang="en-US" sz="1200" dirty="0"/>
+              <a:t>Existing Place Node</a:t>
+            </a:r>
+          </a:p>
+        </p:txBody>
+      </p:sp>
+      <p:sp>
+        <p:nvSpPr>
+          <p:cNvPr id="59" name="Oval 58">
+            <a:extLst>
+              <a:ext uri="{FF2B5EF4-FFF2-40B4-BE49-F238E27FC236}">
+                <a16:creationId xmlns:a16="http://schemas.microsoft.com/office/drawing/2014/main" id="{F15355EE-11F2-2A4D-B377-D7085E5DAFEC}"/>
+              </a:ext>
+            </a:extLst>
+          </p:cNvPr>
+          <p:cNvSpPr/>
+          <p:nvPr/>
+        </p:nvSpPr>
+        <p:spPr>
+          <a:xfrm>
+            <a:off x="8971294" y="4696764"/>
+            <a:ext cx="994304" cy="971448"/>
+          </a:xfrm>
+          <a:prstGeom prst="ellipse">
+            <a:avLst/>
+          </a:prstGeom>
+          <a:solidFill>
+            <a:schemeClr val="accent2"/>
+          </a:solidFill>
+        </p:spPr>
+        <p:style>
+          <a:lnRef idx="2">
+            <a:schemeClr val="accent1">
+              <a:shade val="50000"/>
+            </a:schemeClr>
+          </a:lnRef>
+          <a:fillRef idx="1">
+            <a:schemeClr val="accent1"/>
+          </a:fillRef>
+          <a:effectRef idx="0">
+            <a:schemeClr val="accent1"/>
+          </a:effectRef>
+          <a:fontRef idx="minor">
+            <a:schemeClr val="lt1"/>
+          </a:fontRef>
+        </p:style>
+        <p:txBody>
+          <a:bodyPr rtlCol="0" anchor="ctr"/>
+          <a:lstStyle/>
+          <a:p>
+            <a:pPr algn="ctr"/>
+            <a:r>
+              <a:rPr lang="en-US" sz="1200" dirty="0"/>
+              <a:t>Existing Story Node</a:t>
+            </a:r>
+          </a:p>
+        </p:txBody>
+      </p:sp>
+      <p:sp>
+        <p:nvSpPr>
+          <p:cNvPr id="60" name="Oval 59">
+            <a:extLst>
+              <a:ext uri="{FF2B5EF4-FFF2-40B4-BE49-F238E27FC236}">
+                <a16:creationId xmlns:a16="http://schemas.microsoft.com/office/drawing/2014/main" id="{CB06CBF5-5DFE-0E4A-9F64-2F1B9FE93AA7}"/>
+              </a:ext>
+            </a:extLst>
+          </p:cNvPr>
+          <p:cNvSpPr/>
+          <p:nvPr/>
+        </p:nvSpPr>
+        <p:spPr>
+          <a:xfrm>
+            <a:off x="8975965" y="3384489"/>
+            <a:ext cx="989633" cy="966884"/>
+          </a:xfrm>
+          <a:prstGeom prst="ellipse">
+            <a:avLst/>
+          </a:prstGeom>
+          <a:solidFill>
+            <a:schemeClr val="tx1">
+              <a:lumMod val="50000"/>
+              <a:lumOff val="50000"/>
+            </a:schemeClr>
+          </a:solidFill>
+          <a:ln w="28575">
+            <a:solidFill>
+              <a:schemeClr val="accent2"/>
+            </a:solidFill>
+          </a:ln>
+        </p:spPr>
+        <p:style>
+          <a:lnRef idx="2">
+            <a:schemeClr val="accent1">
+              <a:shade val="50000"/>
+            </a:schemeClr>
+          </a:lnRef>
+          <a:fillRef idx="1">
+            <a:schemeClr val="accent1"/>
+          </a:fillRef>
+          <a:effectRef idx="0">
+            <a:schemeClr val="accent1"/>
+          </a:effectRef>
+          <a:fontRef idx="minor">
+            <a:schemeClr val="lt1"/>
+          </a:fontRef>
+        </p:style>
+        <p:txBody>
+          <a:bodyPr rtlCol="0" anchor="ctr"/>
+          <a:lstStyle/>
+          <a:p>
+            <a:pPr algn="ctr"/>
+            <a:r>
+              <a:rPr lang="en-US" sz="1200" dirty="0"/>
+              <a:t>Existing Person Node</a:t>
+            </a:r>
+          </a:p>
+        </p:txBody>
+      </p:sp>
+      <p:cxnSp>
+        <p:nvCxnSpPr>
+          <p:cNvPr id="62" name="Straight Arrow Connector 61">
+            <a:extLst>
+              <a:ext uri="{FF2B5EF4-FFF2-40B4-BE49-F238E27FC236}">
+                <a16:creationId xmlns:a16="http://schemas.microsoft.com/office/drawing/2014/main" id="{9684B8EA-0279-264E-B9B8-FD47E31430FE}"/>
+              </a:ext>
+            </a:extLst>
+          </p:cNvPr>
+          <p:cNvCxnSpPr>
+            <a:endCxn id="59" idx="0"/>
+          </p:cNvCxnSpPr>
+          <p:nvPr/>
+        </p:nvCxnSpPr>
+        <p:spPr>
+          <a:xfrm flipH="1">
+            <a:off x="9468446" y="4351373"/>
+            <a:ext cx="6858" cy="345391"/>
+          </a:xfrm>
+          <a:prstGeom prst="straightConnector1">
+            <a:avLst/>
+          </a:prstGeom>
+          <a:ln>
             <a:tailEnd type="triangle"/>
           </a:ln>
         </p:spPr>
@@ -5884,49 +6511,95 @@
       </p:cxnSp>
       <p:cxnSp>
         <p:nvCxnSpPr>
-          <p:cNvPr id="13" name="Straight Arrow Connector 12">
-            <a:extLst>
-              <a:ext uri="{FF2B5EF4-FFF2-40B4-BE49-F238E27FC236}">
-                <a16:creationId xmlns:a16="http://schemas.microsoft.com/office/drawing/2014/main" id="{9C0CD859-1B63-A344-994E-2C43824A5065}"/>
+          <p:cNvPr id="64" name="Straight Arrow Connector 63">
+            <a:extLst>
+              <a:ext uri="{FF2B5EF4-FFF2-40B4-BE49-F238E27FC236}">
+                <a16:creationId xmlns:a16="http://schemas.microsoft.com/office/drawing/2014/main" id="{4F4B7BF2-05E0-B143-9045-5F19DE174204}"/>
               </a:ext>
             </a:extLst>
           </p:cNvPr>
           <p:cNvCxnSpPr>
-            <a:stCxn id="6" idx="4"/>
-            <a:endCxn id="7" idx="0"/>
+            <a:cxnSpLocks/>
+            <a:endCxn id="59" idx="2"/>
           </p:cNvCxnSpPr>
           <p:nvPr/>
         </p:nvCxnSpPr>
         <p:spPr>
           <a:xfrm>
-            <a:off x="9420521" y="3964267"/>
-            <a:ext cx="0" cy="639451"/>
+            <a:off x="7630521" y="3227413"/>
+            <a:ext cx="1340773" cy="1955075"/>
           </a:xfrm>
           <a:prstGeom prst="straightConnector1">
             <a:avLst/>
           </a:prstGeom>
           <a:ln>
-            <a:solidFill>
-              <a:schemeClr val="accent1"/>
-            </a:solidFill>
             <a:tailEnd type="triangle"/>
           </a:ln>
         </p:spPr>
         <p:style>
           <a:lnRef idx="1">
-            <a:schemeClr val="accent1"/>
+            <a:schemeClr val="accent2"/>
           </a:lnRef>
           <a:fillRef idx="0">
-            <a:schemeClr val="accent1"/>
+            <a:schemeClr val="accent2"/>
           </a:fillRef>
           <a:effectRef idx="0">
-            <a:schemeClr val="accent1"/>
+            <a:schemeClr val="accent2"/>
           </a:effectRef>
           <a:fontRef idx="minor">
             <a:schemeClr val="tx1"/>
           </a:fontRef>
         </p:style>
       </p:cxnSp>
+      <p:sp>
+        <p:nvSpPr>
+          <p:cNvPr id="69" name="Oval 68">
+            <a:extLst>
+              <a:ext uri="{FF2B5EF4-FFF2-40B4-BE49-F238E27FC236}">
+                <a16:creationId xmlns:a16="http://schemas.microsoft.com/office/drawing/2014/main" id="{51FD1AEA-2317-844B-8B8C-A5F1C10D3310}"/>
+              </a:ext>
+            </a:extLst>
+          </p:cNvPr>
+          <p:cNvSpPr/>
+          <p:nvPr/>
+        </p:nvSpPr>
+        <p:spPr>
+          <a:xfrm>
+            <a:off x="6631546" y="2741689"/>
+            <a:ext cx="994304" cy="971447"/>
+          </a:xfrm>
+          <a:prstGeom prst="ellipse">
+            <a:avLst/>
+          </a:prstGeom>
+        </p:spPr>
+        <p:style>
+          <a:lnRef idx="2">
+            <a:schemeClr val="accent1">
+              <a:shade val="50000"/>
+            </a:schemeClr>
+          </a:lnRef>
+          <a:fillRef idx="1">
+            <a:schemeClr val="accent1"/>
+          </a:fillRef>
+          <a:effectRef idx="0">
+            <a:schemeClr val="accent1"/>
+          </a:effectRef>
+          <a:fontRef idx="minor">
+            <a:schemeClr val="lt1"/>
+          </a:fontRef>
+        </p:style>
+        <p:txBody>
+          <a:bodyPr rtlCol="0" anchor="ctr"/>
+          <a:lstStyle/>
+          <a:p>
+            <a:pPr algn="ctr"/>
+            <a:r>
+              <a:rPr lang="en-US" sz="1200" dirty="0"/>
+              <a:t>New Story Node</a:t>
+            </a:r>
+          </a:p>
+        </p:txBody>
+      </p:sp>
     </p:spTree>
     <p:extLst>
       <p:ext uri="{BB962C8B-B14F-4D97-AF65-F5344CB8AC3E}">
@@ -5959,221 +6632,6 @@
       </p:grpSpPr>
       <p:sp>
         <p:nvSpPr>
-          <p:cNvPr id="3" name="Oval 2">
-            <a:extLst>
-              <a:ext uri="{FF2B5EF4-FFF2-40B4-BE49-F238E27FC236}">
-                <a16:creationId xmlns:a16="http://schemas.microsoft.com/office/drawing/2014/main" id="{BB15AB6B-9DD5-FB40-AE38-8A08B9A3CCEF}"/>
-              </a:ext>
-            </a:extLst>
-          </p:cNvPr>
-          <p:cNvSpPr/>
-          <p:nvPr/>
-        </p:nvSpPr>
-        <p:spPr>
-          <a:xfrm>
-            <a:off x="7154945" y="3162988"/>
-            <a:ext cx="820132" cy="801279"/>
-          </a:xfrm>
-          <a:prstGeom prst="ellipse">
-            <a:avLst/>
-          </a:prstGeom>
-        </p:spPr>
-        <p:style>
-          <a:lnRef idx="2">
-            <a:schemeClr val="accent1">
-              <a:shade val="50000"/>
-            </a:schemeClr>
-          </a:lnRef>
-          <a:fillRef idx="1">
-            <a:schemeClr val="accent1"/>
-          </a:fillRef>
-          <a:effectRef idx="0">
-            <a:schemeClr val="accent1"/>
-          </a:effectRef>
-          <a:fontRef idx="minor">
-            <a:schemeClr val="lt1"/>
-          </a:fontRef>
-        </p:style>
-        <p:txBody>
-          <a:bodyPr rtlCol="0" anchor="ctr"/>
-          <a:lstStyle/>
-          <a:p>
-            <a:pPr algn="ctr"/>
-            <a:r>
-              <a:rPr lang="en-US" sz="1400" dirty="0"/>
-              <a:t>New Story Node</a:t>
-            </a:r>
-          </a:p>
-        </p:txBody>
-      </p:sp>
-      <p:sp>
-        <p:nvSpPr>
-          <p:cNvPr id="4" name="Oval 3">
-            <a:extLst>
-              <a:ext uri="{FF2B5EF4-FFF2-40B4-BE49-F238E27FC236}">
-                <a16:creationId xmlns:a16="http://schemas.microsoft.com/office/drawing/2014/main" id="{D1D4AF6D-741A-A445-91EF-ACB3FF40CBEF}"/>
-              </a:ext>
-            </a:extLst>
-          </p:cNvPr>
-          <p:cNvSpPr/>
-          <p:nvPr/>
-        </p:nvSpPr>
-        <p:spPr>
-          <a:xfrm>
-            <a:off x="9010455" y="1722258"/>
-            <a:ext cx="820132" cy="801279"/>
-          </a:xfrm>
-          <a:prstGeom prst="ellipse">
-            <a:avLst/>
-          </a:prstGeom>
-          <a:solidFill>
-            <a:schemeClr val="tx2"/>
-          </a:solidFill>
-          <a:ln w="28575">
-            <a:solidFill>
-              <a:schemeClr val="accent2"/>
-            </a:solidFill>
-          </a:ln>
-        </p:spPr>
-        <p:style>
-          <a:lnRef idx="2">
-            <a:schemeClr val="accent1">
-              <a:shade val="50000"/>
-            </a:schemeClr>
-          </a:lnRef>
-          <a:fillRef idx="1">
-            <a:schemeClr val="accent1"/>
-          </a:fillRef>
-          <a:effectRef idx="0">
-            <a:schemeClr val="accent1"/>
-          </a:effectRef>
-          <a:fontRef idx="minor">
-            <a:schemeClr val="lt1"/>
-          </a:fontRef>
-        </p:style>
-        <p:txBody>
-          <a:bodyPr rtlCol="0" anchor="ctr"/>
-          <a:lstStyle/>
-          <a:p>
-            <a:pPr algn="ctr"/>
-            <a:r>
-              <a:rPr lang="en-US" sz="1000" dirty="0"/>
-              <a:t>Existing Place Node</a:t>
-            </a:r>
-          </a:p>
-        </p:txBody>
-      </p:sp>
-      <p:sp>
-        <p:nvSpPr>
-          <p:cNvPr id="6" name="Oval 5">
-            <a:extLst>
-              <a:ext uri="{FF2B5EF4-FFF2-40B4-BE49-F238E27FC236}">
-                <a16:creationId xmlns:a16="http://schemas.microsoft.com/office/drawing/2014/main" id="{1611AD07-93D2-D546-88A0-1A9F52FA5581}"/>
-              </a:ext>
-            </a:extLst>
-          </p:cNvPr>
-          <p:cNvSpPr/>
-          <p:nvPr/>
-        </p:nvSpPr>
-        <p:spPr>
-          <a:xfrm>
-            <a:off x="9010455" y="3162988"/>
-            <a:ext cx="820132" cy="801279"/>
-          </a:xfrm>
-          <a:prstGeom prst="ellipse">
-            <a:avLst/>
-          </a:prstGeom>
-          <a:solidFill>
-            <a:schemeClr val="tx2"/>
-          </a:solidFill>
-          <a:ln w="28575">
-            <a:solidFill>
-              <a:schemeClr val="accent2"/>
-            </a:solidFill>
-          </a:ln>
-        </p:spPr>
-        <p:style>
-          <a:lnRef idx="2">
-            <a:schemeClr val="accent1">
-              <a:shade val="50000"/>
-            </a:schemeClr>
-          </a:lnRef>
-          <a:fillRef idx="1">
-            <a:schemeClr val="accent1"/>
-          </a:fillRef>
-          <a:effectRef idx="0">
-            <a:schemeClr val="accent1"/>
-          </a:effectRef>
-          <a:fontRef idx="minor">
-            <a:schemeClr val="lt1"/>
-          </a:fontRef>
-        </p:style>
-        <p:txBody>
-          <a:bodyPr rtlCol="0" anchor="ctr"/>
-          <a:lstStyle/>
-          <a:p>
-            <a:pPr algn="ctr"/>
-            <a:r>
-              <a:rPr lang="en-US" sz="1000" dirty="0"/>
-              <a:t>Existing Person Node</a:t>
-            </a:r>
-          </a:p>
-        </p:txBody>
-      </p:sp>
-      <p:sp>
-        <p:nvSpPr>
-          <p:cNvPr id="7" name="Oval 6">
-            <a:extLst>
-              <a:ext uri="{FF2B5EF4-FFF2-40B4-BE49-F238E27FC236}">
-                <a16:creationId xmlns:a16="http://schemas.microsoft.com/office/drawing/2014/main" id="{3AFC829C-24C0-3444-97A7-851101FEAC23}"/>
-              </a:ext>
-            </a:extLst>
-          </p:cNvPr>
-          <p:cNvSpPr/>
-          <p:nvPr/>
-        </p:nvSpPr>
-        <p:spPr>
-          <a:xfrm>
-            <a:off x="9010455" y="4603718"/>
-            <a:ext cx="820132" cy="801279"/>
-          </a:xfrm>
-          <a:prstGeom prst="ellipse">
-            <a:avLst/>
-          </a:prstGeom>
-          <a:solidFill>
-            <a:schemeClr val="accent2"/>
-          </a:solidFill>
-        </p:spPr>
-        <p:style>
-          <a:lnRef idx="2">
-            <a:schemeClr val="accent1">
-              <a:shade val="50000"/>
-            </a:schemeClr>
-          </a:lnRef>
-          <a:fillRef idx="1">
-            <a:schemeClr val="accent1"/>
-          </a:fillRef>
-          <a:effectRef idx="0">
-            <a:schemeClr val="accent1"/>
-          </a:effectRef>
-          <a:fontRef idx="minor">
-            <a:schemeClr val="lt1"/>
-          </a:fontRef>
-        </p:style>
-        <p:txBody>
-          <a:bodyPr rtlCol="0" anchor="ctr"/>
-          <a:lstStyle/>
-          <a:p>
-            <a:pPr algn="ctr"/>
-            <a:r>
-              <a:rPr lang="en-US" sz="1000" dirty="0"/>
-              <a:t>Existing Story Node</a:t>
-            </a:r>
-          </a:p>
-        </p:txBody>
-      </p:sp>
-      <p:sp>
-        <p:nvSpPr>
           <p:cNvPr id="8" name="Title 7">
             <a:extLst>
               <a:ext uri="{FF2B5EF4-FFF2-40B4-BE49-F238E27FC236}">
@@ -6188,7 +6646,12 @@
             <p:ph type="title"/>
           </p:nvPr>
         </p:nvSpPr>
-        <p:spPr/>
+        <p:spPr>
+          <a:xfrm>
+            <a:off x="839788" y="457200"/>
+            <a:ext cx="3932237" cy="1265058"/>
+          </a:xfrm>
+        </p:spPr>
         <p:txBody>
           <a:bodyPr/>
           <a:lstStyle/>
@@ -6218,13 +6681,13 @@
         </p:nvSpPr>
         <p:spPr>
           <a:xfrm>
-            <a:off x="839788" y="2057399"/>
-            <a:ext cx="4090431" cy="4541363"/>
+            <a:off x="839788" y="1722258"/>
+            <a:ext cx="3932237" cy="5135742"/>
           </a:xfrm>
         </p:spPr>
         <p:txBody>
           <a:bodyPr>
-            <a:normAutofit fontScale="92500" lnSpcReduction="10000"/>
+            <a:normAutofit/>
           </a:bodyPr>
           <a:lstStyle/>
           <a:p>
@@ -6233,8 +6696,8 @@
               <a:buChar char="•"/>
             </a:pPr>
             <a:r>
-              <a:rPr lang="en-US" sz="1700" dirty="0"/>
-              <a:t>New story node knows directly the person and places associated with it.</a:t>
+              <a:rPr lang="en-US" dirty="0"/>
+              <a:t>New story node knows directly the person, places, and fieldtrips associated with it.</a:t>
             </a:r>
           </a:p>
           <a:p>
@@ -6243,8 +6706,8 @@
               <a:buChar char="•"/>
             </a:pPr>
             <a:r>
-              <a:rPr lang="en-US" sz="1700" dirty="0"/>
-              <a:t>When one of the new story node’s associated person or places matches with an existing node from the network, a primary edge can be created.</a:t>
+              <a:rPr lang="en-US" dirty="0"/>
+              <a:t>When one of the new story node’s associated person, places, or fieldtrips matches with an existing node from the network, a primary edge can be created.</a:t>
             </a:r>
           </a:p>
           <a:p>
@@ -6253,8 +6716,8 @@
               <a:buChar char="•"/>
             </a:pPr>
             <a:r>
-              <a:rPr lang="en-US" sz="1700" dirty="0"/>
-              <a:t>An edge between a story and story can only be created when the stories share a common person or place. This is called a secondary edge.</a:t>
+              <a:rPr lang="en-US" dirty="0"/>
+              <a:t>Any two nodes that both share a common, third node can be linked together. This is called a secondary edge.</a:t>
             </a:r>
           </a:p>
           <a:p>
@@ -6263,70 +6726,38 @@
               <a:buChar char="•"/>
             </a:pPr>
             <a:r>
-              <a:rPr lang="en-US" sz="1700" b="1" dirty="0"/>
-              <a:t>Nodes in this example graph that are grey filled with orange edges represent nodes that can have primary or secondary edges with respect to a new story. Nodes in orange can only have secondary edges with respect to a new story. </a:t>
-            </a:r>
-          </a:p>
-          <a:p>
-            <a:pPr marL="742950" lvl="1" indent="-285750">
-              <a:buFont typeface="Arial" panose="020B0604020202020204" pitchFamily="34" charset="0"/>
-              <a:buChar char="•"/>
-            </a:pPr>
-            <a:r>
-              <a:rPr lang="en-US" sz="1500" u="sng" dirty="0"/>
-              <a:t>The </a:t>
-            </a:r>
-            <a:r>
-              <a:rPr lang="en-US" sz="1500" u="sng" dirty="0" err="1"/>
-              <a:t>newNode</a:t>
-            </a:r>
-            <a:r>
-              <a:rPr lang="en-US" sz="1500" u="sng" dirty="0"/>
-              <a:t> can be either a person, place, or story, and can link to other people, places, or stories, but secondary edges currently are only implemented for story to story connections.</a:t>
-            </a:r>
-          </a:p>
-          <a:p>
-            <a:pPr marL="285750" indent="-285750">
-              <a:buFont typeface="Arial" panose="020B0604020202020204" pitchFamily="34" charset="0"/>
-              <a:buChar char="•"/>
-            </a:pPr>
-            <a:endParaRPr lang="en-US" b="1" dirty="0"/>
-          </a:p>
-          <a:p>
-            <a:pPr marL="285750" indent="-285750">
-              <a:buFont typeface="Arial" panose="020B0604020202020204" pitchFamily="34" charset="0"/>
-              <a:buChar char="•"/>
-            </a:pPr>
+              <a:rPr lang="en-US" b="1" dirty="0"/>
+              <a:t>Nodes in this example graph that are grey filled with orange edges represent nodes that can have primary or secondary edges with respect to a new story. Nodes in orange can only have secondary edges with respect to a new story.</a:t>
+            </a:r>
             <a:endParaRPr lang="en-US" dirty="0"/>
           </a:p>
         </p:txBody>
       </p:sp>
       <p:cxnSp>
         <p:nvCxnSpPr>
-          <p:cNvPr id="5" name="Straight Connector 4">
-            <a:extLst>
-              <a:ext uri="{FF2B5EF4-FFF2-40B4-BE49-F238E27FC236}">
-                <a16:creationId xmlns:a16="http://schemas.microsoft.com/office/drawing/2014/main" id="{34D2CF34-809A-7E47-A276-34BC4B62603F}"/>
+          <p:cNvPr id="45" name="Straight Arrow Connector 44">
+            <a:extLst>
+              <a:ext uri="{FF2B5EF4-FFF2-40B4-BE49-F238E27FC236}">
+                <a16:creationId xmlns:a16="http://schemas.microsoft.com/office/drawing/2014/main" id="{6C82D971-B24F-AF46-8E2B-FB74175C8485}"/>
               </a:ext>
             </a:extLst>
           </p:cNvPr>
           <p:cNvCxnSpPr>
-            <a:stCxn id="3" idx="6"/>
-            <a:endCxn id="4" idx="2"/>
+            <a:cxnSpLocks/>
+            <a:endCxn id="48" idx="2"/>
           </p:cNvCxnSpPr>
           <p:nvPr/>
         </p:nvCxnSpPr>
         <p:spPr>
           <a:xfrm flipV="1">
-            <a:off x="7975077" y="2122898"/>
-            <a:ext cx="1035378" cy="1440730"/>
-          </a:xfrm>
-          <a:prstGeom prst="line">
+            <a:off x="7630521" y="1238817"/>
+            <a:ext cx="1345444" cy="1988596"/>
+          </a:xfrm>
+          <a:prstGeom prst="straightConnector1">
             <a:avLst/>
           </a:prstGeom>
           <a:ln>
-            <a:headEnd type="none" w="med" len="med"/>
-            <a:tailEnd type="triangle" w="med" len="med"/>
+            <a:tailEnd type="triangle"/>
           </a:ln>
         </p:spPr>
         <p:style>
@@ -6346,30 +6777,29 @@
       </p:cxnSp>
       <p:cxnSp>
         <p:nvCxnSpPr>
-          <p:cNvPr id="11" name="Straight Connector 10">
-            <a:extLst>
-              <a:ext uri="{FF2B5EF4-FFF2-40B4-BE49-F238E27FC236}">
-                <a16:creationId xmlns:a16="http://schemas.microsoft.com/office/drawing/2014/main" id="{171294B5-8104-A448-A1CE-5E6742BA963A}"/>
+          <p:cNvPr id="46" name="Straight Arrow Connector 45">
+            <a:extLst>
+              <a:ext uri="{FF2B5EF4-FFF2-40B4-BE49-F238E27FC236}">
+                <a16:creationId xmlns:a16="http://schemas.microsoft.com/office/drawing/2014/main" id="{1BCD31E4-3599-2340-B8FF-B9897E077C39}"/>
               </a:ext>
             </a:extLst>
           </p:cNvPr>
           <p:cNvCxnSpPr>
-            <a:stCxn id="3" idx="6"/>
-            <a:endCxn id="6" idx="2"/>
+            <a:cxnSpLocks/>
+            <a:endCxn id="49" idx="2"/>
           </p:cNvCxnSpPr>
           <p:nvPr/>
         </p:nvCxnSpPr>
         <p:spPr>
-          <a:xfrm>
-            <a:off x="7975077" y="3563628"/>
-            <a:ext cx="1035378" cy="0"/>
-          </a:xfrm>
-          <a:prstGeom prst="line">
+          <a:xfrm flipV="1">
+            <a:off x="7630521" y="2553374"/>
+            <a:ext cx="1340773" cy="674039"/>
+          </a:xfrm>
+          <a:prstGeom prst="straightConnector1">
             <a:avLst/>
           </a:prstGeom>
           <a:ln>
-            <a:headEnd type="none" w="med" len="med"/>
-            <a:tailEnd type="triangle" w="med" len="med"/>
+            <a:tailEnd type="triangle"/>
           </a:ln>
         </p:spPr>
         <p:style>
@@ -6389,31 +6819,301 @@
       </p:cxnSp>
       <p:cxnSp>
         <p:nvCxnSpPr>
-          <p:cNvPr id="9" name="Straight Arrow Connector 8">
-            <a:extLst>
-              <a:ext uri="{FF2B5EF4-FFF2-40B4-BE49-F238E27FC236}">
-                <a16:creationId xmlns:a16="http://schemas.microsoft.com/office/drawing/2014/main" id="{E1D4EC07-7666-C646-B9C0-8B992C662E47}"/>
+          <p:cNvPr id="47" name="Straight Arrow Connector 46">
+            <a:extLst>
+              <a:ext uri="{FF2B5EF4-FFF2-40B4-BE49-F238E27FC236}">
+                <a16:creationId xmlns:a16="http://schemas.microsoft.com/office/drawing/2014/main" id="{678DD91A-7C04-834C-A5A8-68F1A0EFBDAA}"/>
               </a:ext>
             </a:extLst>
           </p:cNvPr>
           <p:cNvCxnSpPr>
-            <a:stCxn id="3" idx="6"/>
-            <a:endCxn id="7" idx="2"/>
+            <a:cxnSpLocks/>
+            <a:endCxn id="51" idx="2"/>
           </p:cNvCxnSpPr>
           <p:nvPr/>
         </p:nvCxnSpPr>
         <p:spPr>
           <a:xfrm>
-            <a:off x="7975077" y="3563628"/>
-            <a:ext cx="1035378" cy="1440730"/>
+            <a:off x="7630521" y="3227413"/>
+            <a:ext cx="1345444" cy="640518"/>
           </a:xfrm>
           <a:prstGeom prst="straightConnector1">
             <a:avLst/>
           </a:prstGeom>
           <a:ln>
+            <a:tailEnd type="triangle"/>
+          </a:ln>
+        </p:spPr>
+        <p:style>
+          <a:lnRef idx="1">
+            <a:schemeClr val="accent1"/>
+          </a:lnRef>
+          <a:fillRef idx="0">
+            <a:schemeClr val="accent1"/>
+          </a:fillRef>
+          <a:effectRef idx="0">
+            <a:schemeClr val="accent1"/>
+          </a:effectRef>
+          <a:fontRef idx="minor">
+            <a:schemeClr val="tx1"/>
+          </a:fontRef>
+        </p:style>
+      </p:cxnSp>
+      <p:sp>
+        <p:nvSpPr>
+          <p:cNvPr id="48" name="Oval 47">
+            <a:extLst>
+              <a:ext uri="{FF2B5EF4-FFF2-40B4-BE49-F238E27FC236}">
+                <a16:creationId xmlns:a16="http://schemas.microsoft.com/office/drawing/2014/main" id="{9C79B9B4-22E5-4145-9259-7E6783B018BE}"/>
+              </a:ext>
+            </a:extLst>
+          </p:cNvPr>
+          <p:cNvSpPr/>
+          <p:nvPr/>
+        </p:nvSpPr>
+        <p:spPr>
+          <a:xfrm>
+            <a:off x="8975965" y="755375"/>
+            <a:ext cx="989633" cy="966884"/>
+          </a:xfrm>
+          <a:prstGeom prst="ellipse">
+            <a:avLst/>
+          </a:prstGeom>
+          <a:solidFill>
+            <a:schemeClr val="tx1">
+              <a:lumMod val="50000"/>
+              <a:lumOff val="50000"/>
+            </a:schemeClr>
+          </a:solidFill>
+          <a:ln w="28575">
             <a:solidFill>
               <a:schemeClr val="accent2"/>
             </a:solidFill>
+          </a:ln>
+        </p:spPr>
+        <p:style>
+          <a:lnRef idx="2">
+            <a:schemeClr val="accent1">
+              <a:shade val="50000"/>
+            </a:schemeClr>
+          </a:lnRef>
+          <a:fillRef idx="1">
+            <a:schemeClr val="accent1"/>
+          </a:fillRef>
+          <a:effectRef idx="0">
+            <a:schemeClr val="accent1"/>
+          </a:effectRef>
+          <a:fontRef idx="minor">
+            <a:schemeClr val="lt1"/>
+          </a:fontRef>
+        </p:style>
+        <p:txBody>
+          <a:bodyPr rtlCol="0" anchor="ctr"/>
+          <a:lstStyle/>
+          <a:p>
+            <a:pPr algn="ctr"/>
+            <a:r>
+              <a:rPr lang="en-US" sz="1200" dirty="0"/>
+              <a:t>Existing Fieldtrip Node</a:t>
+            </a:r>
+          </a:p>
+        </p:txBody>
+      </p:sp>
+      <p:sp>
+        <p:nvSpPr>
+          <p:cNvPr id="49" name="Oval 48">
+            <a:extLst>
+              <a:ext uri="{FF2B5EF4-FFF2-40B4-BE49-F238E27FC236}">
+                <a16:creationId xmlns:a16="http://schemas.microsoft.com/office/drawing/2014/main" id="{63F48BF7-23D4-CE40-AFCE-9D7BD17761E7}"/>
+              </a:ext>
+            </a:extLst>
+          </p:cNvPr>
+          <p:cNvSpPr/>
+          <p:nvPr/>
+        </p:nvSpPr>
+        <p:spPr>
+          <a:xfrm>
+            <a:off x="8971294" y="2067650"/>
+            <a:ext cx="994304" cy="971448"/>
+          </a:xfrm>
+          <a:prstGeom prst="ellipse">
+            <a:avLst/>
+          </a:prstGeom>
+          <a:solidFill>
+            <a:schemeClr val="tx1">
+              <a:lumMod val="50000"/>
+              <a:lumOff val="50000"/>
+            </a:schemeClr>
+          </a:solidFill>
+          <a:ln w="28575">
+            <a:solidFill>
+              <a:schemeClr val="accent2"/>
+            </a:solidFill>
+          </a:ln>
+        </p:spPr>
+        <p:style>
+          <a:lnRef idx="2">
+            <a:schemeClr val="accent1">
+              <a:shade val="50000"/>
+            </a:schemeClr>
+          </a:lnRef>
+          <a:fillRef idx="1">
+            <a:schemeClr val="accent1"/>
+          </a:fillRef>
+          <a:effectRef idx="0">
+            <a:schemeClr val="accent1"/>
+          </a:effectRef>
+          <a:fontRef idx="minor">
+            <a:schemeClr val="lt1"/>
+          </a:fontRef>
+        </p:style>
+        <p:txBody>
+          <a:bodyPr rtlCol="0" anchor="ctr"/>
+          <a:lstStyle/>
+          <a:p>
+            <a:pPr algn="ctr"/>
+            <a:r>
+              <a:rPr lang="en-US" sz="1200" dirty="0"/>
+              <a:t>Existing Place Node</a:t>
+            </a:r>
+          </a:p>
+        </p:txBody>
+      </p:sp>
+      <p:sp>
+        <p:nvSpPr>
+          <p:cNvPr id="50" name="Oval 49">
+            <a:extLst>
+              <a:ext uri="{FF2B5EF4-FFF2-40B4-BE49-F238E27FC236}">
+                <a16:creationId xmlns:a16="http://schemas.microsoft.com/office/drawing/2014/main" id="{8BEB9838-53B4-FB4C-ADA0-6F03C996C10C}"/>
+              </a:ext>
+            </a:extLst>
+          </p:cNvPr>
+          <p:cNvSpPr/>
+          <p:nvPr/>
+        </p:nvSpPr>
+        <p:spPr>
+          <a:xfrm>
+            <a:off x="8971294" y="4696764"/>
+            <a:ext cx="994304" cy="971448"/>
+          </a:xfrm>
+          <a:prstGeom prst="ellipse">
+            <a:avLst/>
+          </a:prstGeom>
+          <a:solidFill>
+            <a:schemeClr val="accent2"/>
+          </a:solidFill>
+        </p:spPr>
+        <p:style>
+          <a:lnRef idx="2">
+            <a:schemeClr val="accent1">
+              <a:shade val="50000"/>
+            </a:schemeClr>
+          </a:lnRef>
+          <a:fillRef idx="1">
+            <a:schemeClr val="accent1"/>
+          </a:fillRef>
+          <a:effectRef idx="0">
+            <a:schemeClr val="accent1"/>
+          </a:effectRef>
+          <a:fontRef idx="minor">
+            <a:schemeClr val="lt1"/>
+          </a:fontRef>
+        </p:style>
+        <p:txBody>
+          <a:bodyPr rtlCol="0" anchor="ctr"/>
+          <a:lstStyle/>
+          <a:p>
+            <a:pPr algn="ctr"/>
+            <a:r>
+              <a:rPr lang="en-US" sz="1200" dirty="0"/>
+              <a:t>Existing Story Node</a:t>
+            </a:r>
+          </a:p>
+        </p:txBody>
+      </p:sp>
+      <p:sp>
+        <p:nvSpPr>
+          <p:cNvPr id="51" name="Oval 50">
+            <a:extLst>
+              <a:ext uri="{FF2B5EF4-FFF2-40B4-BE49-F238E27FC236}">
+                <a16:creationId xmlns:a16="http://schemas.microsoft.com/office/drawing/2014/main" id="{7386FD24-23B2-5845-9815-C8134B2DA54B}"/>
+              </a:ext>
+            </a:extLst>
+          </p:cNvPr>
+          <p:cNvSpPr/>
+          <p:nvPr/>
+        </p:nvSpPr>
+        <p:spPr>
+          <a:xfrm>
+            <a:off x="8975965" y="3384489"/>
+            <a:ext cx="989633" cy="966884"/>
+          </a:xfrm>
+          <a:prstGeom prst="ellipse">
+            <a:avLst/>
+          </a:prstGeom>
+          <a:solidFill>
+            <a:schemeClr val="tx1">
+              <a:lumMod val="50000"/>
+              <a:lumOff val="50000"/>
+            </a:schemeClr>
+          </a:solidFill>
+          <a:ln w="28575">
+            <a:solidFill>
+              <a:schemeClr val="accent2"/>
+            </a:solidFill>
+          </a:ln>
+        </p:spPr>
+        <p:style>
+          <a:lnRef idx="2">
+            <a:schemeClr val="accent1">
+              <a:shade val="50000"/>
+            </a:schemeClr>
+          </a:lnRef>
+          <a:fillRef idx="1">
+            <a:schemeClr val="accent1"/>
+          </a:fillRef>
+          <a:effectRef idx="0">
+            <a:schemeClr val="accent1"/>
+          </a:effectRef>
+          <a:fontRef idx="minor">
+            <a:schemeClr val="lt1"/>
+          </a:fontRef>
+        </p:style>
+        <p:txBody>
+          <a:bodyPr rtlCol="0" anchor="ctr"/>
+          <a:lstStyle/>
+          <a:p>
+            <a:pPr algn="ctr"/>
+            <a:r>
+              <a:rPr lang="en-US" sz="1200" dirty="0"/>
+              <a:t>Existing Person Node</a:t>
+            </a:r>
+          </a:p>
+        </p:txBody>
+      </p:sp>
+      <p:cxnSp>
+        <p:nvCxnSpPr>
+          <p:cNvPr id="52" name="Straight Arrow Connector 51">
+            <a:extLst>
+              <a:ext uri="{FF2B5EF4-FFF2-40B4-BE49-F238E27FC236}">
+                <a16:creationId xmlns:a16="http://schemas.microsoft.com/office/drawing/2014/main" id="{565BE3F7-4F76-B145-9210-1C4EEB3A750A}"/>
+              </a:ext>
+            </a:extLst>
+          </p:cNvPr>
+          <p:cNvCxnSpPr>
+            <a:endCxn id="50" idx="0"/>
+          </p:cNvCxnSpPr>
+          <p:nvPr/>
+        </p:nvCxnSpPr>
+        <p:spPr>
+          <a:xfrm flipH="1">
+            <a:off x="9468446" y="4351373"/>
+            <a:ext cx="6858" cy="345391"/>
+          </a:xfrm>
+          <a:prstGeom prst="straightConnector1">
+            <a:avLst/>
+          </a:prstGeom>
+          <a:ln>
             <a:tailEnd type="triangle"/>
           </a:ln>
         </p:spPr>
@@ -6434,85 +7134,52 @@
       </p:cxnSp>
       <p:cxnSp>
         <p:nvCxnSpPr>
-          <p:cNvPr id="13" name="Straight Arrow Connector 12">
-            <a:extLst>
-              <a:ext uri="{FF2B5EF4-FFF2-40B4-BE49-F238E27FC236}">
-                <a16:creationId xmlns:a16="http://schemas.microsoft.com/office/drawing/2014/main" id="{9C0CD859-1B63-A344-994E-2C43824A5065}"/>
+          <p:cNvPr id="53" name="Straight Arrow Connector 52">
+            <a:extLst>
+              <a:ext uri="{FF2B5EF4-FFF2-40B4-BE49-F238E27FC236}">
+                <a16:creationId xmlns:a16="http://schemas.microsoft.com/office/drawing/2014/main" id="{73189FF6-EC34-9440-BFEA-F7DE30828220}"/>
               </a:ext>
             </a:extLst>
           </p:cNvPr>
           <p:cNvCxnSpPr>
-            <a:stCxn id="6" idx="4"/>
-            <a:endCxn id="7" idx="0"/>
+            <a:cxnSpLocks/>
+            <a:endCxn id="50" idx="2"/>
           </p:cNvCxnSpPr>
           <p:nvPr/>
         </p:nvCxnSpPr>
         <p:spPr>
           <a:xfrm>
-            <a:off x="9420521" y="3964267"/>
-            <a:ext cx="0" cy="639451"/>
+            <a:off x="7630521" y="3227413"/>
+            <a:ext cx="1340773" cy="1955075"/>
           </a:xfrm>
           <a:prstGeom prst="straightConnector1">
             <a:avLst/>
           </a:prstGeom>
           <a:ln>
-            <a:solidFill>
-              <a:schemeClr val="accent1"/>
-            </a:solidFill>
             <a:tailEnd type="triangle"/>
           </a:ln>
         </p:spPr>
         <p:style>
           <a:lnRef idx="1">
-            <a:schemeClr val="accent1"/>
+            <a:schemeClr val="accent2"/>
           </a:lnRef>
           <a:fillRef idx="0">
-            <a:schemeClr val="accent1"/>
+            <a:schemeClr val="accent2"/>
           </a:fillRef>
           <a:effectRef idx="0">
-            <a:schemeClr val="accent1"/>
+            <a:schemeClr val="accent2"/>
           </a:effectRef>
           <a:fontRef idx="minor">
             <a:schemeClr val="tx1"/>
           </a:fontRef>
         </p:style>
       </p:cxnSp>
-    </p:spTree>
-    <p:extLst>
-      <p:ext uri="{BB962C8B-B14F-4D97-AF65-F5344CB8AC3E}">
-        <p14:creationId xmlns:p14="http://schemas.microsoft.com/office/powerpoint/2010/main" val="3073183680"/>
-      </p:ext>
-    </p:extLst>
-  </p:cSld>
-  <p:clrMapOvr>
-    <a:masterClrMapping/>
-  </p:clrMapOvr>
-</p:sld>
-</file>
-
-<file path=ppt/slides/slide7.xml><?xml version="1.0" encoding="utf-8"?>
-<p:sld xmlns:a="http://schemas.openxmlformats.org/drawingml/2006/main" xmlns:r="http://schemas.openxmlformats.org/officeDocument/2006/relationships" xmlns:p="http://schemas.openxmlformats.org/presentationml/2006/main">
-  <p:cSld>
-    <p:spTree>
-      <p:nvGrpSpPr>
-        <p:cNvPr id="1" name=""/>
-        <p:cNvGrpSpPr/>
-        <p:nvPr/>
-      </p:nvGrpSpPr>
-      <p:grpSpPr>
-        <a:xfrm>
-          <a:off x="0" y="0"/>
-          <a:ext cx="0" cy="0"/>
-          <a:chOff x="0" y="0"/>
-          <a:chExt cx="0" cy="0"/>
-        </a:xfrm>
-      </p:grpSpPr>
-      <p:sp>
-        <p:nvSpPr>
-          <p:cNvPr id="3" name="Oval 2">
-            <a:extLst>
-              <a:ext uri="{FF2B5EF4-FFF2-40B4-BE49-F238E27FC236}">
-                <a16:creationId xmlns:a16="http://schemas.microsoft.com/office/drawing/2014/main" id="{BB15AB6B-9DD5-FB40-AE38-8A08B9A3CCEF}"/>
+      <p:sp>
+        <p:nvSpPr>
+          <p:cNvPr id="54" name="Oval 53">
+            <a:extLst>
+              <a:ext uri="{FF2B5EF4-FFF2-40B4-BE49-F238E27FC236}">
+                <a16:creationId xmlns:a16="http://schemas.microsoft.com/office/drawing/2014/main" id="{E4E2ABEC-07C2-3044-A6DB-04D85C89293F}"/>
               </a:ext>
             </a:extLst>
           </p:cNvPr>
@@ -6521,8 +7188,8 @@
         </p:nvSpPr>
         <p:spPr>
           <a:xfrm>
-            <a:off x="6860920" y="3019354"/>
-            <a:ext cx="1114157" cy="1088545"/>
+            <a:off x="6631546" y="2741689"/>
+            <a:ext cx="994304" cy="971447"/>
           </a:xfrm>
           <a:prstGeom prst="ellipse">
             <a:avLst/>
@@ -6550,246 +7217,8 @@
           <a:p>
             <a:pPr algn="ctr"/>
             <a:r>
-              <a:rPr lang="en-US" sz="1400" dirty="0"/>
-              <a:t>New Fieldtrip Node</a:t>
-            </a:r>
-          </a:p>
-        </p:txBody>
-      </p:sp>
-      <p:sp>
-        <p:nvSpPr>
-          <p:cNvPr id="4" name="Oval 3">
-            <a:extLst>
-              <a:ext uri="{FF2B5EF4-FFF2-40B4-BE49-F238E27FC236}">
-                <a16:creationId xmlns:a16="http://schemas.microsoft.com/office/drawing/2014/main" id="{D1D4AF6D-741A-A445-91EF-ACB3FF40CBEF}"/>
-              </a:ext>
-            </a:extLst>
-          </p:cNvPr>
-          <p:cNvSpPr/>
-          <p:nvPr/>
-        </p:nvSpPr>
-        <p:spPr>
-          <a:xfrm>
-            <a:off x="9010455" y="1722258"/>
-            <a:ext cx="820132" cy="801279"/>
-          </a:xfrm>
-          <a:prstGeom prst="ellipse">
-            <a:avLst/>
-          </a:prstGeom>
-          <a:solidFill>
-            <a:schemeClr val="tx2"/>
-          </a:solidFill>
-          <a:ln w="28575">
-            <a:solidFill>
-              <a:schemeClr val="accent2"/>
-            </a:solidFill>
-          </a:ln>
-        </p:spPr>
-        <p:style>
-          <a:lnRef idx="2">
-            <a:schemeClr val="accent1">
-              <a:shade val="50000"/>
-            </a:schemeClr>
-          </a:lnRef>
-          <a:fillRef idx="1">
-            <a:schemeClr val="accent1"/>
-          </a:fillRef>
-          <a:effectRef idx="0">
-            <a:schemeClr val="accent1"/>
-          </a:effectRef>
-          <a:fontRef idx="minor">
-            <a:schemeClr val="lt1"/>
-          </a:fontRef>
-        </p:style>
-        <p:txBody>
-          <a:bodyPr rtlCol="0" anchor="ctr"/>
-          <a:lstStyle/>
-          <a:p>
-            <a:pPr algn="ctr"/>
-            <a:r>
-              <a:rPr lang="en-US" sz="1000" dirty="0"/>
-              <a:t>Existing Place Node</a:t>
-            </a:r>
-          </a:p>
-        </p:txBody>
-      </p:sp>
-      <p:sp>
-        <p:nvSpPr>
-          <p:cNvPr id="6" name="Oval 5">
-            <a:extLst>
-              <a:ext uri="{FF2B5EF4-FFF2-40B4-BE49-F238E27FC236}">
-                <a16:creationId xmlns:a16="http://schemas.microsoft.com/office/drawing/2014/main" id="{1611AD07-93D2-D546-88A0-1A9F52FA5581}"/>
-              </a:ext>
-            </a:extLst>
-          </p:cNvPr>
-          <p:cNvSpPr/>
-          <p:nvPr/>
-        </p:nvSpPr>
-        <p:spPr>
-          <a:xfrm>
-            <a:off x="9010455" y="3162988"/>
-            <a:ext cx="820132" cy="801279"/>
-          </a:xfrm>
-          <a:prstGeom prst="ellipse">
-            <a:avLst/>
-          </a:prstGeom>
-          <a:solidFill>
-            <a:schemeClr val="tx2"/>
-          </a:solidFill>
-          <a:ln w="28575">
-            <a:solidFill>
-              <a:schemeClr val="accent2"/>
-            </a:solidFill>
-          </a:ln>
-        </p:spPr>
-        <p:style>
-          <a:lnRef idx="2">
-            <a:schemeClr val="accent1">
-              <a:shade val="50000"/>
-            </a:schemeClr>
-          </a:lnRef>
-          <a:fillRef idx="1">
-            <a:schemeClr val="accent1"/>
-          </a:fillRef>
-          <a:effectRef idx="0">
-            <a:schemeClr val="accent1"/>
-          </a:effectRef>
-          <a:fontRef idx="minor">
-            <a:schemeClr val="lt1"/>
-          </a:fontRef>
-        </p:style>
-        <p:txBody>
-          <a:bodyPr rtlCol="0" anchor="ctr"/>
-          <a:lstStyle/>
-          <a:p>
-            <a:pPr algn="ctr"/>
-            <a:r>
-              <a:rPr lang="en-US" sz="1000" dirty="0"/>
-              <a:t>Existing Person Node</a:t>
-            </a:r>
-          </a:p>
-        </p:txBody>
-      </p:sp>
-      <p:sp>
-        <p:nvSpPr>
-          <p:cNvPr id="8" name="Title 7">
-            <a:extLst>
-              <a:ext uri="{FF2B5EF4-FFF2-40B4-BE49-F238E27FC236}">
-                <a16:creationId xmlns:a16="http://schemas.microsoft.com/office/drawing/2014/main" id="{46A7470D-3D1D-634F-A847-4D33DA11A87B}"/>
-              </a:ext>
-            </a:extLst>
-          </p:cNvPr>
-          <p:cNvSpPr>
-            <a:spLocks noGrp="1"/>
-          </p:cNvSpPr>
-          <p:nvPr>
-            <p:ph type="title"/>
-          </p:nvPr>
-        </p:nvSpPr>
-        <p:spPr/>
-        <p:txBody>
-          <a:bodyPr/>
-          <a:lstStyle/>
-          <a:p>
-            <a:r>
-              <a:rPr lang="en-US" dirty="0"/>
-              <a:t>How to create Fieldtrip edges?</a:t>
-            </a:r>
-          </a:p>
-        </p:txBody>
-      </p:sp>
-      <p:sp>
-        <p:nvSpPr>
-          <p:cNvPr id="10" name="Text Placeholder 9">
-            <a:extLst>
-              <a:ext uri="{FF2B5EF4-FFF2-40B4-BE49-F238E27FC236}">
-                <a16:creationId xmlns:a16="http://schemas.microsoft.com/office/drawing/2014/main" id="{1048CD8B-F747-174C-9ADB-503808FC51B5}"/>
-              </a:ext>
-            </a:extLst>
-          </p:cNvPr>
-          <p:cNvSpPr>
-            <a:spLocks noGrp="1"/>
-          </p:cNvSpPr>
-          <p:nvPr>
-            <p:ph type="body" sz="half" idx="2"/>
-          </p:nvPr>
-        </p:nvSpPr>
-        <p:spPr/>
-        <p:txBody>
-          <a:bodyPr/>
-          <a:lstStyle/>
-          <a:p>
-            <a:pPr marL="285750" indent="-285750">
-              <a:buFont typeface="Arial" panose="020B0604020202020204" pitchFamily="34" charset="0"/>
-              <a:buChar char="•"/>
-            </a:pPr>
-            <a:r>
-              <a:rPr lang="en-US" b="1" dirty="0"/>
-              <a:t>New Fieldtrip node knows directly the person, places, and stories associated with it.</a:t>
-            </a:r>
-          </a:p>
-          <a:p>
-            <a:pPr marL="285750" indent="-285750">
-              <a:buFont typeface="Arial" panose="020B0604020202020204" pitchFamily="34" charset="0"/>
-              <a:buChar char="•"/>
-            </a:pPr>
-            <a:endParaRPr lang="en-US" dirty="0"/>
-          </a:p>
-        </p:txBody>
-      </p:sp>
-      <p:sp>
-        <p:nvSpPr>
-          <p:cNvPr id="11" name="Oval 10">
-            <a:extLst>
-              <a:ext uri="{FF2B5EF4-FFF2-40B4-BE49-F238E27FC236}">
-                <a16:creationId xmlns:a16="http://schemas.microsoft.com/office/drawing/2014/main" id="{63D53C4B-C5AA-634E-9B08-DF38DC0EA684}"/>
-              </a:ext>
-            </a:extLst>
-          </p:cNvPr>
-          <p:cNvSpPr/>
-          <p:nvPr/>
-        </p:nvSpPr>
-        <p:spPr>
-          <a:xfrm>
-            <a:off x="9010455" y="4603718"/>
-            <a:ext cx="820132" cy="801279"/>
-          </a:xfrm>
-          <a:prstGeom prst="ellipse">
-            <a:avLst/>
-          </a:prstGeom>
-          <a:solidFill>
-            <a:schemeClr val="tx2"/>
-          </a:solidFill>
-          <a:ln w="28575">
-            <a:solidFill>
-              <a:schemeClr val="accent2"/>
-            </a:solidFill>
-          </a:ln>
-        </p:spPr>
-        <p:style>
-          <a:lnRef idx="2">
-            <a:schemeClr val="accent1">
-              <a:shade val="50000"/>
-            </a:schemeClr>
-          </a:lnRef>
-          <a:fillRef idx="1">
-            <a:schemeClr val="accent1"/>
-          </a:fillRef>
-          <a:effectRef idx="0">
-            <a:schemeClr val="accent1"/>
-          </a:effectRef>
-          <a:fontRef idx="minor">
-            <a:schemeClr val="lt1"/>
-          </a:fontRef>
-        </p:style>
-        <p:txBody>
-          <a:bodyPr rtlCol="0" anchor="ctr"/>
-          <a:lstStyle/>
-          <a:p>
-            <a:pPr algn="ctr"/>
-            <a:r>
-              <a:rPr lang="en-US" sz="1000" dirty="0"/>
-              <a:t>Existing Story Node</a:t>
+              <a:rPr lang="en-US" sz="1200" dirty="0"/>
+              <a:t>New Story Node</a:t>
             </a:r>
           </a:p>
         </p:txBody>
@@ -6797,472 +7226,7 @@
     </p:spTree>
     <p:extLst>
       <p:ext uri="{BB962C8B-B14F-4D97-AF65-F5344CB8AC3E}">
-        <p14:creationId xmlns:p14="http://schemas.microsoft.com/office/powerpoint/2010/main" val="143301228"/>
-      </p:ext>
-    </p:extLst>
-  </p:cSld>
-  <p:clrMapOvr>
-    <a:masterClrMapping/>
-  </p:clrMapOvr>
-</p:sld>
-</file>
-
-<file path=ppt/slides/slide8.xml><?xml version="1.0" encoding="utf-8"?>
-<p:sld xmlns:a="http://schemas.openxmlformats.org/drawingml/2006/main" xmlns:r="http://schemas.openxmlformats.org/officeDocument/2006/relationships" xmlns:p="http://schemas.openxmlformats.org/presentationml/2006/main">
-  <p:cSld>
-    <p:spTree>
-      <p:nvGrpSpPr>
-        <p:cNvPr id="1" name=""/>
-        <p:cNvGrpSpPr/>
-        <p:nvPr/>
-      </p:nvGrpSpPr>
-      <p:grpSpPr>
-        <a:xfrm>
-          <a:off x="0" y="0"/>
-          <a:ext cx="0" cy="0"/>
-          <a:chOff x="0" y="0"/>
-          <a:chExt cx="0" cy="0"/>
-        </a:xfrm>
-      </p:grpSpPr>
-      <p:sp>
-        <p:nvSpPr>
-          <p:cNvPr id="3" name="Oval 2">
-            <a:extLst>
-              <a:ext uri="{FF2B5EF4-FFF2-40B4-BE49-F238E27FC236}">
-                <a16:creationId xmlns:a16="http://schemas.microsoft.com/office/drawing/2014/main" id="{BB15AB6B-9DD5-FB40-AE38-8A08B9A3CCEF}"/>
-              </a:ext>
-            </a:extLst>
-          </p:cNvPr>
-          <p:cNvSpPr/>
-          <p:nvPr/>
-        </p:nvSpPr>
-        <p:spPr>
-          <a:xfrm>
-            <a:off x="7154945" y="3162988"/>
-            <a:ext cx="820132" cy="801279"/>
-          </a:xfrm>
-          <a:prstGeom prst="ellipse">
-            <a:avLst/>
-          </a:prstGeom>
-        </p:spPr>
-        <p:style>
-          <a:lnRef idx="2">
-            <a:schemeClr val="accent1">
-              <a:shade val="50000"/>
-            </a:schemeClr>
-          </a:lnRef>
-          <a:fillRef idx="1">
-            <a:schemeClr val="accent1"/>
-          </a:fillRef>
-          <a:effectRef idx="0">
-            <a:schemeClr val="accent1"/>
-          </a:effectRef>
-          <a:fontRef idx="minor">
-            <a:schemeClr val="lt1"/>
-          </a:fontRef>
-        </p:style>
-        <p:txBody>
-          <a:bodyPr rtlCol="0" anchor="ctr"/>
-          <a:lstStyle/>
-          <a:p>
-            <a:pPr algn="ctr"/>
-            <a:r>
-              <a:rPr lang="en-US" sz="1400" dirty="0"/>
-              <a:t>New Story Node</a:t>
-            </a:r>
-          </a:p>
-        </p:txBody>
-      </p:sp>
-      <p:sp>
-        <p:nvSpPr>
-          <p:cNvPr id="4" name="Oval 3">
-            <a:extLst>
-              <a:ext uri="{FF2B5EF4-FFF2-40B4-BE49-F238E27FC236}">
-                <a16:creationId xmlns:a16="http://schemas.microsoft.com/office/drawing/2014/main" id="{D1D4AF6D-741A-A445-91EF-ACB3FF40CBEF}"/>
-              </a:ext>
-            </a:extLst>
-          </p:cNvPr>
-          <p:cNvSpPr/>
-          <p:nvPr/>
-        </p:nvSpPr>
-        <p:spPr>
-          <a:xfrm>
-            <a:off x="9010455" y="1722258"/>
-            <a:ext cx="820132" cy="801279"/>
-          </a:xfrm>
-          <a:prstGeom prst="ellipse">
-            <a:avLst/>
-          </a:prstGeom>
-          <a:solidFill>
-            <a:schemeClr val="tx2"/>
-          </a:solidFill>
-          <a:ln w="28575">
-            <a:solidFill>
-              <a:schemeClr val="accent2"/>
-            </a:solidFill>
-          </a:ln>
-        </p:spPr>
-        <p:style>
-          <a:lnRef idx="2">
-            <a:schemeClr val="accent1">
-              <a:shade val="50000"/>
-            </a:schemeClr>
-          </a:lnRef>
-          <a:fillRef idx="1">
-            <a:schemeClr val="accent1"/>
-          </a:fillRef>
-          <a:effectRef idx="0">
-            <a:schemeClr val="accent1"/>
-          </a:effectRef>
-          <a:fontRef idx="minor">
-            <a:schemeClr val="lt1"/>
-          </a:fontRef>
-        </p:style>
-        <p:txBody>
-          <a:bodyPr rtlCol="0" anchor="ctr"/>
-          <a:lstStyle/>
-          <a:p>
-            <a:pPr algn="ctr"/>
-            <a:r>
-              <a:rPr lang="en-US" sz="1000" dirty="0"/>
-              <a:t>Existing Place Node</a:t>
-            </a:r>
-          </a:p>
-        </p:txBody>
-      </p:sp>
-      <p:sp>
-        <p:nvSpPr>
-          <p:cNvPr id="6" name="Oval 5">
-            <a:extLst>
-              <a:ext uri="{FF2B5EF4-FFF2-40B4-BE49-F238E27FC236}">
-                <a16:creationId xmlns:a16="http://schemas.microsoft.com/office/drawing/2014/main" id="{1611AD07-93D2-D546-88A0-1A9F52FA5581}"/>
-              </a:ext>
-            </a:extLst>
-          </p:cNvPr>
-          <p:cNvSpPr/>
-          <p:nvPr/>
-        </p:nvSpPr>
-        <p:spPr>
-          <a:xfrm>
-            <a:off x="9010455" y="3162988"/>
-            <a:ext cx="820132" cy="801279"/>
-          </a:xfrm>
-          <a:prstGeom prst="ellipse">
-            <a:avLst/>
-          </a:prstGeom>
-          <a:solidFill>
-            <a:schemeClr val="tx2"/>
-          </a:solidFill>
-          <a:ln w="28575">
-            <a:solidFill>
-              <a:schemeClr val="accent2"/>
-            </a:solidFill>
-          </a:ln>
-        </p:spPr>
-        <p:style>
-          <a:lnRef idx="2">
-            <a:schemeClr val="accent1">
-              <a:shade val="50000"/>
-            </a:schemeClr>
-          </a:lnRef>
-          <a:fillRef idx="1">
-            <a:schemeClr val="accent1"/>
-          </a:fillRef>
-          <a:effectRef idx="0">
-            <a:schemeClr val="accent1"/>
-          </a:effectRef>
-          <a:fontRef idx="minor">
-            <a:schemeClr val="lt1"/>
-          </a:fontRef>
-        </p:style>
-        <p:txBody>
-          <a:bodyPr rtlCol="0" anchor="ctr"/>
-          <a:lstStyle/>
-          <a:p>
-            <a:pPr algn="ctr"/>
-            <a:r>
-              <a:rPr lang="en-US" sz="1000" dirty="0"/>
-              <a:t>Existing Person Node</a:t>
-            </a:r>
-          </a:p>
-        </p:txBody>
-      </p:sp>
-      <p:sp>
-        <p:nvSpPr>
-          <p:cNvPr id="8" name="Title 7">
-            <a:extLst>
-              <a:ext uri="{FF2B5EF4-FFF2-40B4-BE49-F238E27FC236}">
-                <a16:creationId xmlns:a16="http://schemas.microsoft.com/office/drawing/2014/main" id="{46A7470D-3D1D-634F-A847-4D33DA11A87B}"/>
-              </a:ext>
-            </a:extLst>
-          </p:cNvPr>
-          <p:cNvSpPr>
-            <a:spLocks noGrp="1"/>
-          </p:cNvSpPr>
-          <p:nvPr>
-            <p:ph type="title"/>
-          </p:nvPr>
-        </p:nvSpPr>
-        <p:spPr/>
-        <p:txBody>
-          <a:bodyPr/>
-          <a:lstStyle/>
-          <a:p>
-            <a:r>
-              <a:rPr lang="en-US" dirty="0"/>
-              <a:t>How to create Fieldtrip edges?</a:t>
-            </a:r>
-          </a:p>
-        </p:txBody>
-      </p:sp>
-      <p:sp>
-        <p:nvSpPr>
-          <p:cNvPr id="10" name="Text Placeholder 9">
-            <a:extLst>
-              <a:ext uri="{FF2B5EF4-FFF2-40B4-BE49-F238E27FC236}">
-                <a16:creationId xmlns:a16="http://schemas.microsoft.com/office/drawing/2014/main" id="{1048CD8B-F747-174C-9ADB-503808FC51B5}"/>
-              </a:ext>
-            </a:extLst>
-          </p:cNvPr>
-          <p:cNvSpPr>
-            <a:spLocks noGrp="1"/>
-          </p:cNvSpPr>
-          <p:nvPr>
-            <p:ph type="body" sz="half" idx="2"/>
-          </p:nvPr>
-        </p:nvSpPr>
-        <p:spPr/>
-        <p:txBody>
-          <a:bodyPr/>
-          <a:lstStyle/>
-          <a:p>
-            <a:pPr marL="285750" indent="-285750">
-              <a:buFont typeface="Arial" panose="020B0604020202020204" pitchFamily="34" charset="0"/>
-              <a:buChar char="•"/>
-            </a:pPr>
-            <a:r>
-              <a:rPr lang="en-US" dirty="0"/>
-              <a:t>New Fieldtrip node knows directly the person, places, and stories associated with it.</a:t>
-            </a:r>
-          </a:p>
-          <a:p>
-            <a:pPr marL="285750" indent="-285750">
-              <a:buFont typeface="Arial" panose="020B0604020202020204" pitchFamily="34" charset="0"/>
-              <a:buChar char="•"/>
-            </a:pPr>
-            <a:r>
-              <a:rPr lang="en-US" b="1" dirty="0"/>
-              <a:t>When one of the new Fieldtrip node’s associated person, places, stories matches with an existing node from the network, a primary edge can be created. </a:t>
-            </a:r>
-          </a:p>
-          <a:p>
-            <a:pPr marL="742950" lvl="1" indent="-285750">
-              <a:buFont typeface="Arial" panose="020B0604020202020204" pitchFamily="34" charset="0"/>
-              <a:buChar char="•"/>
-            </a:pPr>
-            <a:r>
-              <a:rPr lang="en-US" dirty="0"/>
-              <a:t>Example: New Fieldtrip “Feb 1887”’s person is “Jens Kristensen.” “Jens Kristensen” is currently a node on the User Nexus graph. Create an edge between the two.</a:t>
-            </a:r>
-          </a:p>
-        </p:txBody>
-      </p:sp>
-      <p:cxnSp>
-        <p:nvCxnSpPr>
-          <p:cNvPr id="5" name="Straight Connector 4">
-            <a:extLst>
-              <a:ext uri="{FF2B5EF4-FFF2-40B4-BE49-F238E27FC236}">
-                <a16:creationId xmlns:a16="http://schemas.microsoft.com/office/drawing/2014/main" id="{34D2CF34-809A-7E47-A276-34BC4B62603F}"/>
-              </a:ext>
-            </a:extLst>
-          </p:cNvPr>
-          <p:cNvCxnSpPr>
-            <a:stCxn id="3" idx="6"/>
-            <a:endCxn id="4" idx="2"/>
-          </p:cNvCxnSpPr>
-          <p:nvPr/>
-        </p:nvCxnSpPr>
-        <p:spPr>
-          <a:xfrm flipV="1">
-            <a:off x="7975077" y="2122898"/>
-            <a:ext cx="1035378" cy="1440730"/>
-          </a:xfrm>
-          <a:prstGeom prst="line">
-            <a:avLst/>
-          </a:prstGeom>
-          <a:ln>
-            <a:headEnd type="none" w="med" len="med"/>
-            <a:tailEnd type="triangle" w="med" len="med"/>
-          </a:ln>
-        </p:spPr>
-        <p:style>
-          <a:lnRef idx="1">
-            <a:schemeClr val="accent1"/>
-          </a:lnRef>
-          <a:fillRef idx="0">
-            <a:schemeClr val="accent1"/>
-          </a:fillRef>
-          <a:effectRef idx="0">
-            <a:schemeClr val="accent1"/>
-          </a:effectRef>
-          <a:fontRef idx="minor">
-            <a:schemeClr val="tx1"/>
-          </a:fontRef>
-        </p:style>
-      </p:cxnSp>
-      <p:cxnSp>
-        <p:nvCxnSpPr>
-          <p:cNvPr id="11" name="Straight Connector 10">
-            <a:extLst>
-              <a:ext uri="{FF2B5EF4-FFF2-40B4-BE49-F238E27FC236}">
-                <a16:creationId xmlns:a16="http://schemas.microsoft.com/office/drawing/2014/main" id="{171294B5-8104-A448-A1CE-5E6742BA963A}"/>
-              </a:ext>
-            </a:extLst>
-          </p:cNvPr>
-          <p:cNvCxnSpPr>
-            <a:stCxn id="3" idx="6"/>
-            <a:endCxn id="6" idx="2"/>
-          </p:cNvCxnSpPr>
-          <p:nvPr/>
-        </p:nvCxnSpPr>
-        <p:spPr>
-          <a:xfrm>
-            <a:off x="7975077" y="3563628"/>
-            <a:ext cx="1035378" cy="0"/>
-          </a:xfrm>
-          <a:prstGeom prst="line">
-            <a:avLst/>
-          </a:prstGeom>
-          <a:ln>
-            <a:headEnd type="none" w="med" len="med"/>
-            <a:tailEnd type="triangle" w="med" len="med"/>
-          </a:ln>
-        </p:spPr>
-        <p:style>
-          <a:lnRef idx="1">
-            <a:schemeClr val="accent1"/>
-          </a:lnRef>
-          <a:fillRef idx="0">
-            <a:schemeClr val="accent1"/>
-          </a:fillRef>
-          <a:effectRef idx="0">
-            <a:schemeClr val="accent1"/>
-          </a:effectRef>
-          <a:fontRef idx="minor">
-            <a:schemeClr val="tx1"/>
-          </a:fontRef>
-        </p:style>
-      </p:cxnSp>
-      <p:sp>
-        <p:nvSpPr>
-          <p:cNvPr id="12" name="Oval 11">
-            <a:extLst>
-              <a:ext uri="{FF2B5EF4-FFF2-40B4-BE49-F238E27FC236}">
-                <a16:creationId xmlns:a16="http://schemas.microsoft.com/office/drawing/2014/main" id="{4B8C2C36-F592-5745-BB88-66D159BFA322}"/>
-              </a:ext>
-            </a:extLst>
-          </p:cNvPr>
-          <p:cNvSpPr/>
-          <p:nvPr/>
-        </p:nvSpPr>
-        <p:spPr>
-          <a:xfrm>
-            <a:off x="6860920" y="3019354"/>
-            <a:ext cx="1114157" cy="1088545"/>
-          </a:xfrm>
-          <a:prstGeom prst="ellipse">
-            <a:avLst/>
-          </a:prstGeom>
-        </p:spPr>
-        <p:style>
-          <a:lnRef idx="2">
-            <a:schemeClr val="accent1">
-              <a:shade val="50000"/>
-            </a:schemeClr>
-          </a:lnRef>
-          <a:fillRef idx="1">
-            <a:schemeClr val="accent1"/>
-          </a:fillRef>
-          <a:effectRef idx="0">
-            <a:schemeClr val="accent1"/>
-          </a:effectRef>
-          <a:fontRef idx="minor">
-            <a:schemeClr val="lt1"/>
-          </a:fontRef>
-        </p:style>
-        <p:txBody>
-          <a:bodyPr rtlCol="0" anchor="ctr"/>
-          <a:lstStyle/>
-          <a:p>
-            <a:pPr algn="ctr"/>
-            <a:r>
-              <a:rPr lang="en-US" sz="1400" dirty="0"/>
-              <a:t>New Fieldtrip Node</a:t>
-            </a:r>
-          </a:p>
-        </p:txBody>
-      </p:sp>
-      <p:sp>
-        <p:nvSpPr>
-          <p:cNvPr id="13" name="Oval 12">
-            <a:extLst>
-              <a:ext uri="{FF2B5EF4-FFF2-40B4-BE49-F238E27FC236}">
-                <a16:creationId xmlns:a16="http://schemas.microsoft.com/office/drawing/2014/main" id="{ABF584DD-5600-FF49-8D22-9C2CCDD68C9D}"/>
-              </a:ext>
-            </a:extLst>
-          </p:cNvPr>
-          <p:cNvSpPr/>
-          <p:nvPr/>
-        </p:nvSpPr>
-        <p:spPr>
-          <a:xfrm>
-            <a:off x="9010455" y="4603718"/>
-            <a:ext cx="820132" cy="801279"/>
-          </a:xfrm>
-          <a:prstGeom prst="ellipse">
-            <a:avLst/>
-          </a:prstGeom>
-          <a:solidFill>
-            <a:schemeClr val="tx2"/>
-          </a:solidFill>
-          <a:ln w="28575">
-            <a:solidFill>
-              <a:schemeClr val="accent2"/>
-            </a:solidFill>
-          </a:ln>
-        </p:spPr>
-        <p:style>
-          <a:lnRef idx="2">
-            <a:schemeClr val="accent1">
-              <a:shade val="50000"/>
-            </a:schemeClr>
-          </a:lnRef>
-          <a:fillRef idx="1">
-            <a:schemeClr val="accent1"/>
-          </a:fillRef>
-          <a:effectRef idx="0">
-            <a:schemeClr val="accent1"/>
-          </a:effectRef>
-          <a:fontRef idx="minor">
-            <a:schemeClr val="lt1"/>
-          </a:fontRef>
-        </p:style>
-        <p:txBody>
-          <a:bodyPr rtlCol="0" anchor="ctr"/>
-          <a:lstStyle/>
-          <a:p>
-            <a:pPr algn="ctr"/>
-            <a:r>
-              <a:rPr lang="en-US" sz="1000" dirty="0"/>
-              <a:t>Existing Story Node</a:t>
-            </a:r>
-          </a:p>
-        </p:txBody>
-      </p:sp>
-    </p:spTree>
-    <p:extLst>
-      <p:ext uri="{BB962C8B-B14F-4D97-AF65-F5344CB8AC3E}">
-        <p14:creationId xmlns:p14="http://schemas.microsoft.com/office/powerpoint/2010/main" val="1009670587"/>
+        <p14:creationId xmlns:p14="http://schemas.microsoft.com/office/powerpoint/2010/main" val="3073183680"/>
       </p:ext>
     </p:extLst>
   </p:cSld>

</xml_diff>